<commit_message>
Deploy website - based on c5d3e1c6cb12b77f163c10f405668fd1d9674662
</commit_message>
<xml_diff>
--- a/image-support.pptx
+++ b/image-support.pptx
@@ -5,13 +5,14 @@
     <p:sldMasterId id="2147483648" r:id="rId1"/>
   </p:sldMasterIdLst>
   <p:notesMasterIdLst>
-    <p:notesMasterId r:id="rId3"/>
+    <p:notesMasterId r:id="rId4"/>
   </p:notesMasterIdLst>
   <p:handoutMasterIdLst>
-    <p:handoutMasterId r:id="rId4"/>
+    <p:handoutMasterId r:id="rId5"/>
   </p:handoutMasterIdLst>
   <p:sldIdLst>
     <p:sldId id="432" r:id="rId2"/>
+    <p:sldId id="433" r:id="rId3"/>
   </p:sldIdLst>
   <p:sldSz cx="10842625" cy="6099175"/>
   <p:notesSz cx="6797675" cy="9929813"/>
@@ -188,7 +189,7 @@
 <file path=ppt/revisionInfo.xml><?xml version="1.0" encoding="utf-8"?>
 <p1510:revInfo xmlns:a="http://schemas.openxmlformats.org/drawingml/2006/main" xmlns:r="http://schemas.openxmlformats.org/officeDocument/2006/relationships" xmlns:p1510="http://schemas.microsoft.com/office/powerpoint/2015/10/main">
   <p1510:revLst>
-    <p1510:client id="{45311A73-93A6-4B44-9F30-450DD51E0866}" v="15" dt="2021-04-13T06:50:24.284"/>
+    <p1510:client id="{45311A73-93A6-4B44-9F30-450DD51E0866}" v="124" dt="2021-04-13T07:35:58.016"/>
   </p1510:revLst>
 </p1510:revInfo>
 </file>
@@ -197,8 +198,8 @@
 <pc:chgInfo xmlns:a="http://schemas.openxmlformats.org/drawingml/2006/main" xmlns:r="http://schemas.openxmlformats.org/officeDocument/2006/relationships" xmlns:ac="http://schemas.microsoft.com/office/drawing/2013/main/command" xmlns:pc="http://schemas.microsoft.com/office/powerpoint/2013/main/command">
   <pc:docChgLst>
     <pc:chgData name="Federico Perini" userId="dd6016fc4604f770" providerId="LiveId" clId="{45311A73-93A6-4B44-9F30-450DD51E0866}"/>
-    <pc:docChg chg="custSel delSld modSld">
-      <pc:chgData name="Federico Perini" userId="dd6016fc4604f770" providerId="LiveId" clId="{45311A73-93A6-4B44-9F30-450DD51E0866}" dt="2021-04-13T06:50:24.283" v="162" actId="164"/>
+    <pc:docChg chg="custSel addSld delSld modSld">
+      <pc:chgData name="Federico Perini" userId="dd6016fc4604f770" providerId="LiveId" clId="{45311A73-93A6-4B44-9F30-450DD51E0866}" dt="2021-04-13T07:36:02.692" v="471" actId="1076"/>
       <pc:docMkLst>
         <pc:docMk/>
       </pc:docMkLst>
@@ -489,6 +490,413 @@
             <pc:docMk/>
             <pc:sldMk cId="126785824" sldId="432"/>
             <ac:cxnSpMk id="37" creationId="{DDC1E9DF-3EB5-434E-A3A4-427209E3FF97}"/>
+          </ac:cxnSpMkLst>
+        </pc:cxnChg>
+      </pc:sldChg>
+      <pc:sldChg chg="addSp delSp modSp add mod">
+        <pc:chgData name="Federico Perini" userId="dd6016fc4604f770" providerId="LiveId" clId="{45311A73-93A6-4B44-9F30-450DD51E0866}" dt="2021-04-13T07:36:02.692" v="471" actId="1076"/>
+        <pc:sldMkLst>
+          <pc:docMk/>
+          <pc:sldMk cId="2843157709" sldId="433"/>
+        </pc:sldMkLst>
+        <pc:spChg chg="add del mod">
+          <ac:chgData name="Federico Perini" userId="dd6016fc4604f770" providerId="LiveId" clId="{45311A73-93A6-4B44-9F30-450DD51E0866}" dt="2021-04-13T07:21:12.538" v="175" actId="478"/>
+          <ac:spMkLst>
+            <pc:docMk/>
+            <pc:sldMk cId="2843157709" sldId="433"/>
+            <ac:spMk id="5" creationId="{822DF0B9-8257-4CCD-807F-202D4B8A63C3}"/>
+          </ac:spMkLst>
+        </pc:spChg>
+        <pc:spChg chg="add mod ord">
+          <ac:chgData name="Federico Perini" userId="dd6016fc4604f770" providerId="LiveId" clId="{45311A73-93A6-4B44-9F30-450DD51E0866}" dt="2021-04-13T07:22:18.501" v="194" actId="14100"/>
+          <ac:spMkLst>
+            <pc:docMk/>
+            <pc:sldMk cId="2843157709" sldId="433"/>
+            <ac:spMk id="9" creationId="{A78AAF1C-2ACF-4BA7-AABA-7BC2A14D6212}"/>
+          </ac:spMkLst>
+        </pc:spChg>
+        <pc:spChg chg="add mod">
+          <ac:chgData name="Federico Perini" userId="dd6016fc4604f770" providerId="LiveId" clId="{45311A73-93A6-4B44-9F30-450DD51E0866}" dt="2021-04-13T07:22:45.375" v="202" actId="1076"/>
+          <ac:spMkLst>
+            <pc:docMk/>
+            <pc:sldMk cId="2843157709" sldId="433"/>
+            <ac:spMk id="10" creationId="{B68D206D-33D7-4C9C-9E42-3496689EA8EE}"/>
+          </ac:spMkLst>
+        </pc:spChg>
+        <pc:spChg chg="add mod">
+          <ac:chgData name="Federico Perini" userId="dd6016fc4604f770" providerId="LiveId" clId="{45311A73-93A6-4B44-9F30-450DD51E0866}" dt="2021-04-13T07:23:02.042" v="208" actId="207"/>
+          <ac:spMkLst>
+            <pc:docMk/>
+            <pc:sldMk cId="2843157709" sldId="433"/>
+            <ac:spMk id="11" creationId="{9EA85414-DB47-4070-9511-E70324BD5938}"/>
+          </ac:spMkLst>
+        </pc:spChg>
+        <pc:spChg chg="add mod">
+          <ac:chgData name="Federico Perini" userId="dd6016fc4604f770" providerId="LiveId" clId="{45311A73-93A6-4B44-9F30-450DD51E0866}" dt="2021-04-13T07:27:42.034" v="309" actId="1076"/>
+          <ac:spMkLst>
+            <pc:docMk/>
+            <pc:sldMk cId="2843157709" sldId="433"/>
+            <ac:spMk id="24" creationId="{D900886B-0F11-44EB-8359-FF229BAE92FB}"/>
+          </ac:spMkLst>
+        </pc:spChg>
+        <pc:spChg chg="add mod">
+          <ac:chgData name="Federico Perini" userId="dd6016fc4604f770" providerId="LiveId" clId="{45311A73-93A6-4B44-9F30-450DD51E0866}" dt="2021-04-13T07:25:08.827" v="280" actId="1076"/>
+          <ac:spMkLst>
+            <pc:docMk/>
+            <pc:sldMk cId="2843157709" sldId="433"/>
+            <ac:spMk id="27" creationId="{DD3D9F46-54F7-41C6-8064-C5869699B704}"/>
+          </ac:spMkLst>
+        </pc:spChg>
+        <pc:spChg chg="add mod ord">
+          <ac:chgData name="Federico Perini" userId="dd6016fc4604f770" providerId="LiveId" clId="{45311A73-93A6-4B44-9F30-450DD51E0866}" dt="2021-04-13T07:21:39.489" v="185" actId="167"/>
+          <ac:spMkLst>
+            <pc:docMk/>
+            <pc:sldMk cId="2843157709" sldId="433"/>
+            <ac:spMk id="33" creationId="{29169F80-F0BB-4608-87E7-E27560D3FE64}"/>
+          </ac:spMkLst>
+        </pc:spChg>
+        <pc:spChg chg="add mod">
+          <ac:chgData name="Federico Perini" userId="dd6016fc4604f770" providerId="LiveId" clId="{45311A73-93A6-4B44-9F30-450DD51E0866}" dt="2021-04-13T07:22:07.879" v="193" actId="1076"/>
+          <ac:spMkLst>
+            <pc:docMk/>
+            <pc:sldMk cId="2843157709" sldId="433"/>
+            <ac:spMk id="38" creationId="{8F74858C-0AEF-43D1-9BF9-48BFBF7816FB}"/>
+          </ac:spMkLst>
+        </pc:spChg>
+        <pc:spChg chg="add mod">
+          <ac:chgData name="Federico Perini" userId="dd6016fc4604f770" providerId="LiveId" clId="{45311A73-93A6-4B44-9F30-450DD51E0866}" dt="2021-04-13T07:22:24.208" v="197" actId="14100"/>
+          <ac:spMkLst>
+            <pc:docMk/>
+            <pc:sldMk cId="2843157709" sldId="433"/>
+            <ac:spMk id="39" creationId="{B9E68D01-A5A6-43AD-9DF4-828B444DBBA4}"/>
+          </ac:spMkLst>
+        </pc:spChg>
+        <pc:spChg chg="add mod">
+          <ac:chgData name="Federico Perini" userId="dd6016fc4604f770" providerId="LiveId" clId="{45311A73-93A6-4B44-9F30-450DD51E0866}" dt="2021-04-13T07:22:31.613" v="200" actId="1076"/>
+          <ac:spMkLst>
+            <pc:docMk/>
+            <pc:sldMk cId="2843157709" sldId="433"/>
+            <ac:spMk id="42" creationId="{40D67641-89CD-4D3F-B1BB-9D28FBB736C0}"/>
+          </ac:spMkLst>
+        </pc:spChg>
+        <pc:spChg chg="add mod">
+          <ac:chgData name="Federico Perini" userId="dd6016fc4604f770" providerId="LiveId" clId="{45311A73-93A6-4B44-9F30-450DD51E0866}" dt="2021-04-13T07:23:13.763" v="212" actId="1076"/>
+          <ac:spMkLst>
+            <pc:docMk/>
+            <pc:sldMk cId="2843157709" sldId="433"/>
+            <ac:spMk id="44" creationId="{5488D58A-C57D-462C-A2C5-931DD08C0835}"/>
+          </ac:spMkLst>
+        </pc:spChg>
+        <pc:spChg chg="add del mod">
+          <ac:chgData name="Federico Perini" userId="dd6016fc4604f770" providerId="LiveId" clId="{45311A73-93A6-4B44-9F30-450DD51E0866}" dt="2021-04-13T07:24:24.737" v="245"/>
+          <ac:spMkLst>
+            <pc:docMk/>
+            <pc:sldMk cId="2843157709" sldId="433"/>
+            <ac:spMk id="46" creationId="{E8BDCF0E-2E5A-434F-87AE-6C0493E9C313}"/>
+          </ac:spMkLst>
+        </pc:spChg>
+        <pc:spChg chg="add mod ord">
+          <ac:chgData name="Federico Perini" userId="dd6016fc4604f770" providerId="LiveId" clId="{45311A73-93A6-4B44-9F30-450DD51E0866}" dt="2021-04-13T07:25:03.613" v="278" actId="1582"/>
+          <ac:spMkLst>
+            <pc:docMk/>
+            <pc:sldMk cId="2843157709" sldId="433"/>
+            <ac:spMk id="47" creationId="{30006478-F2C2-4EB9-BFFD-79B11F094D70}"/>
+          </ac:spMkLst>
+        </pc:spChg>
+        <pc:spChg chg="add del">
+          <ac:chgData name="Federico Perini" userId="dd6016fc4604f770" providerId="LiveId" clId="{45311A73-93A6-4B44-9F30-450DD51E0866}" dt="2021-04-13T07:26:03.142" v="287" actId="478"/>
+          <ac:spMkLst>
+            <pc:docMk/>
+            <pc:sldMk cId="2843157709" sldId="433"/>
+            <ac:spMk id="51" creationId="{FFCEACCD-5475-40FC-ADA0-C390B90D827B}"/>
+          </ac:spMkLst>
+        </pc:spChg>
+        <pc:spChg chg="add mod">
+          <ac:chgData name="Federico Perini" userId="dd6016fc4604f770" providerId="LiveId" clId="{45311A73-93A6-4B44-9F30-450DD51E0866}" dt="2021-04-13T07:26:10.610" v="289" actId="1582"/>
+          <ac:spMkLst>
+            <pc:docMk/>
+            <pc:sldMk cId="2843157709" sldId="433"/>
+            <ac:spMk id="52" creationId="{8C0053EF-069D-4EA9-93BD-0D16AAD3655B}"/>
+          </ac:spMkLst>
+        </pc:spChg>
+        <pc:spChg chg="add mod">
+          <ac:chgData name="Federico Perini" userId="dd6016fc4604f770" providerId="LiveId" clId="{45311A73-93A6-4B44-9F30-450DD51E0866}" dt="2021-04-13T07:26:21.447" v="292" actId="1076"/>
+          <ac:spMkLst>
+            <pc:docMk/>
+            <pc:sldMk cId="2843157709" sldId="433"/>
+            <ac:spMk id="53" creationId="{2D43FE73-23A7-4090-A3BE-DC5BEFBEBC9C}"/>
+          </ac:spMkLst>
+        </pc:spChg>
+        <pc:spChg chg="add mod ord">
+          <ac:chgData name="Federico Perini" userId="dd6016fc4604f770" providerId="LiveId" clId="{45311A73-93A6-4B44-9F30-450DD51E0866}" dt="2021-04-13T07:27:18.953" v="302" actId="167"/>
+          <ac:spMkLst>
+            <pc:docMk/>
+            <pc:sldMk cId="2843157709" sldId="433"/>
+            <ac:spMk id="54" creationId="{D83B0A10-05E8-465E-B362-360F98679D3B}"/>
+          </ac:spMkLst>
+        </pc:spChg>
+        <pc:spChg chg="add mod ord">
+          <ac:chgData name="Federico Perini" userId="dd6016fc4604f770" providerId="LiveId" clId="{45311A73-93A6-4B44-9F30-450DD51E0866}" dt="2021-04-13T07:30:57.548" v="395" actId="166"/>
+          <ac:spMkLst>
+            <pc:docMk/>
+            <pc:sldMk cId="2843157709" sldId="433"/>
+            <ac:spMk id="57" creationId="{3D1E7587-D463-4CA6-A137-6BA51D6E9B1B}"/>
+          </ac:spMkLst>
+        </pc:spChg>
+        <pc:spChg chg="add mod">
+          <ac:chgData name="Federico Perini" userId="dd6016fc4604f770" providerId="LiveId" clId="{45311A73-93A6-4B44-9F30-450DD51E0866}" dt="2021-04-13T07:31:02.238" v="397" actId="1076"/>
+          <ac:spMkLst>
+            <pc:docMk/>
+            <pc:sldMk cId="2843157709" sldId="433"/>
+            <ac:spMk id="58" creationId="{BEA21552-E8BA-447D-88CE-3EBCE3A50FF9}"/>
+          </ac:spMkLst>
+        </pc:spChg>
+        <pc:spChg chg="add mod">
+          <ac:chgData name="Federico Perini" userId="dd6016fc4604f770" providerId="LiveId" clId="{45311A73-93A6-4B44-9F30-450DD51E0866}" dt="2021-04-13T07:29:00.230" v="370" actId="1076"/>
+          <ac:spMkLst>
+            <pc:docMk/>
+            <pc:sldMk cId="2843157709" sldId="433"/>
+            <ac:spMk id="59" creationId="{DDCBB5C1-086B-4DE8-AB82-5947664F5DEC}"/>
+          </ac:spMkLst>
+        </pc:spChg>
+        <pc:spChg chg="add mod ord">
+          <ac:chgData name="Federico Perini" userId="dd6016fc4604f770" providerId="LiveId" clId="{45311A73-93A6-4B44-9F30-450DD51E0866}" dt="2021-04-13T07:30:35.384" v="389" actId="167"/>
+          <ac:spMkLst>
+            <pc:docMk/>
+            <pc:sldMk cId="2843157709" sldId="433"/>
+            <ac:spMk id="75" creationId="{2937CF8F-1219-4822-8DAA-9263CD56EC68}"/>
+          </ac:spMkLst>
+        </pc:spChg>
+        <pc:spChg chg="add mod ord">
+          <ac:chgData name="Federico Perini" userId="dd6016fc4604f770" providerId="LiveId" clId="{45311A73-93A6-4B44-9F30-450DD51E0866}" dt="2021-04-13T07:30:53.503" v="394" actId="167"/>
+          <ac:spMkLst>
+            <pc:docMk/>
+            <pc:sldMk cId="2843157709" sldId="433"/>
+            <ac:spMk id="76" creationId="{C875A2FB-911C-4423-8DCD-31E9B8A97E69}"/>
+          </ac:spMkLst>
+        </pc:spChg>
+        <pc:spChg chg="add mod">
+          <ac:chgData name="Federico Perini" userId="dd6016fc4604f770" providerId="LiveId" clId="{45311A73-93A6-4B44-9F30-450DD51E0866}" dt="2021-04-13T07:31:37.884" v="403" actId="208"/>
+          <ac:spMkLst>
+            <pc:docMk/>
+            <pc:sldMk cId="2843157709" sldId="433"/>
+            <ac:spMk id="78" creationId="{ECF36B7F-E5A4-4459-A2B1-84E6741D3DCD}"/>
+          </ac:spMkLst>
+        </pc:spChg>
+        <pc:spChg chg="add mod">
+          <ac:chgData name="Federico Perini" userId="dd6016fc4604f770" providerId="LiveId" clId="{45311A73-93A6-4B44-9F30-450DD51E0866}" dt="2021-04-13T07:31:46.880" v="405" actId="208"/>
+          <ac:spMkLst>
+            <pc:docMk/>
+            <pc:sldMk cId="2843157709" sldId="433"/>
+            <ac:spMk id="79" creationId="{7BED8B2B-BE3F-4350-947E-211AD236E89D}"/>
+          </ac:spMkLst>
+        </pc:spChg>
+        <pc:spChg chg="add del mod">
+          <ac:chgData name="Federico Perini" userId="dd6016fc4604f770" providerId="LiveId" clId="{45311A73-93A6-4B44-9F30-450DD51E0866}" dt="2021-04-13T07:33:57.165" v="429" actId="478"/>
+          <ac:spMkLst>
+            <pc:docMk/>
+            <pc:sldMk cId="2843157709" sldId="433"/>
+            <ac:spMk id="80" creationId="{20B229FD-0649-443F-922E-FBC2A4B847D1}"/>
+          </ac:spMkLst>
+        </pc:spChg>
+        <pc:spChg chg="add del mod">
+          <ac:chgData name="Federico Perini" userId="dd6016fc4604f770" providerId="LiveId" clId="{45311A73-93A6-4B44-9F30-450DD51E0866}" dt="2021-04-13T07:33:58.008" v="430" actId="478"/>
+          <ac:spMkLst>
+            <pc:docMk/>
+            <pc:sldMk cId="2843157709" sldId="433"/>
+            <ac:spMk id="81" creationId="{E12DCA85-F085-44CF-B49E-0A0673731497}"/>
+          </ac:spMkLst>
+        </pc:spChg>
+        <pc:spChg chg="add mod">
+          <ac:chgData name="Federico Perini" userId="dd6016fc4604f770" providerId="LiveId" clId="{45311A73-93A6-4B44-9F30-450DD51E0866}" dt="2021-04-13T07:34:03.296" v="436" actId="1076"/>
+          <ac:spMkLst>
+            <pc:docMk/>
+            <pc:sldMk cId="2843157709" sldId="433"/>
+            <ac:spMk id="82" creationId="{FE47F98E-E595-4877-A0E6-CCF4DF559AF6}"/>
+          </ac:spMkLst>
+        </pc:spChg>
+        <pc:spChg chg="add mod">
+          <ac:chgData name="Federico Perini" userId="dd6016fc4604f770" providerId="LiveId" clId="{45311A73-93A6-4B44-9F30-450DD51E0866}" dt="2021-04-13T07:34:06.564" v="439" actId="20577"/>
+          <ac:spMkLst>
+            <pc:docMk/>
+            <pc:sldMk cId="2843157709" sldId="433"/>
+            <ac:spMk id="83" creationId="{91724388-540C-41E8-BF8E-1AF7164F5375}"/>
+          </ac:spMkLst>
+        </pc:spChg>
+        <pc:spChg chg="add mod">
+          <ac:chgData name="Federico Perini" userId="dd6016fc4604f770" providerId="LiveId" clId="{45311A73-93A6-4B44-9F30-450DD51E0866}" dt="2021-04-13T07:34:56.643" v="460" actId="1076"/>
+          <ac:spMkLst>
+            <pc:docMk/>
+            <pc:sldMk cId="2843157709" sldId="433"/>
+            <ac:spMk id="88" creationId="{D73853DF-6832-4DC8-B37B-50FBA225AE9D}"/>
+          </ac:spMkLst>
+        </pc:spChg>
+        <pc:spChg chg="add mod">
+          <ac:chgData name="Federico Perini" userId="dd6016fc4604f770" providerId="LiveId" clId="{45311A73-93A6-4B44-9F30-450DD51E0866}" dt="2021-04-13T07:36:02.692" v="471" actId="1076"/>
+          <ac:spMkLst>
+            <pc:docMk/>
+            <pc:sldMk cId="2843157709" sldId="433"/>
+            <ac:spMk id="94" creationId="{B0BA9FDC-4322-4D85-B8B4-8465F7005462}"/>
+          </ac:spMkLst>
+        </pc:spChg>
+        <pc:grpChg chg="del">
+          <ac:chgData name="Federico Perini" userId="dd6016fc4604f770" providerId="LiveId" clId="{45311A73-93A6-4B44-9F30-450DD51E0866}" dt="2021-04-13T07:20:33.372" v="164" actId="478"/>
+          <ac:grpSpMkLst>
+            <pc:docMk/>
+            <pc:sldMk cId="2843157709" sldId="433"/>
+            <ac:grpSpMk id="43" creationId="{B553D8CF-535A-4507-8126-1E30541E1216}"/>
+          </ac:grpSpMkLst>
+        </pc:grpChg>
+        <pc:cxnChg chg="add mod">
+          <ac:chgData name="Federico Perini" userId="dd6016fc4604f770" providerId="LiveId" clId="{45311A73-93A6-4B44-9F30-450DD51E0866}" dt="2021-04-13T07:20:43.652" v="167" actId="693"/>
+          <ac:cxnSpMkLst>
+            <pc:docMk/>
+            <pc:sldMk cId="2843157709" sldId="433"/>
+            <ac:cxnSpMk id="4" creationId="{7921328B-2C09-4125-AAA5-D3D09144D788}"/>
+          </ac:cxnSpMkLst>
+        </pc:cxnChg>
+        <pc:cxnChg chg="add ord">
+          <ac:chgData name="Federico Perini" userId="dd6016fc4604f770" providerId="LiveId" clId="{45311A73-93A6-4B44-9F30-450DD51E0866}" dt="2021-04-13T07:23:17.625" v="214"/>
+          <ac:cxnSpMkLst>
+            <pc:docMk/>
+            <pc:sldMk cId="2843157709" sldId="433"/>
+            <ac:cxnSpMk id="8" creationId="{6C6AE182-4CEA-420F-B476-E11F3BA976A2}"/>
+          </ac:cxnSpMkLst>
+        </pc:cxnChg>
+        <pc:cxnChg chg="add">
+          <ac:chgData name="Federico Perini" userId="dd6016fc4604f770" providerId="LiveId" clId="{45311A73-93A6-4B44-9F30-450DD51E0866}" dt="2021-04-13T07:23:25.405" v="215" actId="11529"/>
+          <ac:cxnSpMkLst>
+            <pc:docMk/>
+            <pc:sldMk cId="2843157709" sldId="433"/>
+            <ac:cxnSpMk id="14" creationId="{D6F4BFD0-4EBE-4A03-AE7C-DFB8001D33C0}"/>
+          </ac:cxnSpMkLst>
+        </pc:cxnChg>
+        <pc:cxnChg chg="add mod">
+          <ac:chgData name="Federico Perini" userId="dd6016fc4604f770" providerId="LiveId" clId="{45311A73-93A6-4B44-9F30-450DD51E0866}" dt="2021-04-13T07:34:33.758" v="445" actId="14100"/>
+          <ac:cxnSpMkLst>
+            <pc:docMk/>
+            <pc:sldMk cId="2843157709" sldId="433"/>
+            <ac:cxnSpMk id="16" creationId="{87D2A089-4ED3-43BE-AC83-9498EE71977C}"/>
+          </ac:cxnSpMkLst>
+        </pc:cxnChg>
+        <pc:cxnChg chg="add mod">
+          <ac:chgData name="Federico Perini" userId="dd6016fc4604f770" providerId="LiveId" clId="{45311A73-93A6-4B44-9F30-450DD51E0866}" dt="2021-04-13T07:23:55.999" v="223" actId="692"/>
+          <ac:cxnSpMkLst>
+            <pc:docMk/>
+            <pc:sldMk cId="2843157709" sldId="433"/>
+            <ac:cxnSpMk id="22" creationId="{1161C517-2388-44AB-BF33-CF9C6F4F225A}"/>
+          </ac:cxnSpMkLst>
+        </pc:cxnChg>
+        <pc:cxnChg chg="add mod ord">
+          <ac:chgData name="Federico Perini" userId="dd6016fc4604f770" providerId="LiveId" clId="{45311A73-93A6-4B44-9F30-450DD51E0866}" dt="2021-04-13T07:23:16.075" v="213" actId="166"/>
+          <ac:cxnSpMkLst>
+            <pc:docMk/>
+            <pc:sldMk cId="2843157709" sldId="433"/>
+            <ac:cxnSpMk id="30" creationId="{420131B1-DB1A-4213-BED5-FB75D48EC56C}"/>
+          </ac:cxnSpMkLst>
+        </pc:cxnChg>
+        <pc:cxnChg chg="add mod">
+          <ac:chgData name="Federico Perini" userId="dd6016fc4604f770" providerId="LiveId" clId="{45311A73-93A6-4B44-9F30-450DD51E0866}" dt="2021-04-13T07:23:27.903" v="217" actId="1076"/>
+          <ac:cxnSpMkLst>
+            <pc:docMk/>
+            <pc:sldMk cId="2843157709" sldId="433"/>
+            <ac:cxnSpMk id="45" creationId="{1BE5D484-2BB9-4D8F-A8B0-16AA8E722A8C}"/>
+          </ac:cxnSpMkLst>
+        </pc:cxnChg>
+        <pc:cxnChg chg="add mod">
+          <ac:chgData name="Federico Perini" userId="dd6016fc4604f770" providerId="LiveId" clId="{45311A73-93A6-4B44-9F30-450DD51E0866}" dt="2021-04-13T07:25:22.028" v="283"/>
+          <ac:cxnSpMkLst>
+            <pc:docMk/>
+            <pc:sldMk cId="2843157709" sldId="433"/>
+            <ac:cxnSpMk id="49" creationId="{BAB3B170-8502-4525-9CD5-6E6206926D5A}"/>
+          </ac:cxnSpMkLst>
+        </pc:cxnChg>
+        <pc:cxnChg chg="add mod">
+          <ac:chgData name="Federico Perini" userId="dd6016fc4604f770" providerId="LiveId" clId="{45311A73-93A6-4B44-9F30-450DD51E0866}" dt="2021-04-13T07:27:30.027" v="305" actId="14100"/>
+          <ac:cxnSpMkLst>
+            <pc:docMk/>
+            <pc:sldMk cId="2843157709" sldId="433"/>
+            <ac:cxnSpMk id="55" creationId="{65CF02BF-D5A7-402B-BA1B-E80DA402FAD9}"/>
+          </ac:cxnSpMkLst>
+        </pc:cxnChg>
+        <pc:cxnChg chg="add mod ord">
+          <ac:chgData name="Federico Perini" userId="dd6016fc4604f770" providerId="LiveId" clId="{45311A73-93A6-4B44-9F30-450DD51E0866}" dt="2021-04-13T07:30:59.856" v="396" actId="166"/>
+          <ac:cxnSpMkLst>
+            <pc:docMk/>
+            <pc:sldMk cId="2843157709" sldId="433"/>
+            <ac:cxnSpMk id="60" creationId="{DDB012EF-6910-4B4B-9967-32F9DB68CE01}"/>
+          </ac:cxnSpMkLst>
+        </pc:cxnChg>
+        <pc:cxnChg chg="add del mod">
+          <ac:chgData name="Federico Perini" userId="dd6016fc4604f770" providerId="LiveId" clId="{45311A73-93A6-4B44-9F30-450DD51E0866}" dt="2021-04-13T07:28:57.391" v="369" actId="478"/>
+          <ac:cxnSpMkLst>
+            <pc:docMk/>
+            <pc:sldMk cId="2843157709" sldId="433"/>
+            <ac:cxnSpMk id="64" creationId="{BA96626D-2F61-441A-8E1E-ECB1C751E25B}"/>
+          </ac:cxnSpMkLst>
+        </pc:cxnChg>
+        <pc:cxnChg chg="add mod ord">
+          <ac:chgData name="Federico Perini" userId="dd6016fc4604f770" providerId="LiveId" clId="{45311A73-93A6-4B44-9F30-450DD51E0866}" dt="2021-04-13T07:30:51.574" v="393" actId="14100"/>
+          <ac:cxnSpMkLst>
+            <pc:docMk/>
+            <pc:sldMk cId="2843157709" sldId="433"/>
+            <ac:cxnSpMk id="65" creationId="{DC32CFDB-56A0-442D-A27C-85A671DD574C}"/>
+          </ac:cxnSpMkLst>
+        </pc:cxnChg>
+        <pc:cxnChg chg="add mod">
+          <ac:chgData name="Federico Perini" userId="dd6016fc4604f770" providerId="LiveId" clId="{45311A73-93A6-4B44-9F30-450DD51E0866}" dt="2021-04-13T07:29:26.584" v="376" actId="14100"/>
+          <ac:cxnSpMkLst>
+            <pc:docMk/>
+            <pc:sldMk cId="2843157709" sldId="433"/>
+            <ac:cxnSpMk id="70" creationId="{8953562F-C7D9-4E28-A0C6-707427D82B9D}"/>
+          </ac:cxnSpMkLst>
+        </pc:cxnChg>
+        <pc:cxnChg chg="add mod">
+          <ac:chgData name="Federico Perini" userId="dd6016fc4604f770" providerId="LiveId" clId="{45311A73-93A6-4B44-9F30-450DD51E0866}" dt="2021-04-13T07:29:53.169" v="380" actId="1582"/>
+          <ac:cxnSpMkLst>
+            <pc:docMk/>
+            <pc:sldMk cId="2843157709" sldId="433"/>
+            <ac:cxnSpMk id="72" creationId="{30C6D1F9-8033-457A-B790-2FE9248A4B28}"/>
+          </ac:cxnSpMkLst>
+        </pc:cxnChg>
+        <pc:cxnChg chg="add mod">
+          <ac:chgData name="Federico Perini" userId="dd6016fc4604f770" providerId="LiveId" clId="{45311A73-93A6-4B44-9F30-450DD51E0866}" dt="2021-04-13T07:30:13.556" v="384" actId="1076"/>
+          <ac:cxnSpMkLst>
+            <pc:docMk/>
+            <pc:sldMk cId="2843157709" sldId="433"/>
+            <ac:cxnSpMk id="74" creationId="{AD19FD21-DB61-478E-9A2A-008D16CCC0BD}"/>
+          </ac:cxnSpMkLst>
+        </pc:cxnChg>
+        <pc:cxnChg chg="add">
+          <ac:chgData name="Federico Perini" userId="dd6016fc4604f770" providerId="LiveId" clId="{45311A73-93A6-4B44-9F30-450DD51E0866}" dt="2021-04-13T07:34:26.087" v="440" actId="11529"/>
+          <ac:cxnSpMkLst>
+            <pc:docMk/>
+            <pc:sldMk cId="2843157709" sldId="433"/>
+            <ac:cxnSpMk id="85" creationId="{038B7F5A-50BD-4100-93AF-6AB60ACB9648}"/>
+          </ac:cxnSpMkLst>
+        </pc:cxnChg>
+        <pc:cxnChg chg="add mod">
+          <ac:chgData name="Federico Perini" userId="dd6016fc4604f770" providerId="LiveId" clId="{45311A73-93A6-4B44-9F30-450DD51E0866}" dt="2021-04-13T07:34:45.855" v="447" actId="1038"/>
+          <ac:cxnSpMkLst>
+            <pc:docMk/>
+            <pc:sldMk cId="2843157709" sldId="433"/>
+            <ac:cxnSpMk id="87" creationId="{F4B3DE11-F99E-4636-B2A9-83D1F5D3F86E}"/>
+          </ac:cxnSpMkLst>
+        </pc:cxnChg>
+        <pc:cxnChg chg="add mod">
+          <ac:chgData name="Federico Perini" userId="dd6016fc4604f770" providerId="LiveId" clId="{45311A73-93A6-4B44-9F30-450DD51E0866}" dt="2021-04-13T07:35:12.243" v="463" actId="1582"/>
+          <ac:cxnSpMkLst>
+            <pc:docMk/>
+            <pc:sldMk cId="2843157709" sldId="433"/>
+            <ac:cxnSpMk id="90" creationId="{9C2634F4-84AB-4B9C-BDB7-465B195DD0ED}"/>
+          </ac:cxnSpMkLst>
+        </pc:cxnChg>
+        <pc:cxnChg chg="add mod">
+          <ac:chgData name="Federico Perini" userId="dd6016fc4604f770" providerId="LiveId" clId="{45311A73-93A6-4B44-9F30-450DD51E0866}" dt="2021-04-13T07:35:54.137" v="467" actId="692"/>
+          <ac:cxnSpMkLst>
+            <pc:docMk/>
+            <pc:sldMk cId="2843157709" sldId="433"/>
+            <ac:cxnSpMk id="93" creationId="{2B8D53CD-BB92-4468-8B42-E8242A3114A3}"/>
           </ac:cxnSpMkLst>
         </pc:cxnChg>
       </pc:sldChg>
@@ -5105,6 +5513,3150 @@
 </p:sld>
 </file>
 
+<file path=ppt/slides/slide2.xml><?xml version="1.0" encoding="utf-8"?>
+<p:sld xmlns:a="http://schemas.openxmlformats.org/drawingml/2006/main" xmlns:r="http://schemas.openxmlformats.org/officeDocument/2006/relationships" xmlns:p="http://schemas.openxmlformats.org/presentationml/2006/main">
+  <p:cSld>
+    <p:spTree>
+      <p:nvGrpSpPr>
+        <p:cNvPr id="1" name=""/>
+        <p:cNvGrpSpPr/>
+        <p:nvPr/>
+      </p:nvGrpSpPr>
+      <p:grpSpPr>
+        <a:xfrm>
+          <a:off x="0" y="0"/>
+          <a:ext cx="0" cy="0"/>
+          <a:chOff x="0" y="0"/>
+          <a:chExt cx="0" cy="0"/>
+        </a:xfrm>
+      </p:grpSpPr>
+      <p:sp>
+        <p:nvSpPr>
+          <p:cNvPr id="76" name="Freeform: Shape 75">
+            <a:extLst>
+              <a:ext uri="{FF2B5EF4-FFF2-40B4-BE49-F238E27FC236}">
+                <a16:creationId xmlns:a16="http://schemas.microsoft.com/office/drawing/2014/main" id="{C875A2FB-911C-4423-8DCD-31E9B8A97E69}"/>
+              </a:ext>
+            </a:extLst>
+          </p:cNvPr>
+          <p:cNvSpPr/>
+          <p:nvPr/>
+        </p:nvSpPr>
+        <p:spPr bwMode="auto">
+          <a:xfrm flipV="1">
+            <a:off x="5264150" y="1270000"/>
+            <a:ext cx="3187700" cy="1073150"/>
+          </a:xfrm>
+          <a:custGeom>
+            <a:avLst/>
+            <a:gdLst>
+              <a:gd name="connsiteX0" fmla="*/ 0 w 3187700"/>
+              <a:gd name="connsiteY0" fmla="*/ 0 h 1073150"/>
+              <a:gd name="connsiteX1" fmla="*/ 12700 w 3187700"/>
+              <a:gd name="connsiteY1" fmla="*/ 139700 h 1073150"/>
+              <a:gd name="connsiteX2" fmla="*/ 3155950 w 3187700"/>
+              <a:gd name="connsiteY2" fmla="*/ 1073150 h 1073150"/>
+              <a:gd name="connsiteX3" fmla="*/ 3187700 w 3187700"/>
+              <a:gd name="connsiteY3" fmla="*/ 596900 h 1073150"/>
+              <a:gd name="connsiteX4" fmla="*/ 0 w 3187700"/>
+              <a:gd name="connsiteY4" fmla="*/ 0 h 1073150"/>
+            </a:gdLst>
+            <a:ahLst/>
+            <a:cxnLst>
+              <a:cxn ang="0">
+                <a:pos x="connsiteX0" y="connsiteY0"/>
+              </a:cxn>
+              <a:cxn ang="0">
+                <a:pos x="connsiteX1" y="connsiteY1"/>
+              </a:cxn>
+              <a:cxn ang="0">
+                <a:pos x="connsiteX2" y="connsiteY2"/>
+              </a:cxn>
+              <a:cxn ang="0">
+                <a:pos x="connsiteX3" y="connsiteY3"/>
+              </a:cxn>
+              <a:cxn ang="0">
+                <a:pos x="connsiteX4" y="connsiteY4"/>
+              </a:cxn>
+            </a:cxnLst>
+            <a:rect l="l" t="t" r="r" b="b"/>
+            <a:pathLst>
+              <a:path w="3187700" h="1073150">
+                <a:moveTo>
+                  <a:pt x="0" y="0"/>
+                </a:moveTo>
+                <a:lnTo>
+                  <a:pt x="12700" y="139700"/>
+                </a:lnTo>
+                <a:lnTo>
+                  <a:pt x="3155950" y="1073150"/>
+                </a:lnTo>
+                <a:lnTo>
+                  <a:pt x="3187700" y="596900"/>
+                </a:lnTo>
+                <a:lnTo>
+                  <a:pt x="0" y="0"/>
+                </a:lnTo>
+                <a:close/>
+              </a:path>
+            </a:pathLst>
+          </a:custGeom>
+          <a:solidFill>
+            <a:srgbClr val="FFC000">
+              <a:alpha val="50196"/>
+            </a:srgbClr>
+          </a:solidFill>
+          <a:ln w="12700" cap="flat" cmpd="sng" algn="ctr">
+            <a:noFill/>
+            <a:prstDash val="solid"/>
+            <a:round/>
+            <a:headEnd type="none" w="med" len="med"/>
+            <a:tailEnd type="none" w="med" len="med"/>
+          </a:ln>
+          <a:effectLst/>
+        </p:spPr>
+        <p:txBody>
+          <a:bodyPr vert="horz" wrap="square" lIns="91440" tIns="45720" rIns="91440" bIns="45720" numCol="1" rtlCol="0" anchor="t" anchorCtr="0" compatLnSpc="1">
+            <a:prstTxWarp prst="textNoShape">
+              <a:avLst/>
+            </a:prstTxWarp>
+          </a:bodyPr>
+          <a:lstStyle/>
+          <a:p>
+            <a:pPr marL="0" marR="0" indent="0" algn="l" defTabSz="914400" rtl="0" eaLnBrk="0" fontAlgn="base" latinLnBrk="0" hangingPunct="0">
+              <a:lnSpc>
+                <a:spcPct val="100000"/>
+              </a:lnSpc>
+              <a:spcBef>
+                <a:spcPct val="0"/>
+              </a:spcBef>
+              <a:spcAft>
+                <a:spcPct val="0"/>
+              </a:spcAft>
+              <a:buClrTx/>
+              <a:buSzTx/>
+              <a:buFontTx/>
+              <a:buNone/>
+              <a:tabLst/>
+            </a:pPr>
+            <a:endParaRPr kumimoji="0" lang="en-US" sz="2400" b="0" i="0" u="none" strike="noStrike" cap="none" normalizeH="0" baseline="0">
+              <a:ln>
+                <a:noFill/>
+              </a:ln>
+              <a:solidFill>
+                <a:schemeClr val="tx1"/>
+              </a:solidFill>
+              <a:effectLst/>
+              <a:latin typeface="Tahoma" pitchFamily="-112" charset="0"/>
+            </a:endParaRPr>
+          </a:p>
+        </p:txBody>
+      </p:sp>
+      <p:sp>
+        <p:nvSpPr>
+          <p:cNvPr id="75" name="Freeform: Shape 74">
+            <a:extLst>
+              <a:ext uri="{FF2B5EF4-FFF2-40B4-BE49-F238E27FC236}">
+                <a16:creationId xmlns:a16="http://schemas.microsoft.com/office/drawing/2014/main" id="{2937CF8F-1219-4822-8DAA-9263CD56EC68}"/>
+              </a:ext>
+            </a:extLst>
+          </p:cNvPr>
+          <p:cNvSpPr/>
+          <p:nvPr/>
+        </p:nvSpPr>
+        <p:spPr bwMode="auto">
+          <a:xfrm>
+            <a:off x="5270500" y="2603500"/>
+            <a:ext cx="3187700" cy="1073150"/>
+          </a:xfrm>
+          <a:custGeom>
+            <a:avLst/>
+            <a:gdLst>
+              <a:gd name="connsiteX0" fmla="*/ 0 w 3187700"/>
+              <a:gd name="connsiteY0" fmla="*/ 0 h 1073150"/>
+              <a:gd name="connsiteX1" fmla="*/ 12700 w 3187700"/>
+              <a:gd name="connsiteY1" fmla="*/ 139700 h 1073150"/>
+              <a:gd name="connsiteX2" fmla="*/ 3155950 w 3187700"/>
+              <a:gd name="connsiteY2" fmla="*/ 1073150 h 1073150"/>
+              <a:gd name="connsiteX3" fmla="*/ 3187700 w 3187700"/>
+              <a:gd name="connsiteY3" fmla="*/ 596900 h 1073150"/>
+              <a:gd name="connsiteX4" fmla="*/ 0 w 3187700"/>
+              <a:gd name="connsiteY4" fmla="*/ 0 h 1073150"/>
+            </a:gdLst>
+            <a:ahLst/>
+            <a:cxnLst>
+              <a:cxn ang="0">
+                <a:pos x="connsiteX0" y="connsiteY0"/>
+              </a:cxn>
+              <a:cxn ang="0">
+                <a:pos x="connsiteX1" y="connsiteY1"/>
+              </a:cxn>
+              <a:cxn ang="0">
+                <a:pos x="connsiteX2" y="connsiteY2"/>
+              </a:cxn>
+              <a:cxn ang="0">
+                <a:pos x="connsiteX3" y="connsiteY3"/>
+              </a:cxn>
+              <a:cxn ang="0">
+                <a:pos x="connsiteX4" y="connsiteY4"/>
+              </a:cxn>
+            </a:cxnLst>
+            <a:rect l="l" t="t" r="r" b="b"/>
+            <a:pathLst>
+              <a:path w="3187700" h="1073150">
+                <a:moveTo>
+                  <a:pt x="0" y="0"/>
+                </a:moveTo>
+                <a:lnTo>
+                  <a:pt x="12700" y="139700"/>
+                </a:lnTo>
+                <a:lnTo>
+                  <a:pt x="3155950" y="1073150"/>
+                </a:lnTo>
+                <a:lnTo>
+                  <a:pt x="3187700" y="596900"/>
+                </a:lnTo>
+                <a:lnTo>
+                  <a:pt x="0" y="0"/>
+                </a:lnTo>
+                <a:close/>
+              </a:path>
+            </a:pathLst>
+          </a:custGeom>
+          <a:solidFill>
+            <a:srgbClr val="FFC000">
+              <a:alpha val="50196"/>
+            </a:srgbClr>
+          </a:solidFill>
+          <a:ln w="12700" cap="flat" cmpd="sng" algn="ctr">
+            <a:noFill/>
+            <a:prstDash val="solid"/>
+            <a:round/>
+            <a:headEnd type="none" w="med" len="med"/>
+            <a:tailEnd type="none" w="med" len="med"/>
+          </a:ln>
+          <a:effectLst/>
+        </p:spPr>
+        <p:txBody>
+          <a:bodyPr vert="horz" wrap="square" lIns="91440" tIns="45720" rIns="91440" bIns="45720" numCol="1" rtlCol="0" anchor="t" anchorCtr="0" compatLnSpc="1">
+            <a:prstTxWarp prst="textNoShape">
+              <a:avLst/>
+            </a:prstTxWarp>
+          </a:bodyPr>
+          <a:lstStyle/>
+          <a:p>
+            <a:pPr marL="0" marR="0" indent="0" algn="l" defTabSz="914400" rtl="0" eaLnBrk="0" fontAlgn="base" latinLnBrk="0" hangingPunct="0">
+              <a:lnSpc>
+                <a:spcPct val="100000"/>
+              </a:lnSpc>
+              <a:spcBef>
+                <a:spcPct val="0"/>
+              </a:spcBef>
+              <a:spcAft>
+                <a:spcPct val="0"/>
+              </a:spcAft>
+              <a:buClrTx/>
+              <a:buSzTx/>
+              <a:buFontTx/>
+              <a:buNone/>
+              <a:tabLst/>
+            </a:pPr>
+            <a:endParaRPr kumimoji="0" lang="en-US" sz="2400" b="0" i="0" u="none" strike="noStrike" cap="none" normalizeH="0" baseline="0">
+              <a:ln>
+                <a:noFill/>
+              </a:ln>
+              <a:solidFill>
+                <a:schemeClr val="tx1"/>
+              </a:solidFill>
+              <a:effectLst/>
+              <a:latin typeface="Tahoma" pitchFamily="-112" charset="0"/>
+            </a:endParaRPr>
+          </a:p>
+        </p:txBody>
+      </p:sp>
+      <p:cxnSp>
+        <p:nvCxnSpPr>
+          <p:cNvPr id="65" name="Straight Connector 64">
+            <a:extLst>
+              <a:ext uri="{FF2B5EF4-FFF2-40B4-BE49-F238E27FC236}">
+                <a16:creationId xmlns:a16="http://schemas.microsoft.com/office/drawing/2014/main" id="{DC32CFDB-56A0-442D-A27C-85A671DD574C}"/>
+              </a:ext>
+            </a:extLst>
+          </p:cNvPr>
+          <p:cNvCxnSpPr>
+            <a:cxnSpLocks/>
+          </p:cNvCxnSpPr>
+          <p:nvPr/>
+        </p:nvCxnSpPr>
+        <p:spPr bwMode="auto">
+          <a:xfrm flipV="1">
+            <a:off x="5271975" y="1263650"/>
+            <a:ext cx="3148125" cy="972493"/>
+          </a:xfrm>
+          <a:prstGeom prst="line">
+            <a:avLst/>
+          </a:prstGeom>
+          <a:solidFill>
+            <a:schemeClr val="accent1"/>
+          </a:solidFill>
+          <a:ln w="28575" cap="flat" cmpd="sng" algn="ctr">
+            <a:solidFill>
+              <a:srgbClr val="C00000"/>
+            </a:solidFill>
+            <a:prstDash val="solid"/>
+            <a:round/>
+            <a:headEnd type="none" w="med" len="med"/>
+            <a:tailEnd type="none" w="med" len="med"/>
+          </a:ln>
+          <a:effectLst/>
+        </p:spPr>
+      </p:cxnSp>
+      <p:sp>
+        <p:nvSpPr>
+          <p:cNvPr id="54" name="Freeform: Shape 53">
+            <a:extLst>
+              <a:ext uri="{FF2B5EF4-FFF2-40B4-BE49-F238E27FC236}">
+                <a16:creationId xmlns:a16="http://schemas.microsoft.com/office/drawing/2014/main" id="{D83B0A10-05E8-465E-B362-360F98679D3B}"/>
+              </a:ext>
+            </a:extLst>
+          </p:cNvPr>
+          <p:cNvSpPr/>
+          <p:nvPr/>
+        </p:nvSpPr>
+        <p:spPr bwMode="auto">
+          <a:xfrm>
+            <a:off x="2705100" y="1911350"/>
+            <a:ext cx="3409950" cy="1123950"/>
+          </a:xfrm>
+          <a:custGeom>
+            <a:avLst/>
+            <a:gdLst>
+              <a:gd name="connsiteX0" fmla="*/ 3403600 w 3409950"/>
+              <a:gd name="connsiteY0" fmla="*/ 330200 h 1123950"/>
+              <a:gd name="connsiteX1" fmla="*/ 1987550 w 3409950"/>
+              <a:gd name="connsiteY1" fmla="*/ 317500 h 1123950"/>
+              <a:gd name="connsiteX2" fmla="*/ 1200150 w 3409950"/>
+              <a:gd name="connsiteY2" fmla="*/ 285750 h 1123950"/>
+              <a:gd name="connsiteX3" fmla="*/ 768350 w 3409950"/>
+              <a:gd name="connsiteY3" fmla="*/ 260350 h 1123950"/>
+              <a:gd name="connsiteX4" fmla="*/ 260350 w 3409950"/>
+              <a:gd name="connsiteY4" fmla="*/ 190500 h 1123950"/>
+              <a:gd name="connsiteX5" fmla="*/ 63500 w 3409950"/>
+              <a:gd name="connsiteY5" fmla="*/ 114300 h 1123950"/>
+              <a:gd name="connsiteX6" fmla="*/ 0 w 3409950"/>
+              <a:gd name="connsiteY6" fmla="*/ 0 h 1123950"/>
+              <a:gd name="connsiteX7" fmla="*/ 0 w 3409950"/>
+              <a:gd name="connsiteY7" fmla="*/ 1123950 h 1123950"/>
+              <a:gd name="connsiteX8" fmla="*/ 50800 w 3409950"/>
+              <a:gd name="connsiteY8" fmla="*/ 1016000 h 1123950"/>
+              <a:gd name="connsiteX9" fmla="*/ 171450 w 3409950"/>
+              <a:gd name="connsiteY9" fmla="*/ 958850 h 1123950"/>
+              <a:gd name="connsiteX10" fmla="*/ 393700 w 3409950"/>
+              <a:gd name="connsiteY10" fmla="*/ 920750 h 1123950"/>
+              <a:gd name="connsiteX11" fmla="*/ 850900 w 3409950"/>
+              <a:gd name="connsiteY11" fmla="*/ 863600 h 1123950"/>
+              <a:gd name="connsiteX12" fmla="*/ 1428750 w 3409950"/>
+              <a:gd name="connsiteY12" fmla="*/ 819150 h 1123950"/>
+              <a:gd name="connsiteX13" fmla="*/ 2076450 w 3409950"/>
+              <a:gd name="connsiteY13" fmla="*/ 806450 h 1123950"/>
+              <a:gd name="connsiteX14" fmla="*/ 3409950 w 3409950"/>
+              <a:gd name="connsiteY14" fmla="*/ 793750 h 1123950"/>
+              <a:gd name="connsiteX15" fmla="*/ 3403600 w 3409950"/>
+              <a:gd name="connsiteY15" fmla="*/ 330200 h 1123950"/>
+            </a:gdLst>
+            <a:ahLst/>
+            <a:cxnLst>
+              <a:cxn ang="0">
+                <a:pos x="connsiteX0" y="connsiteY0"/>
+              </a:cxn>
+              <a:cxn ang="0">
+                <a:pos x="connsiteX1" y="connsiteY1"/>
+              </a:cxn>
+              <a:cxn ang="0">
+                <a:pos x="connsiteX2" y="connsiteY2"/>
+              </a:cxn>
+              <a:cxn ang="0">
+                <a:pos x="connsiteX3" y="connsiteY3"/>
+              </a:cxn>
+              <a:cxn ang="0">
+                <a:pos x="connsiteX4" y="connsiteY4"/>
+              </a:cxn>
+              <a:cxn ang="0">
+                <a:pos x="connsiteX5" y="connsiteY5"/>
+              </a:cxn>
+              <a:cxn ang="0">
+                <a:pos x="connsiteX6" y="connsiteY6"/>
+              </a:cxn>
+              <a:cxn ang="0">
+                <a:pos x="connsiteX7" y="connsiteY7"/>
+              </a:cxn>
+              <a:cxn ang="0">
+                <a:pos x="connsiteX8" y="connsiteY8"/>
+              </a:cxn>
+              <a:cxn ang="0">
+                <a:pos x="connsiteX9" y="connsiteY9"/>
+              </a:cxn>
+              <a:cxn ang="0">
+                <a:pos x="connsiteX10" y="connsiteY10"/>
+              </a:cxn>
+              <a:cxn ang="0">
+                <a:pos x="connsiteX11" y="connsiteY11"/>
+              </a:cxn>
+              <a:cxn ang="0">
+                <a:pos x="connsiteX12" y="connsiteY12"/>
+              </a:cxn>
+              <a:cxn ang="0">
+                <a:pos x="connsiteX13" y="connsiteY13"/>
+              </a:cxn>
+              <a:cxn ang="0">
+                <a:pos x="connsiteX14" y="connsiteY14"/>
+              </a:cxn>
+              <a:cxn ang="0">
+                <a:pos x="connsiteX15" y="connsiteY15"/>
+              </a:cxn>
+            </a:cxnLst>
+            <a:rect l="l" t="t" r="r" b="b"/>
+            <a:pathLst>
+              <a:path w="3409950" h="1123950">
+                <a:moveTo>
+                  <a:pt x="3403600" y="330200"/>
+                </a:moveTo>
+                <a:lnTo>
+                  <a:pt x="1987550" y="317500"/>
+                </a:lnTo>
+                <a:lnTo>
+                  <a:pt x="1200150" y="285750"/>
+                </a:lnTo>
+                <a:lnTo>
+                  <a:pt x="768350" y="260350"/>
+                </a:lnTo>
+                <a:lnTo>
+                  <a:pt x="260350" y="190500"/>
+                </a:lnTo>
+                <a:lnTo>
+                  <a:pt x="63500" y="114300"/>
+                </a:lnTo>
+                <a:lnTo>
+                  <a:pt x="0" y="0"/>
+                </a:lnTo>
+                <a:lnTo>
+                  <a:pt x="0" y="1123950"/>
+                </a:lnTo>
+                <a:lnTo>
+                  <a:pt x="50800" y="1016000"/>
+                </a:lnTo>
+                <a:lnTo>
+                  <a:pt x="171450" y="958850"/>
+                </a:lnTo>
+                <a:lnTo>
+                  <a:pt x="393700" y="920750"/>
+                </a:lnTo>
+                <a:lnTo>
+                  <a:pt x="850900" y="863600"/>
+                </a:lnTo>
+                <a:lnTo>
+                  <a:pt x="1428750" y="819150"/>
+                </a:lnTo>
+                <a:lnTo>
+                  <a:pt x="2076450" y="806450"/>
+                </a:lnTo>
+                <a:lnTo>
+                  <a:pt x="3409950" y="793750"/>
+                </a:lnTo>
+                <a:cubicBezTo>
+                  <a:pt x="3407833" y="643467"/>
+                  <a:pt x="3405717" y="493183"/>
+                  <a:pt x="3403600" y="330200"/>
+                </a:cubicBezTo>
+                <a:close/>
+              </a:path>
+            </a:pathLst>
+          </a:custGeom>
+          <a:gradFill flip="none" rotWithShape="1">
+            <a:gsLst>
+              <a:gs pos="0">
+                <a:schemeClr val="accent1">
+                  <a:lumMod val="5000"/>
+                  <a:lumOff val="95000"/>
+                </a:schemeClr>
+              </a:gs>
+              <a:gs pos="74000">
+                <a:schemeClr val="accent1">
+                  <a:lumMod val="45000"/>
+                  <a:lumOff val="55000"/>
+                </a:schemeClr>
+              </a:gs>
+              <a:gs pos="83000">
+                <a:schemeClr val="accent1">
+                  <a:lumMod val="45000"/>
+                  <a:lumOff val="55000"/>
+                </a:schemeClr>
+              </a:gs>
+              <a:gs pos="100000">
+                <a:schemeClr val="accent1">
+                  <a:lumMod val="30000"/>
+                  <a:lumOff val="70000"/>
+                </a:schemeClr>
+              </a:gs>
+            </a:gsLst>
+            <a:lin ang="10800000" scaled="1"/>
+            <a:tileRect/>
+          </a:gradFill>
+          <a:ln w="12700" cap="flat" cmpd="sng" algn="ctr">
+            <a:noFill/>
+            <a:prstDash val="solid"/>
+            <a:round/>
+            <a:headEnd type="none" w="med" len="med"/>
+            <a:tailEnd type="none" w="med" len="med"/>
+          </a:ln>
+          <a:effectLst/>
+        </p:spPr>
+        <p:txBody>
+          <a:bodyPr vert="horz" wrap="square" lIns="91440" tIns="45720" rIns="91440" bIns="45720" numCol="1" rtlCol="0" anchor="t" anchorCtr="0" compatLnSpc="1">
+            <a:prstTxWarp prst="textNoShape">
+              <a:avLst/>
+            </a:prstTxWarp>
+          </a:bodyPr>
+          <a:lstStyle/>
+          <a:p>
+            <a:pPr marL="0" marR="0" indent="0" algn="l" defTabSz="914400" rtl="0" eaLnBrk="0" fontAlgn="base" latinLnBrk="0" hangingPunct="0">
+              <a:lnSpc>
+                <a:spcPct val="100000"/>
+              </a:lnSpc>
+              <a:spcBef>
+                <a:spcPct val="0"/>
+              </a:spcBef>
+              <a:spcAft>
+                <a:spcPct val="0"/>
+              </a:spcAft>
+              <a:buClrTx/>
+              <a:buSzTx/>
+              <a:buFontTx/>
+              <a:buNone/>
+              <a:tabLst/>
+            </a:pPr>
+            <a:endParaRPr kumimoji="0" lang="en-US" sz="2400" b="0" i="0" u="none" strike="noStrike" cap="none" normalizeH="0" baseline="0">
+              <a:ln>
+                <a:noFill/>
+              </a:ln>
+              <a:solidFill>
+                <a:schemeClr val="tx1"/>
+              </a:solidFill>
+              <a:effectLst/>
+              <a:latin typeface="Tahoma" pitchFamily="-112" charset="0"/>
+            </a:endParaRPr>
+          </a:p>
+        </p:txBody>
+      </p:sp>
+      <p:sp>
+        <p:nvSpPr>
+          <p:cNvPr id="47" name="Oval 46">
+            <a:extLst>
+              <a:ext uri="{FF2B5EF4-FFF2-40B4-BE49-F238E27FC236}">
+                <a16:creationId xmlns:a16="http://schemas.microsoft.com/office/drawing/2014/main" id="{30006478-F2C2-4EB9-BFFD-79B11F094D70}"/>
+              </a:ext>
+            </a:extLst>
+          </p:cNvPr>
+          <p:cNvSpPr/>
+          <p:nvPr/>
+        </p:nvSpPr>
+        <p:spPr bwMode="auto">
+          <a:xfrm>
+            <a:off x="3973065" y="2041428"/>
+            <a:ext cx="323887" cy="864089"/>
+          </a:xfrm>
+          <a:prstGeom prst="ellipse">
+            <a:avLst/>
+          </a:prstGeom>
+          <a:solidFill>
+            <a:schemeClr val="bg1">
+              <a:lumMod val="75000"/>
+            </a:schemeClr>
+          </a:solidFill>
+          <a:ln w="3175" cap="flat" cmpd="sng" algn="ctr">
+            <a:solidFill>
+              <a:schemeClr val="tx1"/>
+            </a:solidFill>
+            <a:prstDash val="solid"/>
+            <a:round/>
+            <a:headEnd type="none" w="med" len="med"/>
+            <a:tailEnd type="none" w="med" len="med"/>
+          </a:ln>
+          <a:effectLst/>
+        </p:spPr>
+        <p:txBody>
+          <a:bodyPr vert="horz" wrap="square" lIns="91440" tIns="45720" rIns="91440" bIns="45720" numCol="1" rtlCol="0" anchor="t" anchorCtr="0" compatLnSpc="1">
+            <a:prstTxWarp prst="textNoShape">
+              <a:avLst/>
+            </a:prstTxWarp>
+          </a:bodyPr>
+          <a:lstStyle/>
+          <a:p>
+            <a:pPr marL="0" marR="0" indent="0" algn="l" defTabSz="914400" rtl="0" eaLnBrk="0" fontAlgn="base" latinLnBrk="0" hangingPunct="0">
+              <a:lnSpc>
+                <a:spcPct val="100000"/>
+              </a:lnSpc>
+              <a:spcBef>
+                <a:spcPct val="0"/>
+              </a:spcBef>
+              <a:spcAft>
+                <a:spcPct val="0"/>
+              </a:spcAft>
+              <a:buClrTx/>
+              <a:buSzTx/>
+              <a:buFontTx/>
+              <a:buNone/>
+              <a:tabLst/>
+            </a:pPr>
+            <a:endParaRPr kumimoji="0" lang="en-US" sz="2400" b="0" i="0" u="none" strike="noStrike" cap="none" normalizeH="0" baseline="0">
+              <a:ln>
+                <a:noFill/>
+              </a:ln>
+              <a:solidFill>
+                <a:schemeClr val="tx1"/>
+              </a:solidFill>
+              <a:effectLst/>
+              <a:latin typeface="Tahoma" pitchFamily="-112" charset="0"/>
+            </a:endParaRPr>
+          </a:p>
+        </p:txBody>
+      </p:sp>
+      <p:sp>
+        <p:nvSpPr>
+          <p:cNvPr id="33" name="Rectangle 32">
+            <a:extLst>
+              <a:ext uri="{FF2B5EF4-FFF2-40B4-BE49-F238E27FC236}">
+                <a16:creationId xmlns:a16="http://schemas.microsoft.com/office/drawing/2014/main" id="{29169F80-F0BB-4608-87E7-E27560D3FE64}"/>
+              </a:ext>
+            </a:extLst>
+          </p:cNvPr>
+          <p:cNvSpPr/>
+          <p:nvPr/>
+        </p:nvSpPr>
+        <p:spPr bwMode="auto">
+          <a:xfrm>
+            <a:off x="2829024" y="2905571"/>
+            <a:ext cx="2448272" cy="288032"/>
+          </a:xfrm>
+          <a:prstGeom prst="rect">
+            <a:avLst/>
+          </a:prstGeom>
+          <a:pattFill prst="ltUpDiag">
+            <a:fgClr>
+              <a:schemeClr val="accent1"/>
+            </a:fgClr>
+            <a:bgClr>
+              <a:schemeClr val="bg1"/>
+            </a:bgClr>
+          </a:pattFill>
+          <a:ln w="12700" cap="flat" cmpd="sng" algn="ctr">
+            <a:noFill/>
+            <a:prstDash val="solid"/>
+            <a:round/>
+            <a:headEnd type="none" w="med" len="med"/>
+            <a:tailEnd type="none" w="med" len="med"/>
+          </a:ln>
+          <a:effectLst/>
+        </p:spPr>
+        <p:txBody>
+          <a:bodyPr vert="horz" wrap="square" lIns="91440" tIns="45720" rIns="91440" bIns="45720" numCol="1" rtlCol="0" anchor="t" anchorCtr="0" compatLnSpc="1">
+            <a:prstTxWarp prst="textNoShape">
+              <a:avLst/>
+            </a:prstTxWarp>
+          </a:bodyPr>
+          <a:lstStyle/>
+          <a:p>
+            <a:pPr marL="0" marR="0" indent="0" algn="l" defTabSz="914400" rtl="0" eaLnBrk="0" fontAlgn="base" latinLnBrk="0" hangingPunct="0">
+              <a:lnSpc>
+                <a:spcPct val="100000"/>
+              </a:lnSpc>
+              <a:spcBef>
+                <a:spcPct val="0"/>
+              </a:spcBef>
+              <a:spcAft>
+                <a:spcPct val="0"/>
+              </a:spcAft>
+              <a:buClrTx/>
+              <a:buSzTx/>
+              <a:buFontTx/>
+              <a:buNone/>
+              <a:tabLst/>
+            </a:pPr>
+            <a:endParaRPr kumimoji="0" lang="en-US" sz="2400" b="0" i="0" u="none" strike="noStrike" cap="none" normalizeH="0" baseline="0">
+              <a:ln>
+                <a:noFill/>
+              </a:ln>
+              <a:solidFill>
+                <a:schemeClr val="tx1"/>
+              </a:solidFill>
+              <a:effectLst/>
+              <a:latin typeface="Tahoma" pitchFamily="-112" charset="0"/>
+            </a:endParaRPr>
+          </a:p>
+        </p:txBody>
+      </p:sp>
+      <p:sp>
+        <p:nvSpPr>
+          <p:cNvPr id="9" name="Rectangle 8">
+            <a:extLst>
+              <a:ext uri="{FF2B5EF4-FFF2-40B4-BE49-F238E27FC236}">
+                <a16:creationId xmlns:a16="http://schemas.microsoft.com/office/drawing/2014/main" id="{A78AAF1C-2ACF-4BA7-AABA-7BC2A14D6212}"/>
+              </a:ext>
+            </a:extLst>
+          </p:cNvPr>
+          <p:cNvSpPr/>
+          <p:nvPr/>
+        </p:nvSpPr>
+        <p:spPr bwMode="auto">
+          <a:xfrm>
+            <a:off x="2829024" y="1753443"/>
+            <a:ext cx="2448272" cy="288032"/>
+          </a:xfrm>
+          <a:prstGeom prst="rect">
+            <a:avLst/>
+          </a:prstGeom>
+          <a:pattFill prst="ltUpDiag">
+            <a:fgClr>
+              <a:schemeClr val="accent1"/>
+            </a:fgClr>
+            <a:bgClr>
+              <a:schemeClr val="bg1"/>
+            </a:bgClr>
+          </a:pattFill>
+          <a:ln w="12700" cap="flat" cmpd="sng" algn="ctr">
+            <a:noFill/>
+            <a:prstDash val="solid"/>
+            <a:round/>
+            <a:headEnd type="none" w="med" len="med"/>
+            <a:tailEnd type="none" w="med" len="med"/>
+          </a:ln>
+          <a:effectLst/>
+        </p:spPr>
+        <p:txBody>
+          <a:bodyPr vert="horz" wrap="square" lIns="91440" tIns="45720" rIns="91440" bIns="45720" numCol="1" rtlCol="0" anchor="t" anchorCtr="0" compatLnSpc="1">
+            <a:prstTxWarp prst="textNoShape">
+              <a:avLst/>
+            </a:prstTxWarp>
+          </a:bodyPr>
+          <a:lstStyle/>
+          <a:p>
+            <a:pPr marL="0" marR="0" indent="0" algn="l" defTabSz="914400" rtl="0" eaLnBrk="0" fontAlgn="base" latinLnBrk="0" hangingPunct="0">
+              <a:lnSpc>
+                <a:spcPct val="100000"/>
+              </a:lnSpc>
+              <a:spcBef>
+                <a:spcPct val="0"/>
+              </a:spcBef>
+              <a:spcAft>
+                <a:spcPct val="0"/>
+              </a:spcAft>
+              <a:buClrTx/>
+              <a:buSzTx/>
+              <a:buFontTx/>
+              <a:buNone/>
+              <a:tabLst/>
+            </a:pPr>
+            <a:endParaRPr kumimoji="0" lang="en-US" sz="2400" b="0" i="0" u="none" strike="noStrike" cap="none" normalizeH="0" baseline="0">
+              <a:ln>
+                <a:noFill/>
+              </a:ln>
+              <a:solidFill>
+                <a:schemeClr val="tx1"/>
+              </a:solidFill>
+              <a:effectLst/>
+              <a:latin typeface="Tahoma" pitchFamily="-112" charset="0"/>
+            </a:endParaRPr>
+          </a:p>
+        </p:txBody>
+      </p:sp>
+      <p:cxnSp>
+        <p:nvCxnSpPr>
+          <p:cNvPr id="4" name="Straight Connector 3">
+            <a:extLst>
+              <a:ext uri="{FF2B5EF4-FFF2-40B4-BE49-F238E27FC236}">
+                <a16:creationId xmlns:a16="http://schemas.microsoft.com/office/drawing/2014/main" id="{7921328B-2C09-4125-AAA5-D3D09144D788}"/>
+              </a:ext>
+            </a:extLst>
+          </p:cNvPr>
+          <p:cNvCxnSpPr/>
+          <p:nvPr/>
+        </p:nvCxnSpPr>
+        <p:spPr bwMode="auto">
+          <a:xfrm>
+            <a:off x="1820912" y="2473523"/>
+            <a:ext cx="6048672" cy="0"/>
+          </a:xfrm>
+          <a:prstGeom prst="line">
+            <a:avLst/>
+          </a:prstGeom>
+          <a:solidFill>
+            <a:schemeClr val="accent1"/>
+          </a:solidFill>
+          <a:ln w="3175" cap="flat" cmpd="sng" algn="ctr">
+            <a:solidFill>
+              <a:schemeClr val="tx1"/>
+            </a:solidFill>
+            <a:prstDash val="dashDot"/>
+            <a:round/>
+            <a:headEnd type="none" w="med" len="med"/>
+            <a:tailEnd type="none" w="med" len="med"/>
+          </a:ln>
+          <a:effectLst/>
+        </p:spPr>
+      </p:cxnSp>
+      <p:sp>
+        <p:nvSpPr>
+          <p:cNvPr id="10" name="Oval 9">
+            <a:extLst>
+              <a:ext uri="{FF2B5EF4-FFF2-40B4-BE49-F238E27FC236}">
+                <a16:creationId xmlns:a16="http://schemas.microsoft.com/office/drawing/2014/main" id="{B68D206D-33D7-4C9C-9E42-3496689EA8EE}"/>
+              </a:ext>
+            </a:extLst>
+          </p:cNvPr>
+          <p:cNvSpPr/>
+          <p:nvPr/>
+        </p:nvSpPr>
+        <p:spPr bwMode="auto">
+          <a:xfrm>
+            <a:off x="2721012" y="1825451"/>
+            <a:ext cx="216024" cy="215978"/>
+          </a:xfrm>
+          <a:prstGeom prst="ellipse">
+            <a:avLst/>
+          </a:prstGeom>
+          <a:pattFill prst="ltUpDiag">
+            <a:fgClr>
+              <a:schemeClr val="accent1"/>
+            </a:fgClr>
+            <a:bgClr>
+              <a:schemeClr val="bg1"/>
+            </a:bgClr>
+          </a:pattFill>
+          <a:ln w="12700" cap="flat" cmpd="sng" algn="ctr">
+            <a:noFill/>
+            <a:prstDash val="solid"/>
+            <a:round/>
+            <a:headEnd type="none" w="med" len="med"/>
+            <a:tailEnd type="none" w="med" len="med"/>
+          </a:ln>
+          <a:effectLst/>
+        </p:spPr>
+        <p:txBody>
+          <a:bodyPr vert="horz" wrap="square" lIns="91440" tIns="45720" rIns="91440" bIns="45720" numCol="1" rtlCol="0" anchor="t" anchorCtr="0" compatLnSpc="1">
+            <a:prstTxWarp prst="textNoShape">
+              <a:avLst/>
+            </a:prstTxWarp>
+          </a:bodyPr>
+          <a:lstStyle/>
+          <a:p>
+            <a:pPr marL="0" marR="0" indent="0" algn="l" defTabSz="914400" rtl="0" eaLnBrk="0" fontAlgn="base" latinLnBrk="0" hangingPunct="0">
+              <a:lnSpc>
+                <a:spcPct val="100000"/>
+              </a:lnSpc>
+              <a:spcBef>
+                <a:spcPct val="0"/>
+              </a:spcBef>
+              <a:spcAft>
+                <a:spcPct val="0"/>
+              </a:spcAft>
+              <a:buClrTx/>
+              <a:buSzTx/>
+              <a:buFontTx/>
+              <a:buNone/>
+              <a:tabLst/>
+            </a:pPr>
+            <a:endParaRPr kumimoji="0" lang="en-US" sz="2400" b="0" i="0" u="none" strike="noStrike" cap="none" normalizeH="0" baseline="0">
+              <a:ln>
+                <a:noFill/>
+              </a:ln>
+              <a:solidFill>
+                <a:schemeClr val="tx1"/>
+              </a:solidFill>
+              <a:effectLst/>
+              <a:latin typeface="Tahoma" pitchFamily="-112" charset="0"/>
+            </a:endParaRPr>
+          </a:p>
+        </p:txBody>
+      </p:sp>
+      <p:sp>
+        <p:nvSpPr>
+          <p:cNvPr id="38" name="Oval 37">
+            <a:extLst>
+              <a:ext uri="{FF2B5EF4-FFF2-40B4-BE49-F238E27FC236}">
+                <a16:creationId xmlns:a16="http://schemas.microsoft.com/office/drawing/2014/main" id="{8F74858C-0AEF-43D1-9BF9-48BFBF7816FB}"/>
+              </a:ext>
+            </a:extLst>
+          </p:cNvPr>
+          <p:cNvSpPr/>
+          <p:nvPr/>
+        </p:nvSpPr>
+        <p:spPr bwMode="auto">
+          <a:xfrm>
+            <a:off x="2721012" y="2905570"/>
+            <a:ext cx="216024" cy="215978"/>
+          </a:xfrm>
+          <a:prstGeom prst="ellipse">
+            <a:avLst/>
+          </a:prstGeom>
+          <a:pattFill prst="ltUpDiag">
+            <a:fgClr>
+              <a:schemeClr val="accent1"/>
+            </a:fgClr>
+            <a:bgClr>
+              <a:schemeClr val="bg1"/>
+            </a:bgClr>
+          </a:pattFill>
+          <a:ln w="12700" cap="flat" cmpd="sng" algn="ctr">
+            <a:noFill/>
+            <a:prstDash val="solid"/>
+            <a:round/>
+            <a:headEnd type="none" w="med" len="med"/>
+            <a:tailEnd type="none" w="med" len="med"/>
+          </a:ln>
+          <a:effectLst/>
+        </p:spPr>
+        <p:txBody>
+          <a:bodyPr vert="horz" wrap="square" lIns="91440" tIns="45720" rIns="91440" bIns="45720" numCol="1" rtlCol="0" anchor="t" anchorCtr="0" compatLnSpc="1">
+            <a:prstTxWarp prst="textNoShape">
+              <a:avLst/>
+            </a:prstTxWarp>
+          </a:bodyPr>
+          <a:lstStyle/>
+          <a:p>
+            <a:pPr marL="0" marR="0" indent="0" algn="l" defTabSz="914400" rtl="0" eaLnBrk="0" fontAlgn="base" latinLnBrk="0" hangingPunct="0">
+              <a:lnSpc>
+                <a:spcPct val="100000"/>
+              </a:lnSpc>
+              <a:spcBef>
+                <a:spcPct val="0"/>
+              </a:spcBef>
+              <a:spcAft>
+                <a:spcPct val="0"/>
+              </a:spcAft>
+              <a:buClrTx/>
+              <a:buSzTx/>
+              <a:buFontTx/>
+              <a:buNone/>
+              <a:tabLst/>
+            </a:pPr>
+            <a:endParaRPr kumimoji="0" lang="en-US" sz="2400" b="0" i="0" u="none" strike="noStrike" cap="none" normalizeH="0" baseline="0">
+              <a:ln>
+                <a:noFill/>
+              </a:ln>
+              <a:solidFill>
+                <a:schemeClr val="tx1"/>
+              </a:solidFill>
+              <a:effectLst/>
+              <a:latin typeface="Tahoma" pitchFamily="-112" charset="0"/>
+            </a:endParaRPr>
+          </a:p>
+        </p:txBody>
+      </p:sp>
+      <p:sp>
+        <p:nvSpPr>
+          <p:cNvPr id="39" name="Rectangle 38">
+            <a:extLst>
+              <a:ext uri="{FF2B5EF4-FFF2-40B4-BE49-F238E27FC236}">
+                <a16:creationId xmlns:a16="http://schemas.microsoft.com/office/drawing/2014/main" id="{B9E68D01-A5A6-43AD-9DF4-828B444DBBA4}"/>
+              </a:ext>
+            </a:extLst>
+          </p:cNvPr>
+          <p:cNvSpPr/>
+          <p:nvPr/>
+        </p:nvSpPr>
+        <p:spPr bwMode="auto">
+          <a:xfrm>
+            <a:off x="2721012" y="1753442"/>
+            <a:ext cx="1548172" cy="216025"/>
+          </a:xfrm>
+          <a:prstGeom prst="rect">
+            <a:avLst/>
+          </a:prstGeom>
+          <a:pattFill prst="ltUpDiag">
+            <a:fgClr>
+              <a:schemeClr val="accent1"/>
+            </a:fgClr>
+            <a:bgClr>
+              <a:schemeClr val="bg1"/>
+            </a:bgClr>
+          </a:pattFill>
+          <a:ln w="12700" cap="flat" cmpd="sng" algn="ctr">
+            <a:noFill/>
+            <a:prstDash val="solid"/>
+            <a:round/>
+            <a:headEnd type="none" w="med" len="med"/>
+            <a:tailEnd type="none" w="med" len="med"/>
+          </a:ln>
+          <a:effectLst/>
+        </p:spPr>
+        <p:txBody>
+          <a:bodyPr vert="horz" wrap="square" lIns="91440" tIns="45720" rIns="91440" bIns="45720" numCol="1" rtlCol="0" anchor="t" anchorCtr="0" compatLnSpc="1">
+            <a:prstTxWarp prst="textNoShape">
+              <a:avLst/>
+            </a:prstTxWarp>
+          </a:bodyPr>
+          <a:lstStyle/>
+          <a:p>
+            <a:pPr marL="0" marR="0" indent="0" algn="l" defTabSz="914400" rtl="0" eaLnBrk="0" fontAlgn="base" latinLnBrk="0" hangingPunct="0">
+              <a:lnSpc>
+                <a:spcPct val="100000"/>
+              </a:lnSpc>
+              <a:spcBef>
+                <a:spcPct val="0"/>
+              </a:spcBef>
+              <a:spcAft>
+                <a:spcPct val="0"/>
+              </a:spcAft>
+              <a:buClrTx/>
+              <a:buSzTx/>
+              <a:buFontTx/>
+              <a:buNone/>
+              <a:tabLst/>
+            </a:pPr>
+            <a:endParaRPr kumimoji="0" lang="en-US" sz="2400" b="0" i="0" u="none" strike="noStrike" cap="none" normalizeH="0" baseline="0">
+              <a:ln>
+                <a:noFill/>
+              </a:ln>
+              <a:solidFill>
+                <a:schemeClr val="tx1"/>
+              </a:solidFill>
+              <a:effectLst/>
+              <a:latin typeface="Tahoma" pitchFamily="-112" charset="0"/>
+            </a:endParaRPr>
+          </a:p>
+        </p:txBody>
+      </p:sp>
+      <p:sp>
+        <p:nvSpPr>
+          <p:cNvPr id="42" name="Rectangle 41">
+            <a:extLst>
+              <a:ext uri="{FF2B5EF4-FFF2-40B4-BE49-F238E27FC236}">
+                <a16:creationId xmlns:a16="http://schemas.microsoft.com/office/drawing/2014/main" id="{40D67641-89CD-4D3F-B1BB-9D28FBB736C0}"/>
+              </a:ext>
+            </a:extLst>
+          </p:cNvPr>
+          <p:cNvSpPr/>
+          <p:nvPr/>
+        </p:nvSpPr>
+        <p:spPr bwMode="auto">
+          <a:xfrm>
+            <a:off x="2721012" y="2977580"/>
+            <a:ext cx="1548172" cy="216025"/>
+          </a:xfrm>
+          <a:prstGeom prst="rect">
+            <a:avLst/>
+          </a:prstGeom>
+          <a:pattFill prst="ltUpDiag">
+            <a:fgClr>
+              <a:schemeClr val="accent1"/>
+            </a:fgClr>
+            <a:bgClr>
+              <a:schemeClr val="bg1"/>
+            </a:bgClr>
+          </a:pattFill>
+          <a:ln w="12700" cap="flat" cmpd="sng" algn="ctr">
+            <a:noFill/>
+            <a:prstDash val="solid"/>
+            <a:round/>
+            <a:headEnd type="none" w="med" len="med"/>
+            <a:tailEnd type="none" w="med" len="med"/>
+          </a:ln>
+          <a:effectLst/>
+        </p:spPr>
+        <p:txBody>
+          <a:bodyPr vert="horz" wrap="square" lIns="91440" tIns="45720" rIns="91440" bIns="45720" numCol="1" rtlCol="0" anchor="t" anchorCtr="0" compatLnSpc="1">
+            <a:prstTxWarp prst="textNoShape">
+              <a:avLst/>
+            </a:prstTxWarp>
+          </a:bodyPr>
+          <a:lstStyle/>
+          <a:p>
+            <a:pPr marL="0" marR="0" indent="0" algn="l" defTabSz="914400" rtl="0" eaLnBrk="0" fontAlgn="base" latinLnBrk="0" hangingPunct="0">
+              <a:lnSpc>
+                <a:spcPct val="100000"/>
+              </a:lnSpc>
+              <a:spcBef>
+                <a:spcPct val="0"/>
+              </a:spcBef>
+              <a:spcAft>
+                <a:spcPct val="0"/>
+              </a:spcAft>
+              <a:buClrTx/>
+              <a:buSzTx/>
+              <a:buFontTx/>
+              <a:buNone/>
+              <a:tabLst/>
+            </a:pPr>
+            <a:endParaRPr kumimoji="0" lang="en-US" sz="2400" b="0" i="0" u="none" strike="noStrike" cap="none" normalizeH="0" baseline="0">
+              <a:ln>
+                <a:noFill/>
+              </a:ln>
+              <a:solidFill>
+                <a:schemeClr val="tx1"/>
+              </a:solidFill>
+              <a:effectLst/>
+              <a:latin typeface="Tahoma" pitchFamily="-112" charset="0"/>
+            </a:endParaRPr>
+          </a:p>
+        </p:txBody>
+      </p:sp>
+      <p:sp>
+        <p:nvSpPr>
+          <p:cNvPr id="11" name="Arc 10">
+            <a:extLst>
+              <a:ext uri="{FF2B5EF4-FFF2-40B4-BE49-F238E27FC236}">
+                <a16:creationId xmlns:a16="http://schemas.microsoft.com/office/drawing/2014/main" id="{9EA85414-DB47-4070-9511-E70324BD5938}"/>
+              </a:ext>
+            </a:extLst>
+          </p:cNvPr>
+          <p:cNvSpPr/>
+          <p:nvPr/>
+        </p:nvSpPr>
+        <p:spPr bwMode="auto">
+          <a:xfrm>
+            <a:off x="2721012" y="1825451"/>
+            <a:ext cx="216024" cy="215977"/>
+          </a:xfrm>
+          <a:prstGeom prst="arc">
+            <a:avLst>
+              <a:gd name="adj1" fmla="val 5274234"/>
+              <a:gd name="adj2" fmla="val 10969007"/>
+            </a:avLst>
+          </a:prstGeom>
+          <a:noFill/>
+          <a:ln w="12700" cap="flat" cmpd="sng" algn="ctr">
+            <a:solidFill>
+              <a:schemeClr val="tx1"/>
+            </a:solidFill>
+            <a:prstDash val="solid"/>
+            <a:round/>
+            <a:headEnd type="none" w="med" len="med"/>
+            <a:tailEnd type="none" w="med" len="med"/>
+          </a:ln>
+          <a:effectLst/>
+        </p:spPr>
+        <p:txBody>
+          <a:bodyPr vert="horz" wrap="square" lIns="91440" tIns="45720" rIns="91440" bIns="45720" numCol="1" rtlCol="0" anchor="t" anchorCtr="0" compatLnSpc="1">
+            <a:prstTxWarp prst="textNoShape">
+              <a:avLst/>
+            </a:prstTxWarp>
+          </a:bodyPr>
+          <a:lstStyle/>
+          <a:p>
+            <a:pPr marL="0" marR="0" indent="0" algn="l" defTabSz="914400" rtl="0" eaLnBrk="0" fontAlgn="base" latinLnBrk="0" hangingPunct="0">
+              <a:lnSpc>
+                <a:spcPct val="100000"/>
+              </a:lnSpc>
+              <a:spcBef>
+                <a:spcPct val="0"/>
+              </a:spcBef>
+              <a:spcAft>
+                <a:spcPct val="0"/>
+              </a:spcAft>
+              <a:buClrTx/>
+              <a:buSzTx/>
+              <a:buFontTx/>
+              <a:buNone/>
+              <a:tabLst/>
+            </a:pPr>
+            <a:endParaRPr kumimoji="0" lang="en-US" sz="2400" b="0" i="0" u="none" strike="noStrike" cap="none" normalizeH="0" baseline="0">
+              <a:ln>
+                <a:noFill/>
+              </a:ln>
+              <a:solidFill>
+                <a:schemeClr val="tx1"/>
+              </a:solidFill>
+              <a:effectLst/>
+              <a:latin typeface="Tahoma" pitchFamily="-112" charset="0"/>
+            </a:endParaRPr>
+          </a:p>
+        </p:txBody>
+      </p:sp>
+      <p:sp>
+        <p:nvSpPr>
+          <p:cNvPr id="44" name="Arc 43">
+            <a:extLst>
+              <a:ext uri="{FF2B5EF4-FFF2-40B4-BE49-F238E27FC236}">
+                <a16:creationId xmlns:a16="http://schemas.microsoft.com/office/drawing/2014/main" id="{5488D58A-C57D-462C-A2C5-931DD08C0835}"/>
+              </a:ext>
+            </a:extLst>
+          </p:cNvPr>
+          <p:cNvSpPr/>
+          <p:nvPr/>
+        </p:nvSpPr>
+        <p:spPr bwMode="auto">
+          <a:xfrm rot="5400000">
+            <a:off x="2721035" y="2905548"/>
+            <a:ext cx="216024" cy="215977"/>
+          </a:xfrm>
+          <a:prstGeom prst="arc">
+            <a:avLst>
+              <a:gd name="adj1" fmla="val 5274234"/>
+              <a:gd name="adj2" fmla="val 10969007"/>
+            </a:avLst>
+          </a:prstGeom>
+          <a:noFill/>
+          <a:ln w="12700" cap="flat" cmpd="sng" algn="ctr">
+            <a:solidFill>
+              <a:schemeClr val="tx1"/>
+            </a:solidFill>
+            <a:prstDash val="solid"/>
+            <a:round/>
+            <a:headEnd type="none" w="med" len="med"/>
+            <a:tailEnd type="none" w="med" len="med"/>
+          </a:ln>
+          <a:effectLst/>
+        </p:spPr>
+        <p:txBody>
+          <a:bodyPr vert="horz" wrap="square" lIns="91440" tIns="45720" rIns="91440" bIns="45720" numCol="1" rtlCol="0" anchor="t" anchorCtr="0" compatLnSpc="1">
+            <a:prstTxWarp prst="textNoShape">
+              <a:avLst/>
+            </a:prstTxWarp>
+          </a:bodyPr>
+          <a:lstStyle/>
+          <a:p>
+            <a:pPr marL="0" marR="0" indent="0" algn="l" defTabSz="914400" rtl="0" eaLnBrk="0" fontAlgn="base" latinLnBrk="0" hangingPunct="0">
+              <a:lnSpc>
+                <a:spcPct val="100000"/>
+              </a:lnSpc>
+              <a:spcBef>
+                <a:spcPct val="0"/>
+              </a:spcBef>
+              <a:spcAft>
+                <a:spcPct val="0"/>
+              </a:spcAft>
+              <a:buClrTx/>
+              <a:buSzTx/>
+              <a:buFontTx/>
+              <a:buNone/>
+              <a:tabLst/>
+            </a:pPr>
+            <a:endParaRPr kumimoji="0" lang="en-US" sz="2400" b="0" i="0" u="none" strike="noStrike" cap="none" normalizeH="0" baseline="0">
+              <a:ln>
+                <a:noFill/>
+              </a:ln>
+              <a:solidFill>
+                <a:schemeClr val="tx1"/>
+              </a:solidFill>
+              <a:effectLst/>
+              <a:latin typeface="Tahoma" pitchFamily="-112" charset="0"/>
+            </a:endParaRPr>
+          </a:p>
+        </p:txBody>
+      </p:sp>
+      <p:cxnSp>
+        <p:nvCxnSpPr>
+          <p:cNvPr id="30" name="Straight Connector 29">
+            <a:extLst>
+              <a:ext uri="{FF2B5EF4-FFF2-40B4-BE49-F238E27FC236}">
+                <a16:creationId xmlns:a16="http://schemas.microsoft.com/office/drawing/2014/main" id="{420131B1-DB1A-4213-BED5-FB75D48EC56C}"/>
+              </a:ext>
+            </a:extLst>
+          </p:cNvPr>
+          <p:cNvCxnSpPr/>
+          <p:nvPr/>
+        </p:nvCxnSpPr>
+        <p:spPr bwMode="auto">
+          <a:xfrm>
+            <a:off x="2829024" y="2905571"/>
+            <a:ext cx="2448272" cy="0"/>
+          </a:xfrm>
+          <a:prstGeom prst="line">
+            <a:avLst/>
+          </a:prstGeom>
+          <a:solidFill>
+            <a:schemeClr val="accent1"/>
+          </a:solidFill>
+          <a:ln w="12700" cap="flat" cmpd="sng" algn="ctr">
+            <a:solidFill>
+              <a:schemeClr val="tx1"/>
+            </a:solidFill>
+            <a:prstDash val="solid"/>
+            <a:round/>
+            <a:headEnd type="none" w="med" len="med"/>
+            <a:tailEnd type="none" w="med" len="med"/>
+          </a:ln>
+          <a:effectLst/>
+        </p:spPr>
+      </p:cxnSp>
+      <p:cxnSp>
+        <p:nvCxnSpPr>
+          <p:cNvPr id="8" name="Straight Connector 7">
+            <a:extLst>
+              <a:ext uri="{FF2B5EF4-FFF2-40B4-BE49-F238E27FC236}">
+                <a16:creationId xmlns:a16="http://schemas.microsoft.com/office/drawing/2014/main" id="{6C6AE182-4CEA-420F-B476-E11F3BA976A2}"/>
+              </a:ext>
+            </a:extLst>
+          </p:cNvPr>
+          <p:cNvCxnSpPr/>
+          <p:nvPr/>
+        </p:nvCxnSpPr>
+        <p:spPr bwMode="auto">
+          <a:xfrm>
+            <a:off x="2829024" y="2041475"/>
+            <a:ext cx="2448272" cy="0"/>
+          </a:xfrm>
+          <a:prstGeom prst="line">
+            <a:avLst/>
+          </a:prstGeom>
+          <a:solidFill>
+            <a:schemeClr val="accent1"/>
+          </a:solidFill>
+          <a:ln w="12700" cap="flat" cmpd="sng" algn="ctr">
+            <a:solidFill>
+              <a:schemeClr val="tx1"/>
+            </a:solidFill>
+            <a:prstDash val="solid"/>
+            <a:round/>
+            <a:headEnd type="none" w="med" len="med"/>
+            <a:tailEnd type="none" w="med" len="med"/>
+          </a:ln>
+          <a:effectLst/>
+        </p:spPr>
+      </p:cxnSp>
+      <p:cxnSp>
+        <p:nvCxnSpPr>
+          <p:cNvPr id="14" name="Straight Connector 13">
+            <a:extLst>
+              <a:ext uri="{FF2B5EF4-FFF2-40B4-BE49-F238E27FC236}">
+                <a16:creationId xmlns:a16="http://schemas.microsoft.com/office/drawing/2014/main" id="{D6F4BFD0-4EBE-4A03-AE7C-DFB8001D33C0}"/>
+              </a:ext>
+            </a:extLst>
+          </p:cNvPr>
+          <p:cNvCxnSpPr>
+            <a:stCxn id="11" idx="2"/>
+          </p:cNvCxnSpPr>
+          <p:nvPr/>
+        </p:nvCxnSpPr>
+        <p:spPr bwMode="auto">
+          <a:xfrm flipH="1" flipV="1">
+            <a:off x="2721012" y="1753442"/>
+            <a:ext cx="131" cy="174690"/>
+          </a:xfrm>
+          <a:prstGeom prst="line">
+            <a:avLst/>
+          </a:prstGeom>
+          <a:solidFill>
+            <a:schemeClr val="accent1"/>
+          </a:solidFill>
+          <a:ln w="12700" cap="flat" cmpd="sng" algn="ctr">
+            <a:solidFill>
+              <a:schemeClr val="tx1"/>
+            </a:solidFill>
+            <a:prstDash val="solid"/>
+            <a:round/>
+            <a:headEnd type="none" w="med" len="med"/>
+            <a:tailEnd type="none" w="med" len="med"/>
+          </a:ln>
+          <a:effectLst/>
+        </p:spPr>
+      </p:cxnSp>
+      <p:cxnSp>
+        <p:nvCxnSpPr>
+          <p:cNvPr id="45" name="Straight Connector 44">
+            <a:extLst>
+              <a:ext uri="{FF2B5EF4-FFF2-40B4-BE49-F238E27FC236}">
+                <a16:creationId xmlns:a16="http://schemas.microsoft.com/office/drawing/2014/main" id="{1BE5D484-2BB9-4D8F-A8B0-16AA8E722A8C}"/>
+              </a:ext>
+            </a:extLst>
+          </p:cNvPr>
+          <p:cNvCxnSpPr/>
+          <p:nvPr/>
+        </p:nvCxnSpPr>
+        <p:spPr bwMode="auto">
+          <a:xfrm flipH="1" flipV="1">
+            <a:off x="2720793" y="3013536"/>
+            <a:ext cx="131" cy="174690"/>
+          </a:xfrm>
+          <a:prstGeom prst="line">
+            <a:avLst/>
+          </a:prstGeom>
+          <a:solidFill>
+            <a:schemeClr val="accent1"/>
+          </a:solidFill>
+          <a:ln w="12700" cap="flat" cmpd="sng" algn="ctr">
+            <a:solidFill>
+              <a:schemeClr val="tx1"/>
+            </a:solidFill>
+            <a:prstDash val="solid"/>
+            <a:round/>
+            <a:headEnd type="none" w="med" len="med"/>
+            <a:tailEnd type="none" w="med" len="med"/>
+          </a:ln>
+          <a:effectLst/>
+        </p:spPr>
+      </p:cxnSp>
+      <p:cxnSp>
+        <p:nvCxnSpPr>
+          <p:cNvPr id="16" name="Straight Connector 15">
+            <a:extLst>
+              <a:ext uri="{FF2B5EF4-FFF2-40B4-BE49-F238E27FC236}">
+                <a16:creationId xmlns:a16="http://schemas.microsoft.com/office/drawing/2014/main" id="{87D2A089-4ED3-43BE-AC83-9498EE71977C}"/>
+              </a:ext>
+            </a:extLst>
+          </p:cNvPr>
+          <p:cNvCxnSpPr/>
+          <p:nvPr/>
+        </p:nvCxnSpPr>
+        <p:spPr bwMode="auto">
+          <a:xfrm>
+            <a:off x="5277296" y="1537419"/>
+            <a:ext cx="0" cy="2194560"/>
+          </a:xfrm>
+          <a:prstGeom prst="line">
+            <a:avLst/>
+          </a:prstGeom>
+          <a:solidFill>
+            <a:schemeClr val="accent1"/>
+          </a:solidFill>
+          <a:ln w="3175" cap="flat" cmpd="sng" algn="ctr">
+            <a:solidFill>
+              <a:schemeClr val="tx1"/>
+            </a:solidFill>
+            <a:prstDash val="solid"/>
+            <a:round/>
+            <a:headEnd type="none" w="med" len="med"/>
+            <a:tailEnd type="none" w="med" len="med"/>
+          </a:ln>
+          <a:effectLst/>
+        </p:spPr>
+      </p:cxnSp>
+      <p:cxnSp>
+        <p:nvCxnSpPr>
+          <p:cNvPr id="22" name="Straight Arrow Connector 21">
+            <a:extLst>
+              <a:ext uri="{FF2B5EF4-FFF2-40B4-BE49-F238E27FC236}">
+                <a16:creationId xmlns:a16="http://schemas.microsoft.com/office/drawing/2014/main" id="{1161C517-2388-44AB-BF33-CF9C6F4F225A}"/>
+              </a:ext>
+            </a:extLst>
+          </p:cNvPr>
+          <p:cNvCxnSpPr/>
+          <p:nvPr/>
+        </p:nvCxnSpPr>
+        <p:spPr bwMode="auto">
+          <a:xfrm>
+            <a:off x="3495098" y="2041428"/>
+            <a:ext cx="0" cy="864096"/>
+          </a:xfrm>
+          <a:prstGeom prst="straightConnector1">
+            <a:avLst/>
+          </a:prstGeom>
+          <a:solidFill>
+            <a:schemeClr val="accent1"/>
+          </a:solidFill>
+          <a:ln w="12700" cap="flat" cmpd="sng" algn="ctr">
+            <a:solidFill>
+              <a:schemeClr val="tx1"/>
+            </a:solidFill>
+            <a:prstDash val="solid"/>
+            <a:round/>
+            <a:headEnd type="stealth" w="med" len="med"/>
+            <a:tailEnd type="stealth" w="med" len="med"/>
+          </a:ln>
+          <a:effectLst/>
+        </p:spPr>
+      </p:cxnSp>
+      <p:sp>
+        <p:nvSpPr>
+          <p:cNvPr id="24" name="TextBox 23">
+            <a:extLst>
+              <a:ext uri="{FF2B5EF4-FFF2-40B4-BE49-F238E27FC236}">
+                <a16:creationId xmlns:a16="http://schemas.microsoft.com/office/drawing/2014/main" id="{D900886B-0F11-44EB-8359-FF229BAE92FB}"/>
+              </a:ext>
+            </a:extLst>
+          </p:cNvPr>
+          <p:cNvSpPr txBox="1"/>
+          <p:nvPr/>
+        </p:nvSpPr>
+        <p:spPr>
+          <a:xfrm>
+            <a:off x="3019489" y="2106276"/>
+            <a:ext cx="486030" cy="338554"/>
+          </a:xfrm>
+          <a:prstGeom prst="rect">
+            <a:avLst/>
+          </a:prstGeom>
+          <a:noFill/>
+        </p:spPr>
+        <p:txBody>
+          <a:bodyPr wrap="none" rtlCol="0">
+            <a:spAutoFit/>
+          </a:bodyPr>
+          <a:lstStyle/>
+          <a:p>
+            <a:r>
+              <a:rPr lang="en-US" sz="1600" i="1" dirty="0" err="1">
+                <a:latin typeface="Times New Roman" panose="02020603050405020304" pitchFamily="18" charset="0"/>
+                <a:cs typeface="Times New Roman" panose="02020603050405020304" pitchFamily="18" charset="0"/>
+              </a:rPr>
+              <a:t>d</a:t>
+            </a:r>
+            <a:r>
+              <a:rPr lang="en-US" sz="1600" baseline="-25000" dirty="0" err="1">
+                <a:latin typeface="Times New Roman" panose="02020603050405020304" pitchFamily="18" charset="0"/>
+                <a:cs typeface="Times New Roman" panose="02020603050405020304" pitchFamily="18" charset="0"/>
+              </a:rPr>
+              <a:t>noz</a:t>
+            </a:r>
+            <a:endParaRPr lang="en-US" sz="1600" baseline="-25000" dirty="0">
+              <a:latin typeface="Times New Roman" panose="02020603050405020304" pitchFamily="18" charset="0"/>
+              <a:cs typeface="Times New Roman" panose="02020603050405020304" pitchFamily="18" charset="0"/>
+            </a:endParaRPr>
+          </a:p>
+        </p:txBody>
+      </p:sp>
+      <mc:AlternateContent xmlns:mc="http://schemas.openxmlformats.org/markup-compatibility/2006">
+        <mc:Choice xmlns:a14="http://schemas.microsoft.com/office/drawing/2010/main" Requires="a14">
+          <p:sp>
+            <p:nvSpPr>
+              <p:cNvPr id="27" name="TextBox 26">
+                <a:extLst>
+                  <a:ext uri="{FF2B5EF4-FFF2-40B4-BE49-F238E27FC236}">
+                    <a16:creationId xmlns:a16="http://schemas.microsoft.com/office/drawing/2014/main" id="{DD3D9F46-54F7-41C6-8064-C5869699B704}"/>
+                  </a:ext>
+                </a:extLst>
+              </p:cNvPr>
+              <p:cNvSpPr txBox="1"/>
+              <p:nvPr/>
+            </p:nvSpPr>
+            <p:spPr>
+              <a:xfrm>
+                <a:off x="3163228" y="1158470"/>
+                <a:ext cx="1619674" cy="522964"/>
+              </a:xfrm>
+              <a:prstGeom prst="rect">
+                <a:avLst/>
+              </a:prstGeom>
+              <a:noFill/>
+            </p:spPr>
+            <p:txBody>
+              <a:bodyPr wrap="none" lIns="0" tIns="0" rIns="0" bIns="0" rtlCol="0">
+                <a:spAutoFit/>
+              </a:bodyPr>
+              <a:lstStyle/>
+              <a:p>
+                <a14:m>
+                  <m:oMathPara xmlns:m="http://schemas.openxmlformats.org/officeDocument/2006/math">
+                    <m:oMathParaPr>
+                      <m:jc m:val="centerGroup"/>
+                    </m:oMathParaPr>
+                    <m:oMath xmlns:m="http://schemas.openxmlformats.org/officeDocument/2006/math">
+                      <m:sSub>
+                        <m:sSubPr>
+                          <m:ctrlPr>
+                            <a:rPr lang="en-US" sz="2000" b="0" i="1" smtClean="0">
+                              <a:latin typeface="Cambria Math" panose="02040503050406030204" pitchFamily="18" charset="0"/>
+                            </a:rPr>
+                          </m:ctrlPr>
+                        </m:sSubPr>
+                        <m:e>
+                          <m:r>
+                            <a:rPr lang="en-US" sz="2000" b="0" i="1" smtClean="0">
+                              <a:latin typeface="Cambria Math" panose="02040503050406030204" pitchFamily="18" charset="0"/>
+                            </a:rPr>
+                            <m:t>𝐴</m:t>
+                          </m:r>
+                        </m:e>
+                        <m:sub>
+                          <m:r>
+                            <a:rPr lang="en-US" sz="2000" b="0" i="1" smtClean="0">
+                              <a:latin typeface="Cambria Math" panose="02040503050406030204" pitchFamily="18" charset="0"/>
+                            </a:rPr>
+                            <m:t>𝑛𝑜𝑧</m:t>
+                          </m:r>
+                        </m:sub>
+                      </m:sSub>
+                      <m:r>
+                        <a:rPr lang="en-US" sz="2000" b="0" i="1" smtClean="0">
+                          <a:latin typeface="Cambria Math" panose="02040503050406030204" pitchFamily="18" charset="0"/>
+                        </a:rPr>
+                        <m:t>=</m:t>
+                      </m:r>
+                      <m:f>
+                        <m:fPr>
+                          <m:ctrlPr>
+                            <a:rPr lang="en-US" sz="2000" b="0" i="1" smtClean="0">
+                              <a:latin typeface="Cambria Math" panose="02040503050406030204" pitchFamily="18" charset="0"/>
+                            </a:rPr>
+                          </m:ctrlPr>
+                        </m:fPr>
+                        <m:num>
+                          <m:r>
+                            <a:rPr lang="en-US" sz="2000" b="0" i="1" smtClean="0">
+                              <a:latin typeface="Cambria Math" panose="02040503050406030204" pitchFamily="18" charset="0"/>
+                            </a:rPr>
+                            <m:t>𝜋</m:t>
+                          </m:r>
+                        </m:num>
+                        <m:den>
+                          <m:r>
+                            <a:rPr lang="en-US" sz="2000" b="0" i="1" smtClean="0">
+                              <a:latin typeface="Cambria Math" panose="02040503050406030204" pitchFamily="18" charset="0"/>
+                            </a:rPr>
+                            <m:t>4</m:t>
+                          </m:r>
+                        </m:den>
+                      </m:f>
+                      <m:sSubSup>
+                        <m:sSubSupPr>
+                          <m:ctrlPr>
+                            <a:rPr lang="en-US" sz="2000" b="0" i="1" smtClean="0">
+                              <a:latin typeface="Cambria Math" panose="02040503050406030204" pitchFamily="18" charset="0"/>
+                            </a:rPr>
+                          </m:ctrlPr>
+                        </m:sSubSupPr>
+                        <m:e>
+                          <m:r>
+                            <a:rPr lang="en-US" sz="2000" b="0" i="1" smtClean="0">
+                              <a:latin typeface="Cambria Math" panose="02040503050406030204" pitchFamily="18" charset="0"/>
+                            </a:rPr>
+                            <m:t>𝑑</m:t>
+                          </m:r>
+                        </m:e>
+                        <m:sub>
+                          <m:r>
+                            <a:rPr lang="en-US" sz="2000" b="0" i="1" smtClean="0">
+                              <a:latin typeface="Cambria Math" panose="02040503050406030204" pitchFamily="18" charset="0"/>
+                            </a:rPr>
+                            <m:t>𝑛𝑜𝑧</m:t>
+                          </m:r>
+                        </m:sub>
+                        <m:sup>
+                          <m:r>
+                            <a:rPr lang="en-US" sz="2000" b="0" i="1" smtClean="0">
+                              <a:latin typeface="Cambria Math" panose="02040503050406030204" pitchFamily="18" charset="0"/>
+                            </a:rPr>
+                            <m:t>2</m:t>
+                          </m:r>
+                        </m:sup>
+                      </m:sSubSup>
+                    </m:oMath>
+                  </m:oMathPara>
+                </a14:m>
+                <a:endParaRPr lang="en-US" sz="2000" dirty="0"/>
+              </a:p>
+            </p:txBody>
+          </p:sp>
+        </mc:Choice>
+        <mc:Fallback>
+          <p:sp>
+            <p:nvSpPr>
+              <p:cNvPr id="27" name="TextBox 26">
+                <a:extLst>
+                  <a:ext uri="{FF2B5EF4-FFF2-40B4-BE49-F238E27FC236}">
+                    <a16:creationId xmlns:a16="http://schemas.microsoft.com/office/drawing/2014/main" id="{DD3D9F46-54F7-41C6-8064-C5869699B704}"/>
+                  </a:ext>
+                </a:extLst>
+              </p:cNvPr>
+              <p:cNvSpPr txBox="1">
+                <a:spLocks noRot="1" noChangeAspect="1" noMove="1" noResize="1" noEditPoints="1" noAdjustHandles="1" noChangeArrowheads="1" noChangeShapeType="1" noTextEdit="1"/>
+              </p:cNvSpPr>
+              <p:nvPr/>
+            </p:nvSpPr>
+            <p:spPr>
+              <a:xfrm>
+                <a:off x="3163228" y="1158470"/>
+                <a:ext cx="1619674" cy="522964"/>
+              </a:xfrm>
+              <a:prstGeom prst="rect">
+                <a:avLst/>
+              </a:prstGeom>
+              <a:blipFill>
+                <a:blip r:embed="rId2"/>
+                <a:stretch>
+                  <a:fillRect/>
+                </a:stretch>
+              </a:blipFill>
+            </p:spPr>
+            <p:txBody>
+              <a:bodyPr/>
+              <a:lstStyle/>
+              <a:p>
+                <a:r>
+                  <a:rPr lang="en-US">
+                    <a:noFill/>
+                  </a:rPr>
+                  <a:t> </a:t>
+                </a:r>
+              </a:p>
+            </p:txBody>
+          </p:sp>
+        </mc:Fallback>
+      </mc:AlternateContent>
+      <p:cxnSp>
+        <p:nvCxnSpPr>
+          <p:cNvPr id="49" name="Straight Connector 48">
+            <a:extLst>
+              <a:ext uri="{FF2B5EF4-FFF2-40B4-BE49-F238E27FC236}">
+                <a16:creationId xmlns:a16="http://schemas.microsoft.com/office/drawing/2014/main" id="{BAB3B170-8502-4525-9CD5-6E6206926D5A}"/>
+              </a:ext>
+            </a:extLst>
+          </p:cNvPr>
+          <p:cNvCxnSpPr>
+            <a:cxnSpLocks/>
+          </p:cNvCxnSpPr>
+          <p:nvPr/>
+        </p:nvCxnSpPr>
+        <p:spPr bwMode="auto">
+          <a:xfrm>
+            <a:off x="3892550" y="1612900"/>
+            <a:ext cx="242458" cy="737837"/>
+          </a:xfrm>
+          <a:prstGeom prst="line">
+            <a:avLst/>
+          </a:prstGeom>
+          <a:solidFill>
+            <a:schemeClr val="accent1"/>
+          </a:solidFill>
+          <a:ln w="12700" cap="flat" cmpd="sng" algn="ctr">
+            <a:solidFill>
+              <a:schemeClr val="tx1"/>
+            </a:solidFill>
+            <a:prstDash val="solid"/>
+            <a:round/>
+            <a:headEnd type="diamond" w="med" len="med"/>
+            <a:tailEnd type="diamond" w="med" len="med"/>
+          </a:ln>
+          <a:effectLst/>
+        </p:spPr>
+      </p:cxnSp>
+      <p:sp>
+        <p:nvSpPr>
+          <p:cNvPr id="52" name="Freeform: Shape 51">
+            <a:extLst>
+              <a:ext uri="{FF2B5EF4-FFF2-40B4-BE49-F238E27FC236}">
+                <a16:creationId xmlns:a16="http://schemas.microsoft.com/office/drawing/2014/main" id="{8C0053EF-069D-4EA9-93BD-0D16AAD3655B}"/>
+              </a:ext>
+            </a:extLst>
+          </p:cNvPr>
+          <p:cNvSpPr/>
+          <p:nvPr/>
+        </p:nvSpPr>
+        <p:spPr bwMode="auto">
+          <a:xfrm>
+            <a:off x="2707564" y="1912284"/>
+            <a:ext cx="3416300" cy="330200"/>
+          </a:xfrm>
+          <a:custGeom>
+            <a:avLst/>
+            <a:gdLst>
+              <a:gd name="connsiteX0" fmla="*/ 3416300 w 3416300"/>
+              <a:gd name="connsiteY0" fmla="*/ 330200 h 330200"/>
+              <a:gd name="connsiteX1" fmla="*/ 1682750 w 3416300"/>
+              <a:gd name="connsiteY1" fmla="*/ 311150 h 330200"/>
+              <a:gd name="connsiteX2" fmla="*/ 304800 w 3416300"/>
+              <a:gd name="connsiteY2" fmla="*/ 196850 h 330200"/>
+              <a:gd name="connsiteX3" fmla="*/ 0 w 3416300"/>
+              <a:gd name="connsiteY3" fmla="*/ 0 h 330200"/>
+            </a:gdLst>
+            <a:ahLst/>
+            <a:cxnLst>
+              <a:cxn ang="0">
+                <a:pos x="connsiteX0" y="connsiteY0"/>
+              </a:cxn>
+              <a:cxn ang="0">
+                <a:pos x="connsiteX1" y="connsiteY1"/>
+              </a:cxn>
+              <a:cxn ang="0">
+                <a:pos x="connsiteX2" y="connsiteY2"/>
+              </a:cxn>
+              <a:cxn ang="0">
+                <a:pos x="connsiteX3" y="connsiteY3"/>
+              </a:cxn>
+            </a:cxnLst>
+            <a:rect l="l" t="t" r="r" b="b"/>
+            <a:pathLst>
+              <a:path w="3416300" h="330200">
+                <a:moveTo>
+                  <a:pt x="3416300" y="330200"/>
+                </a:moveTo>
+                <a:lnTo>
+                  <a:pt x="1682750" y="311150"/>
+                </a:lnTo>
+                <a:cubicBezTo>
+                  <a:pt x="1164167" y="288925"/>
+                  <a:pt x="585258" y="248708"/>
+                  <a:pt x="304800" y="196850"/>
+                </a:cubicBezTo>
+                <a:cubicBezTo>
+                  <a:pt x="24342" y="144992"/>
+                  <a:pt x="12171" y="72496"/>
+                  <a:pt x="0" y="0"/>
+                </a:cubicBezTo>
+              </a:path>
+            </a:pathLst>
+          </a:custGeom>
+          <a:noFill/>
+          <a:ln w="3175" cap="flat" cmpd="sng" algn="ctr">
+            <a:solidFill>
+              <a:schemeClr val="accent5">
+                <a:lumMod val="50000"/>
+              </a:schemeClr>
+            </a:solidFill>
+            <a:prstDash val="solid"/>
+            <a:round/>
+            <a:headEnd type="none" w="med" len="med"/>
+            <a:tailEnd type="none" w="med" len="med"/>
+          </a:ln>
+          <a:effectLst/>
+        </p:spPr>
+        <p:txBody>
+          <a:bodyPr vert="horz" wrap="square" lIns="91440" tIns="45720" rIns="91440" bIns="45720" numCol="1" rtlCol="0" anchor="t" anchorCtr="0" compatLnSpc="1">
+            <a:prstTxWarp prst="textNoShape">
+              <a:avLst/>
+            </a:prstTxWarp>
+          </a:bodyPr>
+          <a:lstStyle/>
+          <a:p>
+            <a:pPr marL="0" marR="0" indent="0" algn="l" defTabSz="914400" rtl="0" eaLnBrk="0" fontAlgn="base" latinLnBrk="0" hangingPunct="0">
+              <a:lnSpc>
+                <a:spcPct val="100000"/>
+              </a:lnSpc>
+              <a:spcBef>
+                <a:spcPct val="0"/>
+              </a:spcBef>
+              <a:spcAft>
+                <a:spcPct val="0"/>
+              </a:spcAft>
+              <a:buClrTx/>
+              <a:buSzTx/>
+              <a:buFontTx/>
+              <a:buNone/>
+              <a:tabLst/>
+            </a:pPr>
+            <a:endParaRPr kumimoji="0" lang="en-US" sz="2400" b="0" i="0" u="none" strike="noStrike" cap="none" normalizeH="0" baseline="0">
+              <a:ln>
+                <a:noFill/>
+              </a:ln>
+              <a:solidFill>
+                <a:schemeClr val="tx1"/>
+              </a:solidFill>
+              <a:effectLst/>
+              <a:latin typeface="Tahoma" pitchFamily="-112" charset="0"/>
+            </a:endParaRPr>
+          </a:p>
+        </p:txBody>
+      </p:sp>
+      <p:sp>
+        <p:nvSpPr>
+          <p:cNvPr id="53" name="Freeform: Shape 52">
+            <a:extLst>
+              <a:ext uri="{FF2B5EF4-FFF2-40B4-BE49-F238E27FC236}">
+                <a16:creationId xmlns:a16="http://schemas.microsoft.com/office/drawing/2014/main" id="{2D43FE73-23A7-4090-A3BE-DC5BEFBEBC9C}"/>
+              </a:ext>
+            </a:extLst>
+          </p:cNvPr>
+          <p:cNvSpPr/>
+          <p:nvPr/>
+        </p:nvSpPr>
+        <p:spPr bwMode="auto">
+          <a:xfrm flipV="1">
+            <a:off x="2707564" y="2704461"/>
+            <a:ext cx="3416300" cy="330200"/>
+          </a:xfrm>
+          <a:custGeom>
+            <a:avLst/>
+            <a:gdLst>
+              <a:gd name="connsiteX0" fmla="*/ 3416300 w 3416300"/>
+              <a:gd name="connsiteY0" fmla="*/ 330200 h 330200"/>
+              <a:gd name="connsiteX1" fmla="*/ 1682750 w 3416300"/>
+              <a:gd name="connsiteY1" fmla="*/ 311150 h 330200"/>
+              <a:gd name="connsiteX2" fmla="*/ 304800 w 3416300"/>
+              <a:gd name="connsiteY2" fmla="*/ 196850 h 330200"/>
+              <a:gd name="connsiteX3" fmla="*/ 0 w 3416300"/>
+              <a:gd name="connsiteY3" fmla="*/ 0 h 330200"/>
+            </a:gdLst>
+            <a:ahLst/>
+            <a:cxnLst>
+              <a:cxn ang="0">
+                <a:pos x="connsiteX0" y="connsiteY0"/>
+              </a:cxn>
+              <a:cxn ang="0">
+                <a:pos x="connsiteX1" y="connsiteY1"/>
+              </a:cxn>
+              <a:cxn ang="0">
+                <a:pos x="connsiteX2" y="connsiteY2"/>
+              </a:cxn>
+              <a:cxn ang="0">
+                <a:pos x="connsiteX3" y="connsiteY3"/>
+              </a:cxn>
+            </a:cxnLst>
+            <a:rect l="l" t="t" r="r" b="b"/>
+            <a:pathLst>
+              <a:path w="3416300" h="330200">
+                <a:moveTo>
+                  <a:pt x="3416300" y="330200"/>
+                </a:moveTo>
+                <a:lnTo>
+                  <a:pt x="1682750" y="311150"/>
+                </a:lnTo>
+                <a:cubicBezTo>
+                  <a:pt x="1164167" y="288925"/>
+                  <a:pt x="585258" y="248708"/>
+                  <a:pt x="304800" y="196850"/>
+                </a:cubicBezTo>
+                <a:cubicBezTo>
+                  <a:pt x="24342" y="144992"/>
+                  <a:pt x="12171" y="72496"/>
+                  <a:pt x="0" y="0"/>
+                </a:cubicBezTo>
+              </a:path>
+            </a:pathLst>
+          </a:custGeom>
+          <a:noFill/>
+          <a:ln w="3175" cap="flat" cmpd="sng" algn="ctr">
+            <a:solidFill>
+              <a:schemeClr val="accent5">
+                <a:lumMod val="50000"/>
+              </a:schemeClr>
+            </a:solidFill>
+            <a:prstDash val="solid"/>
+            <a:round/>
+            <a:headEnd type="none" w="med" len="med"/>
+            <a:tailEnd type="none" w="med" len="med"/>
+          </a:ln>
+          <a:effectLst/>
+        </p:spPr>
+        <p:txBody>
+          <a:bodyPr vert="horz" wrap="square" lIns="91440" tIns="45720" rIns="91440" bIns="45720" numCol="1" rtlCol="0" anchor="t" anchorCtr="0" compatLnSpc="1">
+            <a:prstTxWarp prst="textNoShape">
+              <a:avLst/>
+            </a:prstTxWarp>
+          </a:bodyPr>
+          <a:lstStyle/>
+          <a:p>
+            <a:pPr marL="0" marR="0" indent="0" algn="l" defTabSz="914400" rtl="0" eaLnBrk="0" fontAlgn="base" latinLnBrk="0" hangingPunct="0">
+              <a:lnSpc>
+                <a:spcPct val="100000"/>
+              </a:lnSpc>
+              <a:spcBef>
+                <a:spcPct val="0"/>
+              </a:spcBef>
+              <a:spcAft>
+                <a:spcPct val="0"/>
+              </a:spcAft>
+              <a:buClrTx/>
+              <a:buSzTx/>
+              <a:buFontTx/>
+              <a:buNone/>
+              <a:tabLst/>
+            </a:pPr>
+            <a:endParaRPr kumimoji="0" lang="en-US" sz="2400" b="0" i="0" u="none" strike="noStrike" cap="none" normalizeH="0" baseline="0">
+              <a:ln>
+                <a:noFill/>
+              </a:ln>
+              <a:solidFill>
+                <a:schemeClr val="tx1"/>
+              </a:solidFill>
+              <a:effectLst/>
+              <a:latin typeface="Tahoma" pitchFamily="-112" charset="0"/>
+            </a:endParaRPr>
+          </a:p>
+        </p:txBody>
+      </p:sp>
+      <p:cxnSp>
+        <p:nvCxnSpPr>
+          <p:cNvPr id="55" name="Straight Arrow Connector 54">
+            <a:extLst>
+              <a:ext uri="{FF2B5EF4-FFF2-40B4-BE49-F238E27FC236}">
+                <a16:creationId xmlns:a16="http://schemas.microsoft.com/office/drawing/2014/main" id="{65CF02BF-D5A7-402B-BA1B-E80DA402FAD9}"/>
+              </a:ext>
+            </a:extLst>
+          </p:cNvPr>
+          <p:cNvCxnSpPr>
+            <a:cxnSpLocks/>
+          </p:cNvCxnSpPr>
+          <p:nvPr/>
+        </p:nvCxnSpPr>
+        <p:spPr bwMode="auto">
+          <a:xfrm>
+            <a:off x="5853360" y="2236785"/>
+            <a:ext cx="0" cy="236540"/>
+          </a:xfrm>
+          <a:prstGeom prst="straightConnector1">
+            <a:avLst/>
+          </a:prstGeom>
+          <a:solidFill>
+            <a:schemeClr val="accent1"/>
+          </a:solidFill>
+          <a:ln w="12700" cap="flat" cmpd="sng" algn="ctr">
+            <a:solidFill>
+              <a:schemeClr val="tx1"/>
+            </a:solidFill>
+            <a:prstDash val="solid"/>
+            <a:round/>
+            <a:headEnd type="stealth" w="med" len="med"/>
+            <a:tailEnd type="stealth" w="med" len="med"/>
+          </a:ln>
+          <a:effectLst/>
+        </p:spPr>
+      </p:cxnSp>
+      <p:sp>
+        <p:nvSpPr>
+          <p:cNvPr id="58" name="TextBox 57">
+            <a:extLst>
+              <a:ext uri="{FF2B5EF4-FFF2-40B4-BE49-F238E27FC236}">
+                <a16:creationId xmlns:a16="http://schemas.microsoft.com/office/drawing/2014/main" id="{BEA21552-E8BA-447D-88CE-3EBCE3A50FF9}"/>
+              </a:ext>
+            </a:extLst>
+          </p:cNvPr>
+          <p:cNvSpPr txBox="1"/>
+          <p:nvPr/>
+        </p:nvSpPr>
+        <p:spPr>
+          <a:xfrm>
+            <a:off x="5866557" y="2208246"/>
+            <a:ext cx="492443" cy="338554"/>
+          </a:xfrm>
+          <a:prstGeom prst="rect">
+            <a:avLst/>
+          </a:prstGeom>
+          <a:noFill/>
+        </p:spPr>
+        <p:txBody>
+          <a:bodyPr wrap="none" rtlCol="0">
+            <a:spAutoFit/>
+          </a:bodyPr>
+          <a:lstStyle/>
+          <a:p>
+            <a:r>
+              <a:rPr lang="en-US" sz="1600" i="1" dirty="0" err="1">
+                <a:latin typeface="Times New Roman" panose="02020603050405020304" pitchFamily="18" charset="0"/>
+                <a:cs typeface="Times New Roman" panose="02020603050405020304" pitchFamily="18" charset="0"/>
+              </a:rPr>
+              <a:t>smr</a:t>
+            </a:r>
+            <a:endParaRPr lang="en-US" sz="1600" baseline="-25000" dirty="0">
+              <a:latin typeface="Times New Roman" panose="02020603050405020304" pitchFamily="18" charset="0"/>
+              <a:cs typeface="Times New Roman" panose="02020603050405020304" pitchFamily="18" charset="0"/>
+            </a:endParaRPr>
+          </a:p>
+        </p:txBody>
+      </p:sp>
+      <mc:AlternateContent xmlns:mc="http://schemas.openxmlformats.org/markup-compatibility/2006">
+        <mc:Choice xmlns:a14="http://schemas.microsoft.com/office/drawing/2010/main" Requires="a14">
+          <p:sp>
+            <p:nvSpPr>
+              <p:cNvPr id="59" name="TextBox 58">
+                <a:extLst>
+                  <a:ext uri="{FF2B5EF4-FFF2-40B4-BE49-F238E27FC236}">
+                    <a16:creationId xmlns:a16="http://schemas.microsoft.com/office/drawing/2014/main" id="{DDCBB5C1-086B-4DE8-AB82-5947664F5DEC}"/>
+                  </a:ext>
+                </a:extLst>
+              </p:cNvPr>
+              <p:cNvSpPr txBox="1"/>
+              <p:nvPr/>
+            </p:nvSpPr>
+            <p:spPr>
+              <a:xfrm>
+                <a:off x="5084593" y="1204064"/>
+                <a:ext cx="1853649" cy="338619"/>
+              </a:xfrm>
+              <a:prstGeom prst="rect">
+                <a:avLst/>
+              </a:prstGeom>
+              <a:noFill/>
+            </p:spPr>
+            <p:txBody>
+              <a:bodyPr wrap="none" lIns="0" tIns="0" rIns="0" bIns="0" rtlCol="0">
+                <a:spAutoFit/>
+              </a:bodyPr>
+              <a:lstStyle/>
+              <a:p>
+                <a14:m>
+                  <m:oMathPara xmlns:m="http://schemas.openxmlformats.org/officeDocument/2006/math">
+                    <m:oMathParaPr>
+                      <m:jc m:val="centerGroup"/>
+                    </m:oMathParaPr>
+                    <m:oMath xmlns:m="http://schemas.openxmlformats.org/officeDocument/2006/math">
+                      <m:sSub>
+                        <m:sSubPr>
+                          <m:ctrlPr>
+                            <a:rPr lang="en-US" sz="2000" b="0" i="1" smtClean="0">
+                              <a:latin typeface="Cambria Math" panose="02040503050406030204" pitchFamily="18" charset="0"/>
+                            </a:rPr>
+                          </m:ctrlPr>
+                        </m:sSubPr>
+                        <m:e>
+                          <m:r>
+                            <a:rPr lang="en-US" sz="2000" b="0" i="1" smtClean="0">
+                              <a:latin typeface="Cambria Math" panose="02040503050406030204" pitchFamily="18" charset="0"/>
+                            </a:rPr>
+                            <m:t>𝐴</m:t>
+                          </m:r>
+                        </m:e>
+                        <m:sub>
+                          <m:r>
+                            <a:rPr lang="en-US" sz="2000" b="0" i="1" smtClean="0">
+                              <a:latin typeface="Cambria Math" panose="02040503050406030204" pitchFamily="18" charset="0"/>
+                            </a:rPr>
+                            <m:t>𝑒𝑓𝑓</m:t>
+                          </m:r>
+                        </m:sub>
+                      </m:sSub>
+                      <m:r>
+                        <a:rPr lang="en-US" sz="2000" b="0" i="1" smtClean="0">
+                          <a:latin typeface="Cambria Math" panose="02040503050406030204" pitchFamily="18" charset="0"/>
+                        </a:rPr>
+                        <m:t>=</m:t>
+                      </m:r>
+                      <m:r>
+                        <a:rPr lang="en-US" sz="2000" b="0" i="1" smtClean="0">
+                          <a:latin typeface="Cambria Math" panose="02040503050406030204" pitchFamily="18" charset="0"/>
+                        </a:rPr>
+                        <m:t>𝜋</m:t>
+                      </m:r>
+                      <m:r>
+                        <a:rPr lang="en-US" sz="2000" b="0" i="1" smtClean="0">
+                          <a:latin typeface="Cambria Math" panose="02040503050406030204" pitchFamily="18" charset="0"/>
+                        </a:rPr>
+                        <m:t>⋅</m:t>
+                      </m:r>
+                      <m:r>
+                        <a:rPr lang="en-US" sz="2000" b="0" i="1" smtClean="0">
+                          <a:latin typeface="Cambria Math" panose="02040503050406030204" pitchFamily="18" charset="0"/>
+                        </a:rPr>
+                        <m:t>𝑠𝑚</m:t>
+                      </m:r>
+                      <m:sSup>
+                        <m:sSupPr>
+                          <m:ctrlPr>
+                            <a:rPr lang="en-US" sz="2000" b="0" i="1" smtClean="0">
+                              <a:latin typeface="Cambria Math" panose="02040503050406030204" pitchFamily="18" charset="0"/>
+                            </a:rPr>
+                          </m:ctrlPr>
+                        </m:sSupPr>
+                        <m:e>
+                          <m:r>
+                            <a:rPr lang="en-US" sz="2000" b="0" i="1" smtClean="0">
+                              <a:latin typeface="Cambria Math" panose="02040503050406030204" pitchFamily="18" charset="0"/>
+                            </a:rPr>
+                            <m:t>𝑟</m:t>
+                          </m:r>
+                        </m:e>
+                        <m:sup>
+                          <m:r>
+                            <a:rPr lang="en-US" sz="2000" b="0" i="1" smtClean="0">
+                              <a:latin typeface="Cambria Math" panose="02040503050406030204" pitchFamily="18" charset="0"/>
+                            </a:rPr>
+                            <m:t>2</m:t>
+                          </m:r>
+                        </m:sup>
+                      </m:sSup>
+                    </m:oMath>
+                  </m:oMathPara>
+                </a14:m>
+                <a:endParaRPr lang="en-US" sz="2000" dirty="0"/>
+              </a:p>
+            </p:txBody>
+          </p:sp>
+        </mc:Choice>
+        <mc:Fallback>
+          <p:sp>
+            <p:nvSpPr>
+              <p:cNvPr id="59" name="TextBox 58">
+                <a:extLst>
+                  <a:ext uri="{FF2B5EF4-FFF2-40B4-BE49-F238E27FC236}">
+                    <a16:creationId xmlns:a16="http://schemas.microsoft.com/office/drawing/2014/main" id="{DDCBB5C1-086B-4DE8-AB82-5947664F5DEC}"/>
+                  </a:ext>
+                </a:extLst>
+              </p:cNvPr>
+              <p:cNvSpPr txBox="1">
+                <a:spLocks noRot="1" noChangeAspect="1" noMove="1" noResize="1" noEditPoints="1" noAdjustHandles="1" noChangeArrowheads="1" noChangeShapeType="1" noTextEdit="1"/>
+              </p:cNvSpPr>
+              <p:nvPr/>
+            </p:nvSpPr>
+            <p:spPr>
+              <a:xfrm>
+                <a:off x="5084593" y="1204064"/>
+                <a:ext cx="1853649" cy="338619"/>
+              </a:xfrm>
+              <a:prstGeom prst="rect">
+                <a:avLst/>
+              </a:prstGeom>
+              <a:blipFill>
+                <a:blip r:embed="rId3"/>
+                <a:stretch>
+                  <a:fillRect l="-1974" r="-658" b="-27273"/>
+                </a:stretch>
+              </a:blipFill>
+            </p:spPr>
+            <p:txBody>
+              <a:bodyPr/>
+              <a:lstStyle/>
+              <a:p>
+                <a:r>
+                  <a:rPr lang="en-US">
+                    <a:noFill/>
+                  </a:rPr>
+                  <a:t> </a:t>
+                </a:r>
+              </a:p>
+            </p:txBody>
+          </p:sp>
+        </mc:Fallback>
+      </mc:AlternateContent>
+      <p:cxnSp>
+        <p:nvCxnSpPr>
+          <p:cNvPr id="70" name="Straight Connector 69">
+            <a:extLst>
+              <a:ext uri="{FF2B5EF4-FFF2-40B4-BE49-F238E27FC236}">
+                <a16:creationId xmlns:a16="http://schemas.microsoft.com/office/drawing/2014/main" id="{8953562F-C7D9-4E28-A0C6-707427D82B9D}"/>
+              </a:ext>
+            </a:extLst>
+          </p:cNvPr>
+          <p:cNvCxnSpPr>
+            <a:cxnSpLocks/>
+          </p:cNvCxnSpPr>
+          <p:nvPr/>
+        </p:nvCxnSpPr>
+        <p:spPr bwMode="auto">
+          <a:xfrm>
+            <a:off x="5271975" y="2730096"/>
+            <a:ext cx="3155671" cy="943650"/>
+          </a:xfrm>
+          <a:prstGeom prst="line">
+            <a:avLst/>
+          </a:prstGeom>
+          <a:solidFill>
+            <a:schemeClr val="accent1"/>
+          </a:solidFill>
+          <a:ln w="28575" cap="flat" cmpd="sng" algn="ctr">
+            <a:solidFill>
+              <a:srgbClr val="C00000"/>
+            </a:solidFill>
+            <a:prstDash val="solid"/>
+            <a:round/>
+            <a:headEnd type="none" w="med" len="med"/>
+            <a:tailEnd type="none" w="med" len="med"/>
+          </a:ln>
+          <a:effectLst/>
+        </p:spPr>
+      </p:cxnSp>
+      <p:cxnSp>
+        <p:nvCxnSpPr>
+          <p:cNvPr id="72" name="Straight Connector 71">
+            <a:extLst>
+              <a:ext uri="{FF2B5EF4-FFF2-40B4-BE49-F238E27FC236}">
+                <a16:creationId xmlns:a16="http://schemas.microsoft.com/office/drawing/2014/main" id="{30C6D1F9-8033-457A-B790-2FE9248A4B28}"/>
+              </a:ext>
+            </a:extLst>
+          </p:cNvPr>
+          <p:cNvCxnSpPr>
+            <a:cxnSpLocks/>
+          </p:cNvCxnSpPr>
+          <p:nvPr/>
+        </p:nvCxnSpPr>
+        <p:spPr bwMode="auto">
+          <a:xfrm>
+            <a:off x="5271974" y="2600942"/>
+            <a:ext cx="3186829" cy="596834"/>
+          </a:xfrm>
+          <a:prstGeom prst="line">
+            <a:avLst/>
+          </a:prstGeom>
+          <a:solidFill>
+            <a:schemeClr val="accent1"/>
+          </a:solidFill>
+          <a:ln w="3175" cap="flat" cmpd="sng" algn="ctr">
+            <a:solidFill>
+              <a:srgbClr val="C00000"/>
+            </a:solidFill>
+            <a:prstDash val="solid"/>
+            <a:round/>
+            <a:headEnd type="none" w="med" len="med"/>
+            <a:tailEnd type="none" w="med" len="med"/>
+          </a:ln>
+          <a:effectLst/>
+        </p:spPr>
+      </p:cxnSp>
+      <p:cxnSp>
+        <p:nvCxnSpPr>
+          <p:cNvPr id="74" name="Straight Connector 73">
+            <a:extLst>
+              <a:ext uri="{FF2B5EF4-FFF2-40B4-BE49-F238E27FC236}">
+                <a16:creationId xmlns:a16="http://schemas.microsoft.com/office/drawing/2014/main" id="{AD19FD21-DB61-478E-9A2A-008D16CCC0BD}"/>
+              </a:ext>
+            </a:extLst>
+          </p:cNvPr>
+          <p:cNvCxnSpPr>
+            <a:cxnSpLocks/>
+          </p:cNvCxnSpPr>
+          <p:nvPr/>
+        </p:nvCxnSpPr>
+        <p:spPr bwMode="auto">
+          <a:xfrm flipH="1">
+            <a:off x="5271974" y="1739989"/>
+            <a:ext cx="3186829" cy="596834"/>
+          </a:xfrm>
+          <a:prstGeom prst="line">
+            <a:avLst/>
+          </a:prstGeom>
+          <a:solidFill>
+            <a:schemeClr val="accent1"/>
+          </a:solidFill>
+          <a:ln w="3175" cap="flat" cmpd="sng" algn="ctr">
+            <a:solidFill>
+              <a:srgbClr val="C00000"/>
+            </a:solidFill>
+            <a:prstDash val="solid"/>
+            <a:round/>
+            <a:headEnd type="none" w="med" len="med"/>
+            <a:tailEnd type="none" w="med" len="med"/>
+          </a:ln>
+          <a:effectLst/>
+        </p:spPr>
+      </p:cxnSp>
+      <p:sp>
+        <p:nvSpPr>
+          <p:cNvPr id="57" name="Oval 56">
+            <a:extLst>
+              <a:ext uri="{FF2B5EF4-FFF2-40B4-BE49-F238E27FC236}">
+                <a16:creationId xmlns:a16="http://schemas.microsoft.com/office/drawing/2014/main" id="{3D1E7587-D463-4CA6-A137-6BA51D6E9B1B}"/>
+              </a:ext>
+            </a:extLst>
+          </p:cNvPr>
+          <p:cNvSpPr/>
+          <p:nvPr/>
+        </p:nvSpPr>
+        <p:spPr bwMode="auto">
+          <a:xfrm>
+            <a:off x="5565330" y="2243771"/>
+            <a:ext cx="197994" cy="460051"/>
+          </a:xfrm>
+          <a:prstGeom prst="ellipse">
+            <a:avLst/>
+          </a:prstGeom>
+          <a:solidFill>
+            <a:schemeClr val="bg1">
+              <a:lumMod val="75000"/>
+            </a:schemeClr>
+          </a:solidFill>
+          <a:ln w="3175" cap="flat" cmpd="sng" algn="ctr">
+            <a:solidFill>
+              <a:schemeClr val="tx1"/>
+            </a:solidFill>
+            <a:prstDash val="solid"/>
+            <a:round/>
+            <a:headEnd type="none" w="med" len="med"/>
+            <a:tailEnd type="none" w="med" len="med"/>
+          </a:ln>
+          <a:effectLst/>
+        </p:spPr>
+        <p:txBody>
+          <a:bodyPr vert="horz" wrap="square" lIns="91440" tIns="45720" rIns="91440" bIns="45720" numCol="1" rtlCol="0" anchor="t" anchorCtr="0" compatLnSpc="1">
+            <a:prstTxWarp prst="textNoShape">
+              <a:avLst/>
+            </a:prstTxWarp>
+          </a:bodyPr>
+          <a:lstStyle/>
+          <a:p>
+            <a:pPr marL="0" marR="0" indent="0" algn="l" defTabSz="914400" rtl="0" eaLnBrk="0" fontAlgn="base" latinLnBrk="0" hangingPunct="0">
+              <a:lnSpc>
+                <a:spcPct val="100000"/>
+              </a:lnSpc>
+              <a:spcBef>
+                <a:spcPct val="0"/>
+              </a:spcBef>
+              <a:spcAft>
+                <a:spcPct val="0"/>
+              </a:spcAft>
+              <a:buClrTx/>
+              <a:buSzTx/>
+              <a:buFontTx/>
+              <a:buNone/>
+              <a:tabLst/>
+            </a:pPr>
+            <a:endParaRPr kumimoji="0" lang="en-US" sz="2400" b="0" i="0" u="none" strike="noStrike" cap="none" normalizeH="0" baseline="0">
+              <a:ln>
+                <a:noFill/>
+              </a:ln>
+              <a:solidFill>
+                <a:schemeClr val="tx1"/>
+              </a:solidFill>
+              <a:effectLst/>
+              <a:latin typeface="Tahoma" pitchFamily="-112" charset="0"/>
+            </a:endParaRPr>
+          </a:p>
+        </p:txBody>
+      </p:sp>
+      <p:cxnSp>
+        <p:nvCxnSpPr>
+          <p:cNvPr id="60" name="Straight Connector 59">
+            <a:extLst>
+              <a:ext uri="{FF2B5EF4-FFF2-40B4-BE49-F238E27FC236}">
+                <a16:creationId xmlns:a16="http://schemas.microsoft.com/office/drawing/2014/main" id="{DDB012EF-6910-4B4B-9967-32F9DB68CE01}"/>
+              </a:ext>
+            </a:extLst>
+          </p:cNvPr>
+          <p:cNvCxnSpPr>
+            <a:cxnSpLocks/>
+            <a:stCxn id="59" idx="2"/>
+          </p:cNvCxnSpPr>
+          <p:nvPr/>
+        </p:nvCxnSpPr>
+        <p:spPr bwMode="auto">
+          <a:xfrm flipH="1">
+            <a:off x="5664327" y="1542683"/>
+            <a:ext cx="347091" cy="882746"/>
+          </a:xfrm>
+          <a:prstGeom prst="line">
+            <a:avLst/>
+          </a:prstGeom>
+          <a:solidFill>
+            <a:schemeClr val="accent1"/>
+          </a:solidFill>
+          <a:ln w="12700" cap="flat" cmpd="sng" algn="ctr">
+            <a:solidFill>
+              <a:schemeClr val="tx1"/>
+            </a:solidFill>
+            <a:prstDash val="solid"/>
+            <a:round/>
+            <a:headEnd type="diamond" w="med" len="med"/>
+            <a:tailEnd type="diamond" w="med" len="med"/>
+          </a:ln>
+          <a:effectLst/>
+        </p:spPr>
+      </p:cxnSp>
+      <p:sp>
+        <p:nvSpPr>
+          <p:cNvPr id="78" name="Freeform: Shape 77">
+            <a:extLst>
+              <a:ext uri="{FF2B5EF4-FFF2-40B4-BE49-F238E27FC236}">
+                <a16:creationId xmlns:a16="http://schemas.microsoft.com/office/drawing/2014/main" id="{ECF36B7F-E5A4-4459-A2B1-84E6741D3DCD}"/>
+              </a:ext>
+            </a:extLst>
+          </p:cNvPr>
+          <p:cNvSpPr/>
+          <p:nvPr/>
+        </p:nvSpPr>
+        <p:spPr bwMode="auto">
+          <a:xfrm>
+            <a:off x="7131050" y="2476500"/>
+            <a:ext cx="178851" cy="812800"/>
+          </a:xfrm>
+          <a:custGeom>
+            <a:avLst/>
+            <a:gdLst>
+              <a:gd name="connsiteX0" fmla="*/ 171450 w 178851"/>
+              <a:gd name="connsiteY0" fmla="*/ 0 h 812800"/>
+              <a:gd name="connsiteX1" fmla="*/ 158750 w 178851"/>
+              <a:gd name="connsiteY1" fmla="*/ 419100 h 812800"/>
+              <a:gd name="connsiteX2" fmla="*/ 0 w 178851"/>
+              <a:gd name="connsiteY2" fmla="*/ 812800 h 812800"/>
+            </a:gdLst>
+            <a:ahLst/>
+            <a:cxnLst>
+              <a:cxn ang="0">
+                <a:pos x="connsiteX0" y="connsiteY0"/>
+              </a:cxn>
+              <a:cxn ang="0">
+                <a:pos x="connsiteX1" y="connsiteY1"/>
+              </a:cxn>
+              <a:cxn ang="0">
+                <a:pos x="connsiteX2" y="connsiteY2"/>
+              </a:cxn>
+            </a:cxnLst>
+            <a:rect l="l" t="t" r="r" b="b"/>
+            <a:pathLst>
+              <a:path w="178851" h="812800">
+                <a:moveTo>
+                  <a:pt x="171450" y="0"/>
+                </a:moveTo>
+                <a:cubicBezTo>
+                  <a:pt x="179387" y="141816"/>
+                  <a:pt x="187325" y="283633"/>
+                  <a:pt x="158750" y="419100"/>
+                </a:cubicBezTo>
+                <a:cubicBezTo>
+                  <a:pt x="130175" y="554567"/>
+                  <a:pt x="65087" y="683683"/>
+                  <a:pt x="0" y="812800"/>
+                </a:cubicBezTo>
+              </a:path>
+            </a:pathLst>
+          </a:custGeom>
+          <a:noFill/>
+          <a:ln w="12700" cap="flat" cmpd="sng" algn="ctr">
+            <a:solidFill>
+              <a:srgbClr val="C00000"/>
+            </a:solidFill>
+            <a:prstDash val="solid"/>
+            <a:round/>
+            <a:headEnd type="none" w="med" len="med"/>
+            <a:tailEnd type="triangle" w="med" len="med"/>
+          </a:ln>
+          <a:effectLst/>
+        </p:spPr>
+        <p:txBody>
+          <a:bodyPr vert="horz" wrap="square" lIns="91440" tIns="45720" rIns="91440" bIns="45720" numCol="1" rtlCol="0" anchor="t" anchorCtr="0" compatLnSpc="1">
+            <a:prstTxWarp prst="textNoShape">
+              <a:avLst/>
+            </a:prstTxWarp>
+          </a:bodyPr>
+          <a:lstStyle/>
+          <a:p>
+            <a:pPr marL="0" marR="0" indent="0" algn="l" defTabSz="914400" rtl="0" eaLnBrk="0" fontAlgn="base" latinLnBrk="0" hangingPunct="0">
+              <a:lnSpc>
+                <a:spcPct val="100000"/>
+              </a:lnSpc>
+              <a:spcBef>
+                <a:spcPct val="0"/>
+              </a:spcBef>
+              <a:spcAft>
+                <a:spcPct val="0"/>
+              </a:spcAft>
+              <a:buClrTx/>
+              <a:buSzTx/>
+              <a:buFontTx/>
+              <a:buNone/>
+              <a:tabLst/>
+            </a:pPr>
+            <a:endParaRPr kumimoji="0" lang="en-US" sz="2400" b="0" i="0" u="none" strike="noStrike" cap="none" normalizeH="0" baseline="0">
+              <a:ln>
+                <a:noFill/>
+              </a:ln>
+              <a:solidFill>
+                <a:schemeClr val="tx1"/>
+              </a:solidFill>
+              <a:effectLst/>
+              <a:latin typeface="Tahoma" pitchFamily="-112" charset="0"/>
+            </a:endParaRPr>
+          </a:p>
+        </p:txBody>
+      </p:sp>
+      <p:sp>
+        <p:nvSpPr>
+          <p:cNvPr id="79" name="Freeform: Shape 78">
+            <a:extLst>
+              <a:ext uri="{FF2B5EF4-FFF2-40B4-BE49-F238E27FC236}">
+                <a16:creationId xmlns:a16="http://schemas.microsoft.com/office/drawing/2014/main" id="{7BED8B2B-BE3F-4350-947E-211AD236E89D}"/>
+              </a:ext>
+            </a:extLst>
+          </p:cNvPr>
+          <p:cNvSpPr/>
+          <p:nvPr/>
+        </p:nvSpPr>
+        <p:spPr bwMode="auto">
+          <a:xfrm>
+            <a:off x="7677150" y="3073400"/>
+            <a:ext cx="107950" cy="387350"/>
+          </a:xfrm>
+          <a:custGeom>
+            <a:avLst/>
+            <a:gdLst>
+              <a:gd name="connsiteX0" fmla="*/ 0 w 107950"/>
+              <a:gd name="connsiteY0" fmla="*/ 387350 h 387350"/>
+              <a:gd name="connsiteX1" fmla="*/ 82550 w 107950"/>
+              <a:gd name="connsiteY1" fmla="*/ 209550 h 387350"/>
+              <a:gd name="connsiteX2" fmla="*/ 107950 w 107950"/>
+              <a:gd name="connsiteY2" fmla="*/ 0 h 387350"/>
+            </a:gdLst>
+            <a:ahLst/>
+            <a:cxnLst>
+              <a:cxn ang="0">
+                <a:pos x="connsiteX0" y="connsiteY0"/>
+              </a:cxn>
+              <a:cxn ang="0">
+                <a:pos x="connsiteX1" y="connsiteY1"/>
+              </a:cxn>
+              <a:cxn ang="0">
+                <a:pos x="connsiteX2" y="connsiteY2"/>
+              </a:cxn>
+            </a:cxnLst>
+            <a:rect l="l" t="t" r="r" b="b"/>
+            <a:pathLst>
+              <a:path w="107950" h="387350">
+                <a:moveTo>
+                  <a:pt x="0" y="387350"/>
+                </a:moveTo>
+                <a:cubicBezTo>
+                  <a:pt x="32279" y="330729"/>
+                  <a:pt x="64558" y="274108"/>
+                  <a:pt x="82550" y="209550"/>
+                </a:cubicBezTo>
+                <a:cubicBezTo>
+                  <a:pt x="100542" y="144992"/>
+                  <a:pt x="104246" y="72496"/>
+                  <a:pt x="107950" y="0"/>
+                </a:cubicBezTo>
+              </a:path>
+            </a:pathLst>
+          </a:custGeom>
+          <a:noFill/>
+          <a:ln w="12700" cap="flat" cmpd="sng" algn="ctr">
+            <a:solidFill>
+              <a:srgbClr val="C00000"/>
+            </a:solidFill>
+            <a:prstDash val="solid"/>
+            <a:round/>
+            <a:headEnd type="none" w="med" len="med"/>
+            <a:tailEnd type="triangle" w="med" len="med"/>
+          </a:ln>
+          <a:effectLst/>
+        </p:spPr>
+        <p:txBody>
+          <a:bodyPr vert="horz" wrap="square" lIns="91440" tIns="45720" rIns="91440" bIns="45720" numCol="1" rtlCol="0" anchor="t" anchorCtr="0" compatLnSpc="1">
+            <a:prstTxWarp prst="textNoShape">
+              <a:avLst/>
+            </a:prstTxWarp>
+          </a:bodyPr>
+          <a:lstStyle/>
+          <a:p>
+            <a:pPr marL="0" marR="0" indent="0" algn="l" defTabSz="914400" rtl="0" eaLnBrk="0" fontAlgn="base" latinLnBrk="0" hangingPunct="0">
+              <a:lnSpc>
+                <a:spcPct val="100000"/>
+              </a:lnSpc>
+              <a:spcBef>
+                <a:spcPct val="0"/>
+              </a:spcBef>
+              <a:spcAft>
+                <a:spcPct val="0"/>
+              </a:spcAft>
+              <a:buClrTx/>
+              <a:buSzTx/>
+              <a:buFontTx/>
+              <a:buNone/>
+              <a:tabLst/>
+            </a:pPr>
+            <a:endParaRPr kumimoji="0" lang="en-US" sz="2400" b="0" i="0" u="none" strike="noStrike" cap="none" normalizeH="0" baseline="0">
+              <a:ln>
+                <a:noFill/>
+              </a:ln>
+              <a:solidFill>
+                <a:schemeClr val="tx1"/>
+              </a:solidFill>
+              <a:effectLst/>
+              <a:latin typeface="Tahoma" pitchFamily="-112" charset="0"/>
+            </a:endParaRPr>
+          </a:p>
+        </p:txBody>
+      </p:sp>
+      <mc:AlternateContent xmlns:mc="http://schemas.openxmlformats.org/markup-compatibility/2006">
+        <mc:Choice xmlns:a14="http://schemas.microsoft.com/office/drawing/2010/main" Requires="a14">
+          <p:sp>
+            <p:nvSpPr>
+              <p:cNvPr id="82" name="TextBox 81">
+                <a:extLst>
+                  <a:ext uri="{FF2B5EF4-FFF2-40B4-BE49-F238E27FC236}">
+                    <a16:creationId xmlns:a16="http://schemas.microsoft.com/office/drawing/2014/main" id="{FE47F98E-E595-4877-A0E6-CCF4DF559AF6}"/>
+                  </a:ext>
+                </a:extLst>
+              </p:cNvPr>
+              <p:cNvSpPr txBox="1"/>
+              <p:nvPr/>
+            </p:nvSpPr>
+            <p:spPr>
+              <a:xfrm>
+                <a:off x="6527577" y="3267075"/>
+                <a:ext cx="507318" cy="251094"/>
+              </a:xfrm>
+              <a:prstGeom prst="rect">
+                <a:avLst/>
+              </a:prstGeom>
+              <a:noFill/>
+            </p:spPr>
+            <p:txBody>
+              <a:bodyPr wrap="none" lIns="0" tIns="0" rIns="0" bIns="0" rtlCol="0">
+                <a:spAutoFit/>
+              </a:bodyPr>
+              <a:lstStyle/>
+              <a:p>
+                <a14:m>
+                  <m:oMathPara xmlns:m="http://schemas.openxmlformats.org/officeDocument/2006/math">
+                    <m:oMathParaPr>
+                      <m:jc m:val="centerGroup"/>
+                    </m:oMathParaPr>
+                    <m:oMath xmlns:m="http://schemas.openxmlformats.org/officeDocument/2006/math">
+                      <m:box>
+                        <m:boxPr>
+                          <m:ctrlPr>
+                            <a:rPr lang="en-US" sz="1400" i="1" smtClean="0">
+                              <a:latin typeface="Cambria Math" panose="02040503050406030204" pitchFamily="18" charset="0"/>
+                            </a:rPr>
+                          </m:ctrlPr>
+                        </m:boxPr>
+                        <m:e>
+                          <m:argPr>
+                            <m:argSz m:val="-1"/>
+                          </m:argPr>
+                          <m:f>
+                            <m:fPr>
+                              <m:ctrlPr>
+                                <a:rPr lang="en-US" sz="1400" i="1" smtClean="0">
+                                  <a:latin typeface="Cambria Math" panose="02040503050406030204" pitchFamily="18" charset="0"/>
+                                </a:rPr>
+                              </m:ctrlPr>
+                            </m:fPr>
+                            <m:num>
+                              <m:r>
+                                <a:rPr lang="en-US" sz="1400" b="0" i="1" smtClean="0">
+                                  <a:latin typeface="Cambria Math" panose="02040503050406030204" pitchFamily="18" charset="0"/>
+                                </a:rPr>
+                                <m:t>1</m:t>
+                              </m:r>
+                            </m:num>
+                            <m:den>
+                              <m:r>
+                                <a:rPr lang="en-US" sz="1400" b="0" i="1" smtClean="0">
+                                  <a:latin typeface="Cambria Math" panose="02040503050406030204" pitchFamily="18" charset="0"/>
+                                </a:rPr>
+                                <m:t>2</m:t>
+                              </m:r>
+                            </m:den>
+                          </m:f>
+                        </m:e>
+                      </m:box>
+                      <m:r>
+                        <a:rPr lang="en-US" sz="1400" b="0" i="1" smtClean="0">
+                          <a:latin typeface="Cambria Math" panose="02040503050406030204" pitchFamily="18" charset="0"/>
+                        </a:rPr>
+                        <m:t>𝑐𝑜𝑛𝑒</m:t>
+                      </m:r>
+                    </m:oMath>
+                  </m:oMathPara>
+                </a14:m>
+                <a:endParaRPr lang="en-US" sz="1400" dirty="0"/>
+              </a:p>
+            </p:txBody>
+          </p:sp>
+        </mc:Choice>
+        <mc:Fallback>
+          <p:sp>
+            <p:nvSpPr>
+              <p:cNvPr id="82" name="TextBox 81">
+                <a:extLst>
+                  <a:ext uri="{FF2B5EF4-FFF2-40B4-BE49-F238E27FC236}">
+                    <a16:creationId xmlns:a16="http://schemas.microsoft.com/office/drawing/2014/main" id="{FE47F98E-E595-4877-A0E6-CCF4DF559AF6}"/>
+                  </a:ext>
+                </a:extLst>
+              </p:cNvPr>
+              <p:cNvSpPr txBox="1">
+                <a:spLocks noRot="1" noChangeAspect="1" noMove="1" noResize="1" noEditPoints="1" noAdjustHandles="1" noChangeArrowheads="1" noChangeShapeType="1" noTextEdit="1"/>
+              </p:cNvSpPr>
+              <p:nvPr/>
+            </p:nvSpPr>
+            <p:spPr>
+              <a:xfrm>
+                <a:off x="6527577" y="3267075"/>
+                <a:ext cx="507318" cy="251094"/>
+              </a:xfrm>
+              <a:prstGeom prst="rect">
+                <a:avLst/>
+              </a:prstGeom>
+              <a:blipFill>
+                <a:blip r:embed="rId4"/>
+                <a:stretch>
+                  <a:fillRect l="-2410" r="-1205" b="-17073"/>
+                </a:stretch>
+              </a:blipFill>
+            </p:spPr>
+            <p:txBody>
+              <a:bodyPr/>
+              <a:lstStyle/>
+              <a:p>
+                <a:r>
+                  <a:rPr lang="en-US">
+                    <a:noFill/>
+                  </a:rPr>
+                  <a:t> </a:t>
+                </a:r>
+              </a:p>
+            </p:txBody>
+          </p:sp>
+        </mc:Fallback>
+      </mc:AlternateContent>
+      <mc:AlternateContent xmlns:mc="http://schemas.openxmlformats.org/markup-compatibility/2006">
+        <mc:Choice xmlns:a14="http://schemas.microsoft.com/office/drawing/2010/main" Requires="a14">
+          <p:sp>
+            <p:nvSpPr>
+              <p:cNvPr id="83" name="TextBox 82">
+                <a:extLst>
+                  <a:ext uri="{FF2B5EF4-FFF2-40B4-BE49-F238E27FC236}">
+                    <a16:creationId xmlns:a16="http://schemas.microsoft.com/office/drawing/2014/main" id="{91724388-540C-41E8-BF8E-1AF7164F5375}"/>
+                  </a:ext>
+                </a:extLst>
+              </p:cNvPr>
+              <p:cNvSpPr txBox="1"/>
+              <p:nvPr/>
+            </p:nvSpPr>
+            <p:spPr>
+              <a:xfrm>
+                <a:off x="7219948" y="3505334"/>
+                <a:ext cx="611514" cy="251094"/>
+              </a:xfrm>
+              <a:prstGeom prst="rect">
+                <a:avLst/>
+              </a:prstGeom>
+              <a:noFill/>
+            </p:spPr>
+            <p:txBody>
+              <a:bodyPr wrap="none" lIns="0" tIns="0" rIns="0" bIns="0" rtlCol="0">
+                <a:spAutoFit/>
+              </a:bodyPr>
+              <a:lstStyle/>
+              <a:p>
+                <a14:m>
+                  <m:oMathPara xmlns:m="http://schemas.openxmlformats.org/officeDocument/2006/math">
+                    <m:oMathParaPr>
+                      <m:jc m:val="centerGroup"/>
+                    </m:oMathParaPr>
+                    <m:oMath xmlns:m="http://schemas.openxmlformats.org/officeDocument/2006/math">
+                      <m:box>
+                        <m:boxPr>
+                          <m:ctrlPr>
+                            <a:rPr lang="en-US" sz="1400" i="1" smtClean="0">
+                              <a:latin typeface="Cambria Math" panose="02040503050406030204" pitchFamily="18" charset="0"/>
+                            </a:rPr>
+                          </m:ctrlPr>
+                        </m:boxPr>
+                        <m:e>
+                          <m:argPr>
+                            <m:argSz m:val="-1"/>
+                          </m:argPr>
+                          <m:f>
+                            <m:fPr>
+                              <m:ctrlPr>
+                                <a:rPr lang="en-US" sz="1400" i="1" smtClean="0">
+                                  <a:latin typeface="Cambria Math" panose="02040503050406030204" pitchFamily="18" charset="0"/>
+                                </a:rPr>
+                              </m:ctrlPr>
+                            </m:fPr>
+                            <m:num>
+                              <m:r>
+                                <a:rPr lang="en-US" sz="1400" b="0" i="1" smtClean="0">
+                                  <a:latin typeface="Cambria Math" panose="02040503050406030204" pitchFamily="18" charset="0"/>
+                                </a:rPr>
+                                <m:t>1</m:t>
+                              </m:r>
+                            </m:num>
+                            <m:den>
+                              <m:r>
+                                <a:rPr lang="en-US" sz="1400" b="0" i="1" smtClean="0">
+                                  <a:latin typeface="Cambria Math" panose="02040503050406030204" pitchFamily="18" charset="0"/>
+                                </a:rPr>
+                                <m:t>2</m:t>
+                              </m:r>
+                            </m:den>
+                          </m:f>
+                        </m:e>
+                      </m:box>
+                      <m:r>
+                        <a:rPr lang="en-US" sz="1400" b="0" i="1" smtClean="0">
+                          <a:latin typeface="Cambria Math" panose="02040503050406030204" pitchFamily="18" charset="0"/>
+                        </a:rPr>
+                        <m:t>𝑑𝑐𝑜𝑛𝑒</m:t>
+                      </m:r>
+                    </m:oMath>
+                  </m:oMathPara>
+                </a14:m>
+                <a:endParaRPr lang="en-US" sz="1400" dirty="0"/>
+              </a:p>
+            </p:txBody>
+          </p:sp>
+        </mc:Choice>
+        <mc:Fallback>
+          <p:sp>
+            <p:nvSpPr>
+              <p:cNvPr id="83" name="TextBox 82">
+                <a:extLst>
+                  <a:ext uri="{FF2B5EF4-FFF2-40B4-BE49-F238E27FC236}">
+                    <a16:creationId xmlns:a16="http://schemas.microsoft.com/office/drawing/2014/main" id="{91724388-540C-41E8-BF8E-1AF7164F5375}"/>
+                  </a:ext>
+                </a:extLst>
+              </p:cNvPr>
+              <p:cNvSpPr txBox="1">
+                <a:spLocks noRot="1" noChangeAspect="1" noMove="1" noResize="1" noEditPoints="1" noAdjustHandles="1" noChangeArrowheads="1" noChangeShapeType="1" noTextEdit="1"/>
+              </p:cNvSpPr>
+              <p:nvPr/>
+            </p:nvSpPr>
+            <p:spPr>
+              <a:xfrm>
+                <a:off x="7219948" y="3505334"/>
+                <a:ext cx="611514" cy="251094"/>
+              </a:xfrm>
+              <a:prstGeom prst="rect">
+                <a:avLst/>
+              </a:prstGeom>
+              <a:blipFill>
+                <a:blip r:embed="rId5"/>
+                <a:stretch>
+                  <a:fillRect l="-1980" r="-3960" b="-17073"/>
+                </a:stretch>
+              </a:blipFill>
+            </p:spPr>
+            <p:txBody>
+              <a:bodyPr/>
+              <a:lstStyle/>
+              <a:p>
+                <a:r>
+                  <a:rPr lang="en-US">
+                    <a:noFill/>
+                  </a:rPr>
+                  <a:t> </a:t>
+                </a:r>
+              </a:p>
+            </p:txBody>
+          </p:sp>
+        </mc:Fallback>
+      </mc:AlternateContent>
+      <p:cxnSp>
+        <p:nvCxnSpPr>
+          <p:cNvPr id="85" name="Straight Connector 84">
+            <a:extLst>
+              <a:ext uri="{FF2B5EF4-FFF2-40B4-BE49-F238E27FC236}">
+                <a16:creationId xmlns:a16="http://schemas.microsoft.com/office/drawing/2014/main" id="{038B7F5A-50BD-4100-93AF-6AB60ACB9648}"/>
+              </a:ext>
+            </a:extLst>
+          </p:cNvPr>
+          <p:cNvCxnSpPr>
+            <a:stCxn id="42" idx="1"/>
+          </p:cNvCxnSpPr>
+          <p:nvPr/>
+        </p:nvCxnSpPr>
+        <p:spPr bwMode="auto">
+          <a:xfrm flipH="1">
+            <a:off x="2720793" y="3085593"/>
+            <a:ext cx="219" cy="670835"/>
+          </a:xfrm>
+          <a:prstGeom prst="line">
+            <a:avLst/>
+          </a:prstGeom>
+          <a:solidFill>
+            <a:schemeClr val="accent1"/>
+          </a:solidFill>
+          <a:ln w="12700" cap="flat" cmpd="sng" algn="ctr">
+            <a:solidFill>
+              <a:schemeClr val="tx1"/>
+            </a:solidFill>
+            <a:prstDash val="solid"/>
+            <a:round/>
+            <a:headEnd type="none" w="med" len="med"/>
+            <a:tailEnd type="none" w="med" len="med"/>
+          </a:ln>
+          <a:effectLst/>
+        </p:spPr>
+      </p:cxnSp>
+      <p:cxnSp>
+        <p:nvCxnSpPr>
+          <p:cNvPr id="87" name="Straight Arrow Connector 86">
+            <a:extLst>
+              <a:ext uri="{FF2B5EF4-FFF2-40B4-BE49-F238E27FC236}">
+                <a16:creationId xmlns:a16="http://schemas.microsoft.com/office/drawing/2014/main" id="{F4B3DE11-F99E-4636-B2A9-83D1F5D3F86E}"/>
+              </a:ext>
+            </a:extLst>
+          </p:cNvPr>
+          <p:cNvCxnSpPr/>
+          <p:nvPr/>
+        </p:nvCxnSpPr>
+        <p:spPr bwMode="auto">
+          <a:xfrm>
+            <a:off x="2728413" y="3460750"/>
+            <a:ext cx="2543357" cy="0"/>
+          </a:xfrm>
+          <a:prstGeom prst="straightConnector1">
+            <a:avLst/>
+          </a:prstGeom>
+          <a:solidFill>
+            <a:schemeClr val="accent1"/>
+          </a:solidFill>
+          <a:ln w="12700" cap="flat" cmpd="sng" algn="ctr">
+            <a:solidFill>
+              <a:schemeClr val="tx1"/>
+            </a:solidFill>
+            <a:prstDash val="solid"/>
+            <a:round/>
+            <a:headEnd type="stealth" w="med" len="med"/>
+            <a:tailEnd type="stealth" w="med" len="med"/>
+          </a:ln>
+          <a:effectLst/>
+        </p:spPr>
+      </p:cxnSp>
+      <p:sp>
+        <p:nvSpPr>
+          <p:cNvPr id="88" name="TextBox 87">
+            <a:extLst>
+              <a:ext uri="{FF2B5EF4-FFF2-40B4-BE49-F238E27FC236}">
+                <a16:creationId xmlns:a16="http://schemas.microsoft.com/office/drawing/2014/main" id="{D73853DF-6832-4DC8-B37B-50FBA225AE9D}"/>
+              </a:ext>
+            </a:extLst>
+          </p:cNvPr>
+          <p:cNvSpPr txBox="1"/>
+          <p:nvPr/>
+        </p:nvSpPr>
+        <p:spPr>
+          <a:xfrm>
+            <a:off x="3671977" y="3480475"/>
+            <a:ext cx="441146" cy="338554"/>
+          </a:xfrm>
+          <a:prstGeom prst="rect">
+            <a:avLst/>
+          </a:prstGeom>
+          <a:noFill/>
+        </p:spPr>
+        <p:txBody>
+          <a:bodyPr wrap="none" rtlCol="0">
+            <a:spAutoFit/>
+          </a:bodyPr>
+          <a:lstStyle/>
+          <a:p>
+            <a:r>
+              <a:rPr lang="en-US" sz="1600" i="1" dirty="0" err="1">
+                <a:latin typeface="Times New Roman" panose="02020603050405020304" pitchFamily="18" charset="0"/>
+                <a:cs typeface="Times New Roman" panose="02020603050405020304" pitchFamily="18" charset="0"/>
+              </a:rPr>
+              <a:t>l</a:t>
+            </a:r>
+            <a:r>
+              <a:rPr lang="en-US" sz="1600" baseline="-25000" dirty="0" err="1">
+                <a:latin typeface="Times New Roman" panose="02020603050405020304" pitchFamily="18" charset="0"/>
+                <a:cs typeface="Times New Roman" panose="02020603050405020304" pitchFamily="18" charset="0"/>
+              </a:rPr>
+              <a:t>noz</a:t>
+            </a:r>
+            <a:endParaRPr lang="en-US" sz="1600" baseline="-25000" dirty="0">
+              <a:latin typeface="Times New Roman" panose="02020603050405020304" pitchFamily="18" charset="0"/>
+              <a:cs typeface="Times New Roman" panose="02020603050405020304" pitchFamily="18" charset="0"/>
+            </a:endParaRPr>
+          </a:p>
+        </p:txBody>
+      </p:sp>
+      <p:cxnSp>
+        <p:nvCxnSpPr>
+          <p:cNvPr id="90" name="Straight Connector 89">
+            <a:extLst>
+              <a:ext uri="{FF2B5EF4-FFF2-40B4-BE49-F238E27FC236}">
+                <a16:creationId xmlns:a16="http://schemas.microsoft.com/office/drawing/2014/main" id="{9C2634F4-84AB-4B9C-BDB7-465B195DD0ED}"/>
+              </a:ext>
+            </a:extLst>
+          </p:cNvPr>
+          <p:cNvCxnSpPr>
+            <a:cxnSpLocks/>
+          </p:cNvCxnSpPr>
+          <p:nvPr/>
+        </p:nvCxnSpPr>
+        <p:spPr bwMode="auto">
+          <a:xfrm>
+            <a:off x="2396976" y="2600942"/>
+            <a:ext cx="427187" cy="420807"/>
+          </a:xfrm>
+          <a:prstGeom prst="line">
+            <a:avLst/>
+          </a:prstGeom>
+          <a:solidFill>
+            <a:schemeClr val="accent1"/>
+          </a:solidFill>
+          <a:ln w="3175" cap="flat" cmpd="sng" algn="ctr">
+            <a:solidFill>
+              <a:schemeClr val="tx1"/>
+            </a:solidFill>
+            <a:prstDash val="solid"/>
+            <a:round/>
+            <a:headEnd type="none" w="med" len="med"/>
+            <a:tailEnd type="none" w="med" len="med"/>
+          </a:ln>
+          <a:effectLst/>
+        </p:spPr>
+      </p:cxnSp>
+      <p:cxnSp>
+        <p:nvCxnSpPr>
+          <p:cNvPr id="93" name="Straight Arrow Connector 92">
+            <a:extLst>
+              <a:ext uri="{FF2B5EF4-FFF2-40B4-BE49-F238E27FC236}">
+                <a16:creationId xmlns:a16="http://schemas.microsoft.com/office/drawing/2014/main" id="{2B8D53CD-BB92-4468-8B42-E8242A3114A3}"/>
+              </a:ext>
+            </a:extLst>
+          </p:cNvPr>
+          <p:cNvCxnSpPr>
+            <a:endCxn id="53" idx="3"/>
+          </p:cNvCxnSpPr>
+          <p:nvPr/>
+        </p:nvCxnSpPr>
+        <p:spPr bwMode="auto">
+          <a:xfrm>
+            <a:off x="2396976" y="2600942"/>
+            <a:ext cx="346224" cy="342283"/>
+          </a:xfrm>
+          <a:prstGeom prst="straightConnector1">
+            <a:avLst/>
+          </a:prstGeom>
+          <a:solidFill>
+            <a:schemeClr val="accent1"/>
+          </a:solidFill>
+          <a:ln w="12700" cap="flat" cmpd="sng" algn="ctr">
+            <a:solidFill>
+              <a:schemeClr val="tx1"/>
+            </a:solidFill>
+            <a:prstDash val="solid"/>
+            <a:round/>
+            <a:headEnd type="none" w="med" len="med"/>
+            <a:tailEnd type="stealth" w="med" len="med"/>
+          </a:ln>
+          <a:effectLst/>
+        </p:spPr>
+      </p:cxnSp>
+      <p:sp>
+        <p:nvSpPr>
+          <p:cNvPr id="94" name="TextBox 93">
+            <a:extLst>
+              <a:ext uri="{FF2B5EF4-FFF2-40B4-BE49-F238E27FC236}">
+                <a16:creationId xmlns:a16="http://schemas.microsoft.com/office/drawing/2014/main" id="{B0BA9FDC-4322-4D85-B8B4-8465F7005462}"/>
+              </a:ext>
+            </a:extLst>
+          </p:cNvPr>
+          <p:cNvSpPr txBox="1"/>
+          <p:nvPr/>
+        </p:nvSpPr>
+        <p:spPr>
+          <a:xfrm>
+            <a:off x="2183263" y="2596310"/>
+            <a:ext cx="463588" cy="338554"/>
+          </a:xfrm>
+          <a:prstGeom prst="rect">
+            <a:avLst/>
+          </a:prstGeom>
+          <a:noFill/>
+        </p:spPr>
+        <p:txBody>
+          <a:bodyPr wrap="none" rtlCol="0">
+            <a:spAutoFit/>
+          </a:bodyPr>
+          <a:lstStyle/>
+          <a:p>
+            <a:r>
+              <a:rPr lang="en-US" sz="1600" i="1" dirty="0" err="1">
+                <a:latin typeface="Times New Roman" panose="02020603050405020304" pitchFamily="18" charset="0"/>
+                <a:cs typeface="Times New Roman" panose="02020603050405020304" pitchFamily="18" charset="0"/>
+              </a:rPr>
+              <a:t>r</a:t>
+            </a:r>
+            <a:r>
+              <a:rPr lang="en-US" sz="1600" baseline="-25000" dirty="0" err="1">
+                <a:latin typeface="Times New Roman" panose="02020603050405020304" pitchFamily="18" charset="0"/>
+                <a:cs typeface="Times New Roman" panose="02020603050405020304" pitchFamily="18" charset="0"/>
+              </a:rPr>
+              <a:t>noz</a:t>
+            </a:r>
+            <a:endParaRPr lang="en-US" sz="1600" baseline="-25000" dirty="0">
+              <a:latin typeface="Times New Roman" panose="02020603050405020304" pitchFamily="18" charset="0"/>
+              <a:cs typeface="Times New Roman" panose="02020603050405020304" pitchFamily="18" charset="0"/>
+            </a:endParaRPr>
+          </a:p>
+        </p:txBody>
+      </p:sp>
+    </p:spTree>
+    <p:extLst>
+      <p:ext uri="{BB962C8B-B14F-4D97-AF65-F5344CB8AC3E}">
+        <p14:creationId xmlns:p14="http://schemas.microsoft.com/office/powerpoint/2010/main" val="2843157709"/>
+      </p:ext>
+    </p:extLst>
+  </p:cSld>
+  <p:clrMapOvr>
+    <a:masterClrMapping/>
+  </p:clrMapOvr>
+</p:sld>
+</file>
+
 <file path=ppt/theme/theme1.xml><?xml version="1.0" encoding="utf-8"?>
 <a:theme xmlns:a="http://schemas.openxmlformats.org/drawingml/2006/main" name="me-why its worth it">
   <a:themeElements>

</xml_diff>

<commit_message>
Deploy website - based on 9e5d8c665368e86f6eedf8c1d72aa9e2d4de7608
</commit_message>
<xml_diff>
--- a/image-support.pptx
+++ b/image-support.pptx
@@ -5,14 +5,15 @@
     <p:sldMasterId id="2147483648" r:id="rId1"/>
   </p:sldMasterIdLst>
   <p:notesMasterIdLst>
-    <p:notesMasterId r:id="rId4"/>
+    <p:notesMasterId r:id="rId5"/>
   </p:notesMasterIdLst>
   <p:handoutMasterIdLst>
-    <p:handoutMasterId r:id="rId5"/>
+    <p:handoutMasterId r:id="rId6"/>
   </p:handoutMasterIdLst>
   <p:sldIdLst>
     <p:sldId id="432" r:id="rId2"/>
     <p:sldId id="433" r:id="rId3"/>
+    <p:sldId id="434" r:id="rId4"/>
   </p:sldIdLst>
   <p:sldSz cx="10842625" cy="6099175"/>
   <p:notesSz cx="6797675" cy="9929813"/>
@@ -189,7 +190,7 @@
 <file path=ppt/revisionInfo.xml><?xml version="1.0" encoding="utf-8"?>
 <p1510:revInfo xmlns:a="http://schemas.openxmlformats.org/drawingml/2006/main" xmlns:r="http://schemas.openxmlformats.org/officeDocument/2006/relationships" xmlns:p1510="http://schemas.microsoft.com/office/powerpoint/2015/10/main">
   <p1510:revLst>
-    <p1510:client id="{45311A73-93A6-4B44-9F30-450DD51E0866}" v="124" dt="2021-04-13T07:35:58.016"/>
+    <p1510:client id="{45311A73-93A6-4B44-9F30-450DD51E0866}" v="328" dt="2021-05-13T13:42:23.304"/>
   </p1510:revLst>
 </p1510:revInfo>
 </file>
@@ -199,7 +200,7 @@
   <pc:docChgLst>
     <pc:chgData name="Federico Perini" userId="dd6016fc4604f770" providerId="LiveId" clId="{45311A73-93A6-4B44-9F30-450DD51E0866}"/>
     <pc:docChg chg="custSel addSld delSld modSld">
-      <pc:chgData name="Federico Perini" userId="dd6016fc4604f770" providerId="LiveId" clId="{45311A73-93A6-4B44-9F30-450DD51E0866}" dt="2021-04-13T07:36:02.692" v="471" actId="1076"/>
+      <pc:chgData name="Federico Perini" userId="dd6016fc4604f770" providerId="LiveId" clId="{45311A73-93A6-4B44-9F30-450DD51E0866}" dt="2021-05-13T13:42:26.365" v="686" actId="1076"/>
       <pc:docMkLst>
         <pc:docMk/>
       </pc:docMkLst>
@@ -896,6 +897,365 @@
           <ac:cxnSpMkLst>
             <pc:docMk/>
             <pc:sldMk cId="2843157709" sldId="433"/>
+            <ac:cxnSpMk id="93" creationId="{2B8D53CD-BB92-4468-8B42-E8242A3114A3}"/>
+          </ac:cxnSpMkLst>
+        </pc:cxnChg>
+      </pc:sldChg>
+      <pc:sldChg chg="addSp delSp modSp add mod">
+        <pc:chgData name="Federico Perini" userId="dd6016fc4604f770" providerId="LiveId" clId="{45311A73-93A6-4B44-9F30-450DD51E0866}" dt="2021-05-13T13:42:26.365" v="686" actId="1076"/>
+        <pc:sldMkLst>
+          <pc:docMk/>
+          <pc:sldMk cId="3147353065" sldId="434"/>
+        </pc:sldMkLst>
+        <pc:spChg chg="add mod">
+          <ac:chgData name="Federico Perini" userId="dd6016fc4604f770" providerId="LiveId" clId="{45311A73-93A6-4B44-9F30-450DD51E0866}" dt="2021-05-13T13:42:26.365" v="686" actId="1076"/>
+          <ac:spMkLst>
+            <pc:docMk/>
+            <pc:sldMk cId="3147353065" sldId="434"/>
+            <ac:spMk id="2" creationId="{7CA85727-4A73-4B10-8178-C06B0B2B33C5}"/>
+          </ac:spMkLst>
+        </pc:spChg>
+        <pc:spChg chg="del">
+          <ac:chgData name="Federico Perini" userId="dd6016fc4604f770" providerId="LiveId" clId="{45311A73-93A6-4B44-9F30-450DD51E0866}" dt="2021-05-13T13:36:14.070" v="473" actId="478"/>
+          <ac:spMkLst>
+            <pc:docMk/>
+            <pc:sldMk cId="3147353065" sldId="434"/>
+            <ac:spMk id="9" creationId="{A78AAF1C-2ACF-4BA7-AABA-7BC2A14D6212}"/>
+          </ac:spMkLst>
+        </pc:spChg>
+        <pc:spChg chg="del">
+          <ac:chgData name="Federico Perini" userId="dd6016fc4604f770" providerId="LiveId" clId="{45311A73-93A6-4B44-9F30-450DD51E0866}" dt="2021-05-13T13:36:14.070" v="473" actId="478"/>
+          <ac:spMkLst>
+            <pc:docMk/>
+            <pc:sldMk cId="3147353065" sldId="434"/>
+            <ac:spMk id="10" creationId="{B68D206D-33D7-4C9C-9E42-3496689EA8EE}"/>
+          </ac:spMkLst>
+        </pc:spChg>
+        <pc:spChg chg="del">
+          <ac:chgData name="Federico Perini" userId="dd6016fc4604f770" providerId="LiveId" clId="{45311A73-93A6-4B44-9F30-450DD51E0866}" dt="2021-05-13T13:36:14.070" v="473" actId="478"/>
+          <ac:spMkLst>
+            <pc:docMk/>
+            <pc:sldMk cId="3147353065" sldId="434"/>
+            <ac:spMk id="11" creationId="{9EA85414-DB47-4070-9511-E70324BD5938}"/>
+          </ac:spMkLst>
+        </pc:spChg>
+        <pc:spChg chg="del">
+          <ac:chgData name="Federico Perini" userId="dd6016fc4604f770" providerId="LiveId" clId="{45311A73-93A6-4B44-9F30-450DD51E0866}" dt="2021-05-13T13:36:14.070" v="473" actId="478"/>
+          <ac:spMkLst>
+            <pc:docMk/>
+            <pc:sldMk cId="3147353065" sldId="434"/>
+            <ac:spMk id="24" creationId="{D900886B-0F11-44EB-8359-FF229BAE92FB}"/>
+          </ac:spMkLst>
+        </pc:spChg>
+        <pc:spChg chg="del">
+          <ac:chgData name="Federico Perini" userId="dd6016fc4604f770" providerId="LiveId" clId="{45311A73-93A6-4B44-9F30-450DD51E0866}" dt="2021-05-13T13:36:14.070" v="473" actId="478"/>
+          <ac:spMkLst>
+            <pc:docMk/>
+            <pc:sldMk cId="3147353065" sldId="434"/>
+            <ac:spMk id="27" creationId="{DD3D9F46-54F7-41C6-8064-C5869699B704}"/>
+          </ac:spMkLst>
+        </pc:spChg>
+        <pc:spChg chg="del">
+          <ac:chgData name="Federico Perini" userId="dd6016fc4604f770" providerId="LiveId" clId="{45311A73-93A6-4B44-9F30-450DD51E0866}" dt="2021-05-13T13:36:14.070" v="473" actId="478"/>
+          <ac:spMkLst>
+            <pc:docMk/>
+            <pc:sldMk cId="3147353065" sldId="434"/>
+            <ac:spMk id="33" creationId="{29169F80-F0BB-4608-87E7-E27560D3FE64}"/>
+          </ac:spMkLst>
+        </pc:spChg>
+        <pc:spChg chg="del">
+          <ac:chgData name="Federico Perini" userId="dd6016fc4604f770" providerId="LiveId" clId="{45311A73-93A6-4B44-9F30-450DD51E0866}" dt="2021-05-13T13:36:14.070" v="473" actId="478"/>
+          <ac:spMkLst>
+            <pc:docMk/>
+            <pc:sldMk cId="3147353065" sldId="434"/>
+            <ac:spMk id="38" creationId="{8F74858C-0AEF-43D1-9BF9-48BFBF7816FB}"/>
+          </ac:spMkLst>
+        </pc:spChg>
+        <pc:spChg chg="del">
+          <ac:chgData name="Federico Perini" userId="dd6016fc4604f770" providerId="LiveId" clId="{45311A73-93A6-4B44-9F30-450DD51E0866}" dt="2021-05-13T13:36:14.070" v="473" actId="478"/>
+          <ac:spMkLst>
+            <pc:docMk/>
+            <pc:sldMk cId="3147353065" sldId="434"/>
+            <ac:spMk id="39" creationId="{B9E68D01-A5A6-43AD-9DF4-828B444DBBA4}"/>
+          </ac:spMkLst>
+        </pc:spChg>
+        <pc:spChg chg="del">
+          <ac:chgData name="Federico Perini" userId="dd6016fc4604f770" providerId="LiveId" clId="{45311A73-93A6-4B44-9F30-450DD51E0866}" dt="2021-05-13T13:36:14.070" v="473" actId="478"/>
+          <ac:spMkLst>
+            <pc:docMk/>
+            <pc:sldMk cId="3147353065" sldId="434"/>
+            <ac:spMk id="42" creationId="{40D67641-89CD-4D3F-B1BB-9D28FBB736C0}"/>
+          </ac:spMkLst>
+        </pc:spChg>
+        <pc:spChg chg="del">
+          <ac:chgData name="Federico Perini" userId="dd6016fc4604f770" providerId="LiveId" clId="{45311A73-93A6-4B44-9F30-450DD51E0866}" dt="2021-05-13T13:36:14.070" v="473" actId="478"/>
+          <ac:spMkLst>
+            <pc:docMk/>
+            <pc:sldMk cId="3147353065" sldId="434"/>
+            <ac:spMk id="44" creationId="{5488D58A-C57D-462C-A2C5-931DD08C0835}"/>
+          </ac:spMkLst>
+        </pc:spChg>
+        <pc:spChg chg="del">
+          <ac:chgData name="Federico Perini" userId="dd6016fc4604f770" providerId="LiveId" clId="{45311A73-93A6-4B44-9F30-450DD51E0866}" dt="2021-05-13T13:36:14.070" v="473" actId="478"/>
+          <ac:spMkLst>
+            <pc:docMk/>
+            <pc:sldMk cId="3147353065" sldId="434"/>
+            <ac:spMk id="47" creationId="{30006478-F2C2-4EB9-BFFD-79B11F094D70}"/>
+          </ac:spMkLst>
+        </pc:spChg>
+        <pc:spChg chg="del">
+          <ac:chgData name="Federico Perini" userId="dd6016fc4604f770" providerId="LiveId" clId="{45311A73-93A6-4B44-9F30-450DD51E0866}" dt="2021-05-13T13:36:14.070" v="473" actId="478"/>
+          <ac:spMkLst>
+            <pc:docMk/>
+            <pc:sldMk cId="3147353065" sldId="434"/>
+            <ac:spMk id="52" creationId="{8C0053EF-069D-4EA9-93BD-0D16AAD3655B}"/>
+          </ac:spMkLst>
+        </pc:spChg>
+        <pc:spChg chg="del">
+          <ac:chgData name="Federico Perini" userId="dd6016fc4604f770" providerId="LiveId" clId="{45311A73-93A6-4B44-9F30-450DD51E0866}" dt="2021-05-13T13:36:14.070" v="473" actId="478"/>
+          <ac:spMkLst>
+            <pc:docMk/>
+            <pc:sldMk cId="3147353065" sldId="434"/>
+            <ac:spMk id="53" creationId="{2D43FE73-23A7-4090-A3BE-DC5BEFBEBC9C}"/>
+          </ac:spMkLst>
+        </pc:spChg>
+        <pc:spChg chg="del">
+          <ac:chgData name="Federico Perini" userId="dd6016fc4604f770" providerId="LiveId" clId="{45311A73-93A6-4B44-9F30-450DD51E0866}" dt="2021-05-13T13:36:14.070" v="473" actId="478"/>
+          <ac:spMkLst>
+            <pc:docMk/>
+            <pc:sldMk cId="3147353065" sldId="434"/>
+            <ac:spMk id="54" creationId="{D83B0A10-05E8-465E-B362-360F98679D3B}"/>
+          </ac:spMkLst>
+        </pc:spChg>
+        <pc:spChg chg="del">
+          <ac:chgData name="Federico Perini" userId="dd6016fc4604f770" providerId="LiveId" clId="{45311A73-93A6-4B44-9F30-450DD51E0866}" dt="2021-05-13T13:36:14.070" v="473" actId="478"/>
+          <ac:spMkLst>
+            <pc:docMk/>
+            <pc:sldMk cId="3147353065" sldId="434"/>
+            <ac:spMk id="57" creationId="{3D1E7587-D463-4CA6-A137-6BA51D6E9B1B}"/>
+          </ac:spMkLst>
+        </pc:spChg>
+        <pc:spChg chg="del">
+          <ac:chgData name="Federico Perini" userId="dd6016fc4604f770" providerId="LiveId" clId="{45311A73-93A6-4B44-9F30-450DD51E0866}" dt="2021-05-13T13:36:14.070" v="473" actId="478"/>
+          <ac:spMkLst>
+            <pc:docMk/>
+            <pc:sldMk cId="3147353065" sldId="434"/>
+            <ac:spMk id="58" creationId="{BEA21552-E8BA-447D-88CE-3EBCE3A50FF9}"/>
+          </ac:spMkLst>
+        </pc:spChg>
+        <pc:spChg chg="del">
+          <ac:chgData name="Federico Perini" userId="dd6016fc4604f770" providerId="LiveId" clId="{45311A73-93A6-4B44-9F30-450DD51E0866}" dt="2021-05-13T13:36:14.070" v="473" actId="478"/>
+          <ac:spMkLst>
+            <pc:docMk/>
+            <pc:sldMk cId="3147353065" sldId="434"/>
+            <ac:spMk id="59" creationId="{DDCBB5C1-086B-4DE8-AB82-5947664F5DEC}"/>
+          </ac:spMkLst>
+        </pc:spChg>
+        <pc:spChg chg="del">
+          <ac:chgData name="Federico Perini" userId="dd6016fc4604f770" providerId="LiveId" clId="{45311A73-93A6-4B44-9F30-450DD51E0866}" dt="2021-05-13T13:36:14.070" v="473" actId="478"/>
+          <ac:spMkLst>
+            <pc:docMk/>
+            <pc:sldMk cId="3147353065" sldId="434"/>
+            <ac:spMk id="75" creationId="{2937CF8F-1219-4822-8DAA-9263CD56EC68}"/>
+          </ac:spMkLst>
+        </pc:spChg>
+        <pc:spChg chg="del">
+          <ac:chgData name="Federico Perini" userId="dd6016fc4604f770" providerId="LiveId" clId="{45311A73-93A6-4B44-9F30-450DD51E0866}" dt="2021-05-13T13:36:14.070" v="473" actId="478"/>
+          <ac:spMkLst>
+            <pc:docMk/>
+            <pc:sldMk cId="3147353065" sldId="434"/>
+            <ac:spMk id="76" creationId="{C875A2FB-911C-4423-8DCD-31E9B8A97E69}"/>
+          </ac:spMkLst>
+        </pc:spChg>
+        <pc:spChg chg="del">
+          <ac:chgData name="Federico Perini" userId="dd6016fc4604f770" providerId="LiveId" clId="{45311A73-93A6-4B44-9F30-450DD51E0866}" dt="2021-05-13T13:36:14.070" v="473" actId="478"/>
+          <ac:spMkLst>
+            <pc:docMk/>
+            <pc:sldMk cId="3147353065" sldId="434"/>
+            <ac:spMk id="78" creationId="{ECF36B7F-E5A4-4459-A2B1-84E6741D3DCD}"/>
+          </ac:spMkLst>
+        </pc:spChg>
+        <pc:spChg chg="del">
+          <ac:chgData name="Federico Perini" userId="dd6016fc4604f770" providerId="LiveId" clId="{45311A73-93A6-4B44-9F30-450DD51E0866}" dt="2021-05-13T13:36:14.070" v="473" actId="478"/>
+          <ac:spMkLst>
+            <pc:docMk/>
+            <pc:sldMk cId="3147353065" sldId="434"/>
+            <ac:spMk id="79" creationId="{7BED8B2B-BE3F-4350-947E-211AD236E89D}"/>
+          </ac:spMkLst>
+        </pc:spChg>
+        <pc:spChg chg="del">
+          <ac:chgData name="Federico Perini" userId="dd6016fc4604f770" providerId="LiveId" clId="{45311A73-93A6-4B44-9F30-450DD51E0866}" dt="2021-05-13T13:36:14.070" v="473" actId="478"/>
+          <ac:spMkLst>
+            <pc:docMk/>
+            <pc:sldMk cId="3147353065" sldId="434"/>
+            <ac:spMk id="82" creationId="{FE47F98E-E595-4877-A0E6-CCF4DF559AF6}"/>
+          </ac:spMkLst>
+        </pc:spChg>
+        <pc:spChg chg="del">
+          <ac:chgData name="Federico Perini" userId="dd6016fc4604f770" providerId="LiveId" clId="{45311A73-93A6-4B44-9F30-450DD51E0866}" dt="2021-05-13T13:36:14.070" v="473" actId="478"/>
+          <ac:spMkLst>
+            <pc:docMk/>
+            <pc:sldMk cId="3147353065" sldId="434"/>
+            <ac:spMk id="83" creationId="{91724388-540C-41E8-BF8E-1AF7164F5375}"/>
+          </ac:spMkLst>
+        </pc:spChg>
+        <pc:spChg chg="del">
+          <ac:chgData name="Federico Perini" userId="dd6016fc4604f770" providerId="LiveId" clId="{45311A73-93A6-4B44-9F30-450DD51E0866}" dt="2021-05-13T13:36:14.070" v="473" actId="478"/>
+          <ac:spMkLst>
+            <pc:docMk/>
+            <pc:sldMk cId="3147353065" sldId="434"/>
+            <ac:spMk id="88" creationId="{D73853DF-6832-4DC8-B37B-50FBA225AE9D}"/>
+          </ac:spMkLst>
+        </pc:spChg>
+        <pc:spChg chg="del">
+          <ac:chgData name="Federico Perini" userId="dd6016fc4604f770" providerId="LiveId" clId="{45311A73-93A6-4B44-9F30-450DD51E0866}" dt="2021-05-13T13:36:14.070" v="473" actId="478"/>
+          <ac:spMkLst>
+            <pc:docMk/>
+            <pc:sldMk cId="3147353065" sldId="434"/>
+            <ac:spMk id="94" creationId="{B0BA9FDC-4322-4D85-B8B4-8465F7005462}"/>
+          </ac:spMkLst>
+        </pc:spChg>
+        <pc:cxnChg chg="del">
+          <ac:chgData name="Federico Perini" userId="dd6016fc4604f770" providerId="LiveId" clId="{45311A73-93A6-4B44-9F30-450DD51E0866}" dt="2021-05-13T13:36:14.070" v="473" actId="478"/>
+          <ac:cxnSpMkLst>
+            <pc:docMk/>
+            <pc:sldMk cId="3147353065" sldId="434"/>
+            <ac:cxnSpMk id="4" creationId="{7921328B-2C09-4125-AAA5-D3D09144D788}"/>
+          </ac:cxnSpMkLst>
+        </pc:cxnChg>
+        <pc:cxnChg chg="del">
+          <ac:chgData name="Federico Perini" userId="dd6016fc4604f770" providerId="LiveId" clId="{45311A73-93A6-4B44-9F30-450DD51E0866}" dt="2021-05-13T13:36:14.070" v="473" actId="478"/>
+          <ac:cxnSpMkLst>
+            <pc:docMk/>
+            <pc:sldMk cId="3147353065" sldId="434"/>
+            <ac:cxnSpMk id="8" creationId="{6C6AE182-4CEA-420F-B476-E11F3BA976A2}"/>
+          </ac:cxnSpMkLst>
+        </pc:cxnChg>
+        <pc:cxnChg chg="del mod">
+          <ac:chgData name="Federico Perini" userId="dd6016fc4604f770" providerId="LiveId" clId="{45311A73-93A6-4B44-9F30-450DD51E0866}" dt="2021-05-13T13:36:14.070" v="473" actId="478"/>
+          <ac:cxnSpMkLst>
+            <pc:docMk/>
+            <pc:sldMk cId="3147353065" sldId="434"/>
+            <ac:cxnSpMk id="14" creationId="{D6F4BFD0-4EBE-4A03-AE7C-DFB8001D33C0}"/>
+          </ac:cxnSpMkLst>
+        </pc:cxnChg>
+        <pc:cxnChg chg="del">
+          <ac:chgData name="Federico Perini" userId="dd6016fc4604f770" providerId="LiveId" clId="{45311A73-93A6-4B44-9F30-450DD51E0866}" dt="2021-05-13T13:36:14.070" v="473" actId="478"/>
+          <ac:cxnSpMkLst>
+            <pc:docMk/>
+            <pc:sldMk cId="3147353065" sldId="434"/>
+            <ac:cxnSpMk id="16" creationId="{87D2A089-4ED3-43BE-AC83-9498EE71977C}"/>
+          </ac:cxnSpMkLst>
+        </pc:cxnChg>
+        <pc:cxnChg chg="del">
+          <ac:chgData name="Federico Perini" userId="dd6016fc4604f770" providerId="LiveId" clId="{45311A73-93A6-4B44-9F30-450DD51E0866}" dt="2021-05-13T13:36:14.070" v="473" actId="478"/>
+          <ac:cxnSpMkLst>
+            <pc:docMk/>
+            <pc:sldMk cId="3147353065" sldId="434"/>
+            <ac:cxnSpMk id="22" creationId="{1161C517-2388-44AB-BF33-CF9C6F4F225A}"/>
+          </ac:cxnSpMkLst>
+        </pc:cxnChg>
+        <pc:cxnChg chg="del">
+          <ac:chgData name="Federico Perini" userId="dd6016fc4604f770" providerId="LiveId" clId="{45311A73-93A6-4B44-9F30-450DD51E0866}" dt="2021-05-13T13:36:14.070" v="473" actId="478"/>
+          <ac:cxnSpMkLst>
+            <pc:docMk/>
+            <pc:sldMk cId="3147353065" sldId="434"/>
+            <ac:cxnSpMk id="30" creationId="{420131B1-DB1A-4213-BED5-FB75D48EC56C}"/>
+          </ac:cxnSpMkLst>
+        </pc:cxnChg>
+        <pc:cxnChg chg="del">
+          <ac:chgData name="Federico Perini" userId="dd6016fc4604f770" providerId="LiveId" clId="{45311A73-93A6-4B44-9F30-450DD51E0866}" dt="2021-05-13T13:36:14.070" v="473" actId="478"/>
+          <ac:cxnSpMkLst>
+            <pc:docMk/>
+            <pc:sldMk cId="3147353065" sldId="434"/>
+            <ac:cxnSpMk id="45" creationId="{1BE5D484-2BB9-4D8F-A8B0-16AA8E722A8C}"/>
+          </ac:cxnSpMkLst>
+        </pc:cxnChg>
+        <pc:cxnChg chg="del">
+          <ac:chgData name="Federico Perini" userId="dd6016fc4604f770" providerId="LiveId" clId="{45311A73-93A6-4B44-9F30-450DD51E0866}" dt="2021-05-13T13:36:14.070" v="473" actId="478"/>
+          <ac:cxnSpMkLst>
+            <pc:docMk/>
+            <pc:sldMk cId="3147353065" sldId="434"/>
+            <ac:cxnSpMk id="49" creationId="{BAB3B170-8502-4525-9CD5-6E6206926D5A}"/>
+          </ac:cxnSpMkLst>
+        </pc:cxnChg>
+        <pc:cxnChg chg="del">
+          <ac:chgData name="Federico Perini" userId="dd6016fc4604f770" providerId="LiveId" clId="{45311A73-93A6-4B44-9F30-450DD51E0866}" dt="2021-05-13T13:36:14.070" v="473" actId="478"/>
+          <ac:cxnSpMkLst>
+            <pc:docMk/>
+            <pc:sldMk cId="3147353065" sldId="434"/>
+            <ac:cxnSpMk id="55" creationId="{65CF02BF-D5A7-402B-BA1B-E80DA402FAD9}"/>
+          </ac:cxnSpMkLst>
+        </pc:cxnChg>
+        <pc:cxnChg chg="del mod">
+          <ac:chgData name="Federico Perini" userId="dd6016fc4604f770" providerId="LiveId" clId="{45311A73-93A6-4B44-9F30-450DD51E0866}" dt="2021-05-13T13:36:14.070" v="473" actId="478"/>
+          <ac:cxnSpMkLst>
+            <pc:docMk/>
+            <pc:sldMk cId="3147353065" sldId="434"/>
+            <ac:cxnSpMk id="60" creationId="{DDB012EF-6910-4B4B-9967-32F9DB68CE01}"/>
+          </ac:cxnSpMkLst>
+        </pc:cxnChg>
+        <pc:cxnChg chg="del">
+          <ac:chgData name="Federico Perini" userId="dd6016fc4604f770" providerId="LiveId" clId="{45311A73-93A6-4B44-9F30-450DD51E0866}" dt="2021-05-13T13:36:14.070" v="473" actId="478"/>
+          <ac:cxnSpMkLst>
+            <pc:docMk/>
+            <pc:sldMk cId="3147353065" sldId="434"/>
+            <ac:cxnSpMk id="65" creationId="{DC32CFDB-56A0-442D-A27C-85A671DD574C}"/>
+          </ac:cxnSpMkLst>
+        </pc:cxnChg>
+        <pc:cxnChg chg="del">
+          <ac:chgData name="Federico Perini" userId="dd6016fc4604f770" providerId="LiveId" clId="{45311A73-93A6-4B44-9F30-450DD51E0866}" dt="2021-05-13T13:36:14.070" v="473" actId="478"/>
+          <ac:cxnSpMkLst>
+            <pc:docMk/>
+            <pc:sldMk cId="3147353065" sldId="434"/>
+            <ac:cxnSpMk id="70" creationId="{8953562F-C7D9-4E28-A0C6-707427D82B9D}"/>
+          </ac:cxnSpMkLst>
+        </pc:cxnChg>
+        <pc:cxnChg chg="del">
+          <ac:chgData name="Federico Perini" userId="dd6016fc4604f770" providerId="LiveId" clId="{45311A73-93A6-4B44-9F30-450DD51E0866}" dt="2021-05-13T13:36:14.070" v="473" actId="478"/>
+          <ac:cxnSpMkLst>
+            <pc:docMk/>
+            <pc:sldMk cId="3147353065" sldId="434"/>
+            <ac:cxnSpMk id="72" creationId="{30C6D1F9-8033-457A-B790-2FE9248A4B28}"/>
+          </ac:cxnSpMkLst>
+        </pc:cxnChg>
+        <pc:cxnChg chg="del">
+          <ac:chgData name="Federico Perini" userId="dd6016fc4604f770" providerId="LiveId" clId="{45311A73-93A6-4B44-9F30-450DD51E0866}" dt="2021-05-13T13:36:14.070" v="473" actId="478"/>
+          <ac:cxnSpMkLst>
+            <pc:docMk/>
+            <pc:sldMk cId="3147353065" sldId="434"/>
+            <ac:cxnSpMk id="74" creationId="{AD19FD21-DB61-478E-9A2A-008D16CCC0BD}"/>
+          </ac:cxnSpMkLst>
+        </pc:cxnChg>
+        <pc:cxnChg chg="del mod">
+          <ac:chgData name="Federico Perini" userId="dd6016fc4604f770" providerId="LiveId" clId="{45311A73-93A6-4B44-9F30-450DD51E0866}" dt="2021-05-13T13:36:14.070" v="473" actId="478"/>
+          <ac:cxnSpMkLst>
+            <pc:docMk/>
+            <pc:sldMk cId="3147353065" sldId="434"/>
+            <ac:cxnSpMk id="85" creationId="{038B7F5A-50BD-4100-93AF-6AB60ACB9648}"/>
+          </ac:cxnSpMkLst>
+        </pc:cxnChg>
+        <pc:cxnChg chg="del">
+          <ac:chgData name="Federico Perini" userId="dd6016fc4604f770" providerId="LiveId" clId="{45311A73-93A6-4B44-9F30-450DD51E0866}" dt="2021-05-13T13:36:14.070" v="473" actId="478"/>
+          <ac:cxnSpMkLst>
+            <pc:docMk/>
+            <pc:sldMk cId="3147353065" sldId="434"/>
+            <ac:cxnSpMk id="87" creationId="{F4B3DE11-F99E-4636-B2A9-83D1F5D3F86E}"/>
+          </ac:cxnSpMkLst>
+        </pc:cxnChg>
+        <pc:cxnChg chg="del">
+          <ac:chgData name="Federico Perini" userId="dd6016fc4604f770" providerId="LiveId" clId="{45311A73-93A6-4B44-9F30-450DD51E0866}" dt="2021-05-13T13:36:14.070" v="473" actId="478"/>
+          <ac:cxnSpMkLst>
+            <pc:docMk/>
+            <pc:sldMk cId="3147353065" sldId="434"/>
+            <ac:cxnSpMk id="90" creationId="{9C2634F4-84AB-4B9C-BDB7-465B195DD0ED}"/>
+          </ac:cxnSpMkLst>
+        </pc:cxnChg>
+        <pc:cxnChg chg="del mod">
+          <ac:chgData name="Federico Perini" userId="dd6016fc4604f770" providerId="LiveId" clId="{45311A73-93A6-4B44-9F30-450DD51E0866}" dt="2021-05-13T13:36:14.070" v="473" actId="478"/>
+          <ac:cxnSpMkLst>
+            <pc:docMk/>
+            <pc:sldMk cId="3147353065" sldId="434"/>
             <ac:cxnSpMk id="93" creationId="{2B8D53CD-BB92-4468-8B42-E8242A3114A3}"/>
           </ac:cxnSpMkLst>
         </pc:cxnChg>
@@ -7005,8 +7365,8 @@
           </a:p>
         </p:txBody>
       </p:sp>
-      <mc:AlternateContent xmlns:mc="http://schemas.openxmlformats.org/markup-compatibility/2006">
-        <mc:Choice xmlns:a14="http://schemas.microsoft.com/office/drawing/2010/main" Requires="a14">
+      <mc:AlternateContent xmlns:mc="http://schemas.openxmlformats.org/markup-compatibility/2006" xmlns:a14="http://schemas.microsoft.com/office/drawing/2010/main">
+        <mc:Choice Requires="a14">
           <p:sp>
             <p:nvSpPr>
               <p:cNvPr id="27" name="TextBox 26">
@@ -7035,6 +7395,7 @@
               </a:bodyPr>
               <a:lstStyle/>
               <a:p>
+                <a:pPr/>
                 <a14:m>
                   <m:oMathPara xmlns:m="http://schemas.openxmlformats.org/officeDocument/2006/math">
                     <m:oMathParaPr>
@@ -7138,7 +7499,7 @@
             </p:txBody>
           </p:sp>
         </mc:Choice>
-        <mc:Fallback>
+        <mc:Fallback xmlns="">
           <p:sp>
             <p:nvSpPr>
               <p:cNvPr id="27" name="TextBox 26">
@@ -7533,8 +7894,8 @@
           </a:p>
         </p:txBody>
       </p:sp>
-      <mc:AlternateContent xmlns:mc="http://schemas.openxmlformats.org/markup-compatibility/2006">
-        <mc:Choice xmlns:a14="http://schemas.microsoft.com/office/drawing/2010/main" Requires="a14">
+      <mc:AlternateContent xmlns:mc="http://schemas.openxmlformats.org/markup-compatibility/2006" xmlns:a14="http://schemas.microsoft.com/office/drawing/2010/main">
+        <mc:Choice Requires="a14">
           <p:sp>
             <p:nvSpPr>
               <p:cNvPr id="59" name="TextBox 58">
@@ -7563,6 +7924,7 @@
               </a:bodyPr>
               <a:lstStyle/>
               <a:p>
+                <a:pPr/>
                 <a14:m>
                   <m:oMathPara xmlns:m="http://schemas.openxmlformats.org/officeDocument/2006/math">
                     <m:oMathParaPr>
@@ -7651,7 +8013,7 @@
             </p:txBody>
           </p:sp>
         </mc:Choice>
-        <mc:Fallback>
+        <mc:Fallback xmlns="">
           <p:sp>
             <p:nvSpPr>
               <p:cNvPr id="59" name="TextBox 58">
@@ -8132,8 +8494,8 @@
           </a:p>
         </p:txBody>
       </p:sp>
-      <mc:AlternateContent xmlns:mc="http://schemas.openxmlformats.org/markup-compatibility/2006">
-        <mc:Choice xmlns:a14="http://schemas.microsoft.com/office/drawing/2010/main" Requires="a14">
+      <mc:AlternateContent xmlns:mc="http://schemas.openxmlformats.org/markup-compatibility/2006" xmlns:a14="http://schemas.microsoft.com/office/drawing/2010/main">
+        <mc:Choice Requires="a14">
           <p:sp>
             <p:nvSpPr>
               <p:cNvPr id="82" name="TextBox 81">
@@ -8162,6 +8524,7 @@
               </a:bodyPr>
               <a:lstStyle/>
               <a:p>
+                <a:pPr/>
                 <a14:m>
                   <m:oMathPara xmlns:m="http://schemas.openxmlformats.org/officeDocument/2006/math">
                     <m:oMathParaPr>
@@ -8221,7 +8584,7 @@
             </p:txBody>
           </p:sp>
         </mc:Choice>
-        <mc:Fallback>
+        <mc:Fallback xmlns="">
           <p:sp>
             <p:nvSpPr>
               <p:cNvPr id="82" name="TextBox 81">
@@ -8266,8 +8629,8 @@
           </p:sp>
         </mc:Fallback>
       </mc:AlternateContent>
-      <mc:AlternateContent xmlns:mc="http://schemas.openxmlformats.org/markup-compatibility/2006">
-        <mc:Choice xmlns:a14="http://schemas.microsoft.com/office/drawing/2010/main" Requires="a14">
+      <mc:AlternateContent xmlns:mc="http://schemas.openxmlformats.org/markup-compatibility/2006" xmlns:a14="http://schemas.microsoft.com/office/drawing/2010/main">
+        <mc:Choice Requires="a14">
           <p:sp>
             <p:nvSpPr>
               <p:cNvPr id="83" name="TextBox 82">
@@ -8296,6 +8659,7 @@
               </a:bodyPr>
               <a:lstStyle/>
               <a:p>
+                <a:pPr/>
                 <a14:m>
                   <m:oMathPara xmlns:m="http://schemas.openxmlformats.org/officeDocument/2006/math">
                     <m:oMathParaPr>
@@ -8355,7 +8719,7 @@
             </p:txBody>
           </p:sp>
         </mc:Choice>
-        <mc:Fallback>
+        <mc:Fallback xmlns="">
           <p:sp>
             <p:nvSpPr>
               <p:cNvPr id="83" name="TextBox 82">
@@ -8648,6 +9012,527 @@
     <p:extLst>
       <p:ext uri="{BB962C8B-B14F-4D97-AF65-F5344CB8AC3E}">
         <p14:creationId xmlns:p14="http://schemas.microsoft.com/office/powerpoint/2010/main" val="2843157709"/>
+      </p:ext>
+    </p:extLst>
+  </p:cSld>
+  <p:clrMapOvr>
+    <a:masterClrMapping/>
+  </p:clrMapOvr>
+</p:sld>
+</file>
+
+<file path=ppt/slides/slide3.xml><?xml version="1.0" encoding="utf-8"?>
+<p:sld xmlns:a="http://schemas.openxmlformats.org/drawingml/2006/main" xmlns:r="http://schemas.openxmlformats.org/officeDocument/2006/relationships" xmlns:p="http://schemas.openxmlformats.org/presentationml/2006/main">
+  <p:cSld>
+    <p:spTree>
+      <p:nvGrpSpPr>
+        <p:cNvPr id="1" name=""/>
+        <p:cNvGrpSpPr/>
+        <p:nvPr/>
+      </p:nvGrpSpPr>
+      <p:grpSpPr>
+        <a:xfrm>
+          <a:off x="0" y="0"/>
+          <a:ext cx="0" cy="0"/>
+          <a:chOff x="0" y="0"/>
+          <a:chExt cx="0" cy="0"/>
+        </a:xfrm>
+      </p:grpSpPr>
+      <mc:AlternateContent xmlns:mc="http://schemas.openxmlformats.org/markup-compatibility/2006">
+        <mc:Choice xmlns:a14="http://schemas.microsoft.com/office/drawing/2010/main" Requires="a14">
+          <p:sp>
+            <p:nvSpPr>
+              <p:cNvPr id="2" name="TextBox 1">
+                <a:extLst>
+                  <a:ext uri="{FF2B5EF4-FFF2-40B4-BE49-F238E27FC236}">
+                    <a16:creationId xmlns:a16="http://schemas.microsoft.com/office/drawing/2014/main" id="{7CA85727-4A73-4B10-8178-C06B0B2B33C5}"/>
+                  </a:ext>
+                </a:extLst>
+              </p:cNvPr>
+              <p:cNvSpPr txBox="1"/>
+              <p:nvPr/>
+            </p:nvSpPr>
+            <p:spPr>
+              <a:xfrm>
+                <a:off x="2829024" y="1892539"/>
+                <a:ext cx="5331268" cy="1157048"/>
+              </a:xfrm>
+              <a:prstGeom prst="rect">
+                <a:avLst/>
+              </a:prstGeom>
+              <a:noFill/>
+            </p:spPr>
+            <p:txBody>
+              <a:bodyPr wrap="none" lIns="0" tIns="0" rIns="0" bIns="0" rtlCol="0">
+                <a:spAutoFit/>
+              </a:bodyPr>
+              <a:lstStyle/>
+              <a:p>
+                <a14:m>
+                  <m:oMathPara xmlns:m="http://schemas.openxmlformats.org/officeDocument/2006/math">
+                    <m:oMathParaPr>
+                      <m:jc m:val="centerGroup"/>
+                    </m:oMathParaPr>
+                    <m:oMath xmlns:m="http://schemas.openxmlformats.org/officeDocument/2006/math">
+                      <m:limLow>
+                        <m:limLowPr>
+                          <m:ctrlPr>
+                            <a:rPr lang="en-US" b="0" i="1" smtClean="0">
+                              <a:latin typeface="Cambria Math" panose="02040503050406030204" pitchFamily="18" charset="0"/>
+                            </a:rPr>
+                          </m:ctrlPr>
+                        </m:limLowPr>
+                        <m:e>
+                          <m:groupChr>
+                            <m:groupChrPr>
+                              <m:chr m:val="⏟"/>
+                              <m:ctrlPr>
+                                <a:rPr lang="en-US" b="0" i="1" smtClean="0">
+                                  <a:latin typeface="Cambria Math" panose="02040503050406030204" pitchFamily="18" charset="0"/>
+                                </a:rPr>
+                              </m:ctrlPr>
+                            </m:groupChrPr>
+                            <m:e>
+                              <m:f>
+                                <m:fPr>
+                                  <m:ctrlPr>
+                                    <a:rPr lang="en-US" i="1">
+                                      <a:latin typeface="Cambria Math" panose="02040503050406030204" pitchFamily="18" charset="0"/>
+                                    </a:rPr>
+                                  </m:ctrlPr>
+                                </m:fPr>
+                                <m:num>
+                                  <m:r>
+                                    <a:rPr lang="en-US" i="1">
+                                      <a:latin typeface="Cambria Math" panose="02040503050406030204" pitchFamily="18" charset="0"/>
+                                    </a:rPr>
+                                    <m:t>𝜕𝜌𝜙</m:t>
+                                  </m:r>
+                                </m:num>
+                                <m:den>
+                                  <m:r>
+                                    <a:rPr lang="en-US" i="1">
+                                      <a:latin typeface="Cambria Math" panose="02040503050406030204" pitchFamily="18" charset="0"/>
+                                    </a:rPr>
+                                    <m:t>𝜕</m:t>
+                                  </m:r>
+                                  <m:r>
+                                    <a:rPr lang="en-US" i="1">
+                                      <a:latin typeface="Cambria Math" panose="02040503050406030204" pitchFamily="18" charset="0"/>
+                                    </a:rPr>
+                                    <m:t>𝑡</m:t>
+                                  </m:r>
+                                </m:den>
+                              </m:f>
+                              <m:r>
+                                <a:rPr lang="en-US" i="1">
+                                  <a:latin typeface="Cambria Math" panose="02040503050406030204" pitchFamily="18" charset="0"/>
+                                </a:rPr>
+                                <m:t>+</m:t>
+                              </m:r>
+                              <m:limUpp>
+                                <m:limUppPr>
+                                  <m:ctrlPr>
+                                    <a:rPr lang="en-US" i="1" smtClean="0">
+                                      <a:latin typeface="Cambria Math" panose="02040503050406030204" pitchFamily="18" charset="0"/>
+                                    </a:rPr>
+                                  </m:ctrlPr>
+                                </m:limUppPr>
+                                <m:e>
+                                  <m:groupChr>
+                                    <m:groupChrPr>
+                                      <m:chr m:val="⏞"/>
+                                      <m:pos m:val="top"/>
+                                      <m:vertJc m:val="bot"/>
+                                      <m:ctrlPr>
+                                        <a:rPr lang="en-US" i="1" smtClean="0">
+                                          <a:latin typeface="Cambria Math" panose="02040503050406030204" pitchFamily="18" charset="0"/>
+                                        </a:rPr>
+                                      </m:ctrlPr>
+                                    </m:groupChrPr>
+                                    <m:e>
+                                      <m:r>
+                                        <m:rPr>
+                                          <m:sty m:val="p"/>
+                                        </m:rPr>
+                                        <a:rPr lang="en-US">
+                                          <a:latin typeface="Cambria Math" panose="02040503050406030204" pitchFamily="18" charset="0"/>
+                                        </a:rPr>
+                                        <m:t>∇</m:t>
+                                      </m:r>
+                                      <m:r>
+                                        <a:rPr lang="en-US" i="1">
+                                          <a:latin typeface="Cambria Math" panose="02040503050406030204" pitchFamily="18" charset="0"/>
+                                        </a:rPr>
+                                        <m:t>⋅</m:t>
+                                      </m:r>
+                                      <m:d>
+                                        <m:dPr>
+                                          <m:ctrlPr>
+                                            <a:rPr lang="en-US" i="1">
+                                              <a:latin typeface="Cambria Math" panose="02040503050406030204" pitchFamily="18" charset="0"/>
+                                            </a:rPr>
+                                          </m:ctrlPr>
+                                        </m:dPr>
+                                        <m:e>
+                                          <m:r>
+                                            <a:rPr lang="en-US" i="1">
+                                              <a:latin typeface="Cambria Math" panose="02040503050406030204" pitchFamily="18" charset="0"/>
+                                            </a:rPr>
+                                            <m:t>𝜌</m:t>
+                                          </m:r>
+                                          <m:r>
+                                            <a:rPr lang="en-US" i="1">
+                                              <a:latin typeface="Cambria Math" panose="02040503050406030204" pitchFamily="18" charset="0"/>
+                                            </a:rPr>
+                                            <m:t>𝐷</m:t>
+                                          </m:r>
+                                          <m:r>
+                                            <m:rPr>
+                                              <m:sty m:val="p"/>
+                                            </m:rPr>
+                                            <a:rPr lang="en-US">
+                                              <a:latin typeface="Cambria Math" panose="02040503050406030204" pitchFamily="18" charset="0"/>
+                                            </a:rPr>
+                                            <m:t>∇</m:t>
+                                          </m:r>
+                                          <m:r>
+                                            <a:rPr lang="en-US" i="1">
+                                              <a:latin typeface="Cambria Math" panose="02040503050406030204" pitchFamily="18" charset="0"/>
+                                            </a:rPr>
+                                            <m:t>𝜙</m:t>
+                                          </m:r>
+                                        </m:e>
+                                      </m:d>
+                                    </m:e>
+                                  </m:groupChr>
+                                </m:e>
+                                <m:lim>
+                                  <m:r>
+                                    <m:rPr>
+                                      <m:sty m:val="p"/>
+                                    </m:rPr>
+                                    <a:rPr lang="en-US" b="0" i="0" smtClean="0">
+                                      <a:latin typeface="Cambria Math" panose="02040503050406030204" pitchFamily="18" charset="0"/>
+                                    </a:rPr>
+                                    <m:t>diffusion</m:t>
+                                  </m:r>
+                                </m:lim>
+                              </m:limUpp>
+                            </m:e>
+                          </m:groupChr>
+                        </m:e>
+                        <m:lim>
+                          <m:r>
+                            <m:rPr>
+                              <m:sty m:val="p"/>
+                            </m:rPr>
+                            <a:rPr lang="en-US" b="0" i="0" smtClean="0">
+                              <a:latin typeface="Cambria Math" panose="02040503050406030204" pitchFamily="18" charset="0"/>
+                            </a:rPr>
+                            <m:t>Phase</m:t>
+                          </m:r>
+                          <m:r>
+                            <a:rPr lang="en-US" b="0" i="0" smtClean="0">
+                              <a:latin typeface="Cambria Math" panose="02040503050406030204" pitchFamily="18" charset="0"/>
+                            </a:rPr>
+                            <m:t> </m:t>
+                          </m:r>
+                          <m:r>
+                            <m:rPr>
+                              <m:sty m:val="p"/>
+                            </m:rPr>
+                            <a:rPr lang="en-US" b="0" i="0" smtClean="0">
+                              <a:latin typeface="Cambria Math" panose="02040503050406030204" pitchFamily="18" charset="0"/>
+                            </a:rPr>
+                            <m:t>B</m:t>
+                          </m:r>
+                        </m:lim>
+                      </m:limLow>
+                      <m:r>
+                        <a:rPr lang="en-US" b="0" i="1" smtClean="0">
+                          <a:latin typeface="Cambria Math" panose="02040503050406030204" pitchFamily="18" charset="0"/>
+                        </a:rPr>
+                        <m:t>+</m:t>
+                      </m:r>
+                      <m:limLow>
+                        <m:limLowPr>
+                          <m:ctrlPr>
+                            <a:rPr lang="en-US" b="0" i="1" smtClean="0">
+                              <a:latin typeface="Cambria Math" panose="02040503050406030204" pitchFamily="18" charset="0"/>
+                            </a:rPr>
+                          </m:ctrlPr>
+                        </m:limLowPr>
+                        <m:e>
+                          <m:groupChr>
+                            <m:groupChrPr>
+                              <m:chr m:val="⏟"/>
+                              <m:ctrlPr>
+                                <a:rPr lang="en-US" b="0" i="1" smtClean="0">
+                                  <a:latin typeface="Cambria Math" panose="02040503050406030204" pitchFamily="18" charset="0"/>
+                                </a:rPr>
+                              </m:ctrlPr>
+                            </m:groupChrPr>
+                            <m:e>
+                              <m:limUpp>
+                                <m:limUppPr>
+                                  <m:ctrlPr>
+                                    <a:rPr lang="en-US" b="0" i="1" smtClean="0">
+                                      <a:latin typeface="Cambria Math" panose="02040503050406030204" pitchFamily="18" charset="0"/>
+                                    </a:rPr>
+                                  </m:ctrlPr>
+                                </m:limUppPr>
+                                <m:e>
+                                  <m:groupChr>
+                                    <m:groupChrPr>
+                                      <m:chr m:val="⏞"/>
+                                      <m:pos m:val="top"/>
+                                      <m:vertJc m:val="bot"/>
+                                      <m:ctrlPr>
+                                        <a:rPr lang="en-US" b="0" i="1" smtClean="0">
+                                          <a:latin typeface="Cambria Math" panose="02040503050406030204" pitchFamily="18" charset="0"/>
+                                        </a:rPr>
+                                      </m:ctrlPr>
+                                    </m:groupChrPr>
+                                    <m:e>
+                                      <m:r>
+                                        <m:rPr>
+                                          <m:sty m:val="p"/>
+                                        </m:rPr>
+                                        <a:rPr lang="en-US">
+                                          <a:latin typeface="Cambria Math" panose="02040503050406030204" pitchFamily="18" charset="0"/>
+                                        </a:rPr>
+                                        <m:t>∇</m:t>
+                                      </m:r>
+                                      <m:r>
+                                        <a:rPr lang="en-US" i="1">
+                                          <a:latin typeface="Cambria Math" panose="02040503050406030204" pitchFamily="18" charset="0"/>
+                                        </a:rPr>
+                                        <m:t>⋅</m:t>
+                                      </m:r>
+                                      <m:d>
+                                        <m:dPr>
+                                          <m:ctrlPr>
+                                            <a:rPr lang="en-US" i="1">
+                                              <a:latin typeface="Cambria Math" panose="02040503050406030204" pitchFamily="18" charset="0"/>
+                                            </a:rPr>
+                                          </m:ctrlPr>
+                                        </m:dPr>
+                                        <m:e>
+                                          <m:r>
+                                            <a:rPr lang="en-US" i="1">
+                                              <a:latin typeface="Cambria Math" panose="02040503050406030204" pitchFamily="18" charset="0"/>
+                                            </a:rPr>
+                                            <m:t>𝜌</m:t>
+                                          </m:r>
+                                          <m:r>
+                                            <a:rPr lang="en-US" b="1">
+                                              <a:latin typeface="Cambria Math" panose="02040503050406030204" pitchFamily="18" charset="0"/>
+                                            </a:rPr>
+                                            <m:t>𝐮</m:t>
+                                          </m:r>
+                                          <m:r>
+                                            <a:rPr lang="en-US" i="1">
+                                              <a:latin typeface="Cambria Math" panose="02040503050406030204" pitchFamily="18" charset="0"/>
+                                            </a:rPr>
+                                            <m:t>𝜙</m:t>
+                                          </m:r>
+                                        </m:e>
+                                      </m:d>
+                                    </m:e>
+                                  </m:groupChr>
+                                </m:e>
+                                <m:lim>
+                                  <m:r>
+                                    <m:rPr>
+                                      <m:sty m:val="p"/>
+                                    </m:rPr>
+                                    <a:rPr lang="en-US" b="0" i="0" smtClean="0">
+                                      <a:latin typeface="Cambria Math" panose="02040503050406030204" pitchFamily="18" charset="0"/>
+                                    </a:rPr>
+                                    <m:t>advection</m:t>
+                                  </m:r>
+                                </m:lim>
+                              </m:limUpp>
+                            </m:e>
+                          </m:groupChr>
+                        </m:e>
+                        <m:lim>
+                          <m:r>
+                            <m:rPr>
+                              <m:sty m:val="p"/>
+                            </m:rPr>
+                            <a:rPr lang="en-US" b="0" i="0" smtClean="0">
+                              <a:latin typeface="Cambria Math" panose="02040503050406030204" pitchFamily="18" charset="0"/>
+                            </a:rPr>
+                            <m:t>Phase</m:t>
+                          </m:r>
+                          <m:r>
+                            <a:rPr lang="en-US" b="0" i="0" smtClean="0">
+                              <a:latin typeface="Cambria Math" panose="02040503050406030204" pitchFamily="18" charset="0"/>
+                            </a:rPr>
+                            <m:t> </m:t>
+                          </m:r>
+                          <m:r>
+                            <m:rPr>
+                              <m:sty m:val="p"/>
+                            </m:rPr>
+                            <a:rPr lang="en-US" b="0" i="0" smtClean="0">
+                              <a:latin typeface="Cambria Math" panose="02040503050406030204" pitchFamily="18" charset="0"/>
+                            </a:rPr>
+                            <m:t>C</m:t>
+                          </m:r>
+                        </m:lim>
+                      </m:limLow>
+                      <m:r>
+                        <a:rPr lang="en-US" b="0" i="1" smtClean="0">
+                          <a:latin typeface="Cambria Math" panose="02040503050406030204" pitchFamily="18" charset="0"/>
+                        </a:rPr>
+                        <m:t>=</m:t>
+                      </m:r>
+                      <m:limLow>
+                        <m:limLowPr>
+                          <m:ctrlPr>
+                            <a:rPr lang="en-US" b="0" i="1" smtClean="0">
+                              <a:latin typeface="Cambria Math" panose="02040503050406030204" pitchFamily="18" charset="0"/>
+                            </a:rPr>
+                          </m:ctrlPr>
+                        </m:limLowPr>
+                        <m:e>
+                          <m:groupChr>
+                            <m:groupChrPr>
+                              <m:chr m:val="⏟"/>
+                              <m:ctrlPr>
+                                <a:rPr lang="en-US" b="0" i="1" smtClean="0">
+                                  <a:latin typeface="Cambria Math" panose="02040503050406030204" pitchFamily="18" charset="0"/>
+                                </a:rPr>
+                              </m:ctrlPr>
+                            </m:groupChrPr>
+                            <m:e>
+                              <m:sSub>
+                                <m:sSubPr>
+                                  <m:ctrlPr>
+                                    <a:rPr lang="en-US" i="1">
+                                      <a:latin typeface="Cambria Math" panose="02040503050406030204" pitchFamily="18" charset="0"/>
+                                    </a:rPr>
+                                  </m:ctrlPr>
+                                </m:sSubPr>
+                                <m:e>
+                                  <m:acc>
+                                    <m:accPr>
+                                      <m:chr m:val="̇"/>
+                                      <m:ctrlPr>
+                                        <a:rPr lang="en-US" i="1">
+                                          <a:latin typeface="Cambria Math" panose="02040503050406030204" pitchFamily="18" charset="0"/>
+                                        </a:rPr>
+                                      </m:ctrlPr>
+                                    </m:accPr>
+                                    <m:e>
+                                      <m:r>
+                                        <a:rPr lang="en-US" i="1">
+                                          <a:latin typeface="Cambria Math" panose="02040503050406030204" pitchFamily="18" charset="0"/>
+                                        </a:rPr>
+                                        <m:t>𝑆</m:t>
+                                      </m:r>
+                                    </m:e>
+                                  </m:acc>
+                                </m:e>
+                                <m:sub>
+                                  <m:r>
+                                    <a:rPr lang="en-US" i="1">
+                                      <a:latin typeface="Cambria Math" panose="02040503050406030204" pitchFamily="18" charset="0"/>
+                                    </a:rPr>
+                                    <m:t>𝜙</m:t>
+                                  </m:r>
+                                </m:sub>
+                              </m:sSub>
+                            </m:e>
+                          </m:groupChr>
+                        </m:e>
+                        <m:lim>
+                          <m:r>
+                            <m:rPr>
+                              <m:sty m:val="p"/>
+                            </m:rPr>
+                            <a:rPr lang="en-US" b="0" i="0" smtClean="0">
+                              <a:latin typeface="Cambria Math" panose="02040503050406030204" pitchFamily="18" charset="0"/>
+                            </a:rPr>
+                            <m:t>Phase</m:t>
+                          </m:r>
+                          <m:r>
+                            <a:rPr lang="en-US" b="0" i="0" smtClean="0">
+                              <a:latin typeface="Cambria Math" panose="02040503050406030204" pitchFamily="18" charset="0"/>
+                            </a:rPr>
+                            <m:t> </m:t>
+                          </m:r>
+                          <m:r>
+                            <m:rPr>
+                              <m:sty m:val="p"/>
+                            </m:rPr>
+                            <a:rPr lang="en-US" b="0" i="0" smtClean="0">
+                              <a:latin typeface="Cambria Math" panose="02040503050406030204" pitchFamily="18" charset="0"/>
+                            </a:rPr>
+                            <m:t>A</m:t>
+                          </m:r>
+                        </m:lim>
+                      </m:limLow>
+                    </m:oMath>
+                  </m:oMathPara>
+                </a14:m>
+                <a:endParaRPr lang="en-US" dirty="0"/>
+              </a:p>
+            </p:txBody>
+          </p:sp>
+        </mc:Choice>
+        <mc:Fallback>
+          <p:sp>
+            <p:nvSpPr>
+              <p:cNvPr id="2" name="TextBox 1">
+                <a:extLst>
+                  <a:ext uri="{FF2B5EF4-FFF2-40B4-BE49-F238E27FC236}">
+                    <a16:creationId xmlns:a16="http://schemas.microsoft.com/office/drawing/2014/main" id="{7CA85727-4A73-4B10-8178-C06B0B2B33C5}"/>
+                  </a:ext>
+                </a:extLst>
+              </p:cNvPr>
+              <p:cNvSpPr txBox="1">
+                <a:spLocks noRot="1" noChangeAspect="1" noMove="1" noResize="1" noEditPoints="1" noAdjustHandles="1" noChangeArrowheads="1" noChangeShapeType="1" noTextEdit="1"/>
+              </p:cNvSpPr>
+              <p:nvPr/>
+            </p:nvSpPr>
+            <p:spPr>
+              <a:xfrm>
+                <a:off x="2829024" y="1892539"/>
+                <a:ext cx="5331268" cy="1157048"/>
+              </a:xfrm>
+              <a:prstGeom prst="rect">
+                <a:avLst/>
+              </a:prstGeom>
+              <a:blipFill>
+                <a:blip r:embed="rId2"/>
+                <a:stretch>
+                  <a:fillRect/>
+                </a:stretch>
+              </a:blipFill>
+            </p:spPr>
+            <p:txBody>
+              <a:bodyPr/>
+              <a:lstStyle/>
+              <a:p>
+                <a:r>
+                  <a:rPr lang="en-US">
+                    <a:noFill/>
+                  </a:rPr>
+                  <a:t> </a:t>
+                </a:r>
+              </a:p>
+            </p:txBody>
+          </p:sp>
+        </mc:Fallback>
+      </mc:AlternateContent>
+    </p:spTree>
+    <p:extLst>
+      <p:ext uri="{BB962C8B-B14F-4D97-AF65-F5344CB8AC3E}">
+        <p14:creationId xmlns:p14="http://schemas.microsoft.com/office/powerpoint/2010/main" val="3147353065"/>
       </p:ext>
     </p:extLst>
   </p:cSld>

</xml_diff>